<commit_message>
Added some notes and cleaned up Johns presentation slides
</commit_message>
<xml_diff>
--- a/Presentation/Open_Spaces_Presentation.pptx
+++ b/Presentation/Open_Spaces_Presentation.pptx
@@ -141,315 +141,6 @@
 </p:presentation>
 </file>
 
-<file path=ppt/revisionInfo.xml><?xml version="1.0" encoding="utf-8"?>
-<p1510:revInfo xmlns:a="http://schemas.openxmlformats.org/drawingml/2006/main" xmlns:r="http://schemas.openxmlformats.org/officeDocument/2006/relationships" xmlns:p1510="http://schemas.microsoft.com/office/powerpoint/2015/10/main">
-  <p1510:revLst>
-    <p1510:client id="{31ADAD4B-D503-4568-BB74-7843C0CB657A}" v="18" dt="2024-02-07T12:38:16.864"/>
-    <p1510:client id="{CF6C4CAE-DFEF-42E7-ADFF-DEFD7B47D145}" v="7" dt="2024-02-08T10:39:12.662"/>
-  </p1510:revLst>
-</p1510:revInfo>
-</file>
-
-<file path=ppt/changesInfos/changesInfo1.xml><?xml version="1.0" encoding="utf-8"?>
-<pc:chgInfo xmlns:a="http://schemas.openxmlformats.org/drawingml/2006/main" xmlns:r="http://schemas.openxmlformats.org/officeDocument/2006/relationships" xmlns:ac="http://schemas.microsoft.com/office/drawing/2013/main/command" xmlns:pc="http://schemas.microsoft.com/office/powerpoint/2013/main/command">
-  <pc:docChgLst>
-    <pc:chgData name="vaibhav bhosle" userId="68d2ea067cb66f68" providerId="LiveId" clId="{E5C5712F-7174-4631-B3EB-09179799C298}"/>
-    <pc:docChg chg="custSel modSld">
-      <pc:chgData name="vaibhav bhosle" userId="68d2ea067cb66f68" providerId="LiveId" clId="{E5C5712F-7174-4631-B3EB-09179799C298}" dt="2024-02-08T08:59:38.631" v="200" actId="20577"/>
-      <pc:docMkLst>
-        <pc:docMk/>
-      </pc:docMkLst>
-      <pc:sldChg chg="modSp mod">
-        <pc:chgData name="vaibhav bhosle" userId="68d2ea067cb66f68" providerId="LiveId" clId="{E5C5712F-7174-4631-B3EB-09179799C298}" dt="2024-02-08T08:56:50.869" v="170" actId="20577"/>
-        <pc:sldMkLst>
-          <pc:docMk/>
-          <pc:sldMk cId="0" sldId="262"/>
-        </pc:sldMkLst>
-        <pc:spChg chg="mod">
-          <ac:chgData name="vaibhav bhosle" userId="68d2ea067cb66f68" providerId="LiveId" clId="{E5C5712F-7174-4631-B3EB-09179799C298}" dt="2024-02-08T08:56:50.869" v="170" actId="20577"/>
-          <ac:spMkLst>
-            <pc:docMk/>
-            <pc:sldMk cId="0" sldId="262"/>
-            <ac:spMk id="3" creationId="{00000000-0000-0000-0000-000000000000}"/>
-          </ac:spMkLst>
-        </pc:spChg>
-      </pc:sldChg>
-      <pc:sldChg chg="modSp mod">
-        <pc:chgData name="vaibhav bhosle" userId="68d2ea067cb66f68" providerId="LiveId" clId="{E5C5712F-7174-4631-B3EB-09179799C298}" dt="2024-02-08T08:59:38.631" v="200" actId="20577"/>
-        <pc:sldMkLst>
-          <pc:docMk/>
-          <pc:sldMk cId="3574457310" sldId="273"/>
-        </pc:sldMkLst>
-        <pc:spChg chg="mod">
-          <ac:chgData name="vaibhav bhosle" userId="68d2ea067cb66f68" providerId="LiveId" clId="{E5C5712F-7174-4631-B3EB-09179799C298}" dt="2024-02-08T08:59:38.631" v="200" actId="20577"/>
-          <ac:spMkLst>
-            <pc:docMk/>
-            <pc:sldMk cId="3574457310" sldId="273"/>
-            <ac:spMk id="2" creationId="{F266EACA-BC38-AFDC-D708-E142A0C48C0A}"/>
-          </ac:spMkLst>
-        </pc:spChg>
-      </pc:sldChg>
-      <pc:sldChg chg="delSp modSp mod">
-        <pc:chgData name="vaibhav bhosle" userId="68d2ea067cb66f68" providerId="LiveId" clId="{E5C5712F-7174-4631-B3EB-09179799C298}" dt="2024-02-08T08:53:45.355" v="1" actId="14100"/>
-        <pc:sldMkLst>
-          <pc:docMk/>
-          <pc:sldMk cId="1382469694" sldId="274"/>
-        </pc:sldMkLst>
-        <pc:spChg chg="del">
-          <ac:chgData name="vaibhav bhosle" userId="68d2ea067cb66f68" providerId="LiveId" clId="{E5C5712F-7174-4631-B3EB-09179799C298}" dt="2024-02-08T08:53:41.703" v="0" actId="478"/>
-          <ac:spMkLst>
-            <pc:docMk/>
-            <pc:sldMk cId="1382469694" sldId="274"/>
-            <ac:spMk id="2" creationId="{0351AFC4-BDEB-6AE4-6322-CB0B67590334}"/>
-          </ac:spMkLst>
-        </pc:spChg>
-        <pc:picChg chg="mod">
-          <ac:chgData name="vaibhav bhosle" userId="68d2ea067cb66f68" providerId="LiveId" clId="{E5C5712F-7174-4631-B3EB-09179799C298}" dt="2024-02-08T08:53:45.355" v="1" actId="14100"/>
-          <ac:picMkLst>
-            <pc:docMk/>
-            <pc:sldMk cId="1382469694" sldId="274"/>
-            <ac:picMk id="5" creationId="{647AB055-C150-B71D-5761-50B46056C51B}"/>
-          </ac:picMkLst>
-        </pc:picChg>
-      </pc:sldChg>
-    </pc:docChg>
-  </pc:docChgLst>
-  <pc:docChgLst>
-    <pc:chgData name="vaibhav bhosle" userId="68d2ea067cb66f68" providerId="LiveId" clId="{CF6C4CAE-DFEF-42E7-ADFF-DEFD7B47D145}"/>
-    <pc:docChg chg="undo custSel addSld modSld sldOrd">
-      <pc:chgData name="vaibhav bhosle" userId="68d2ea067cb66f68" providerId="LiveId" clId="{CF6C4CAE-DFEF-42E7-ADFF-DEFD7B47D145}" dt="2024-02-08T10:50:54.179" v="264" actId="20577"/>
-      <pc:docMkLst>
-        <pc:docMk/>
-      </pc:docMkLst>
-      <pc:sldChg chg="addSp delSp modSp mod">
-        <pc:chgData name="vaibhav bhosle" userId="68d2ea067cb66f68" providerId="LiveId" clId="{CF6C4CAE-DFEF-42E7-ADFF-DEFD7B47D145}" dt="2024-02-08T10:20:58.679" v="127" actId="14100"/>
-        <pc:sldMkLst>
-          <pc:docMk/>
-          <pc:sldMk cId="0" sldId="260"/>
-        </pc:sldMkLst>
-        <pc:spChg chg="add del mod">
-          <ac:chgData name="vaibhav bhosle" userId="68d2ea067cb66f68" providerId="LiveId" clId="{CF6C4CAE-DFEF-42E7-ADFF-DEFD7B47D145}" dt="2024-02-08T10:18:16.372" v="5" actId="931"/>
-          <ac:spMkLst>
-            <pc:docMk/>
-            <pc:sldMk cId="0" sldId="260"/>
-            <ac:spMk id="4" creationId="{2D2422CA-2169-473F-E1C0-83A0DA2B4644}"/>
-          </ac:spMkLst>
-        </pc:spChg>
-        <pc:spChg chg="add mod">
-          <ac:chgData name="vaibhav bhosle" userId="68d2ea067cb66f68" providerId="LiveId" clId="{CF6C4CAE-DFEF-42E7-ADFF-DEFD7B47D145}" dt="2024-02-08T10:20:58.679" v="127" actId="14100"/>
-          <ac:spMkLst>
-            <pc:docMk/>
-            <pc:sldMk cId="0" sldId="260"/>
-            <ac:spMk id="7" creationId="{2AF2B13E-4C76-C074-35D4-A1E19D4D4A81}"/>
-          </ac:spMkLst>
-        </pc:spChg>
-        <pc:picChg chg="add mod">
-          <ac:chgData name="vaibhav bhosle" userId="68d2ea067cb66f68" providerId="LiveId" clId="{CF6C4CAE-DFEF-42E7-ADFF-DEFD7B47D145}" dt="2024-02-08T10:18:53.285" v="16" actId="1076"/>
-          <ac:picMkLst>
-            <pc:docMk/>
-            <pc:sldMk cId="0" sldId="260"/>
-            <ac:picMk id="6" creationId="{FA6DB5D1-906B-EFF4-A566-A8A2F442A791}"/>
-          </ac:picMkLst>
-        </pc:picChg>
-        <pc:picChg chg="del">
-          <ac:chgData name="vaibhav bhosle" userId="68d2ea067cb66f68" providerId="LiveId" clId="{CF6C4CAE-DFEF-42E7-ADFF-DEFD7B47D145}" dt="2024-02-08T10:17:48.264" v="4" actId="478"/>
-          <ac:picMkLst>
-            <pc:docMk/>
-            <pc:sldMk cId="0" sldId="260"/>
-            <ac:picMk id="10" creationId="{399CB185-BBF0-5622-E547-D57FE56C3AB4}"/>
-          </ac:picMkLst>
-        </pc:picChg>
-      </pc:sldChg>
-      <pc:sldChg chg="modSp mod">
-        <pc:chgData name="vaibhav bhosle" userId="68d2ea067cb66f68" providerId="LiveId" clId="{CF6C4CAE-DFEF-42E7-ADFF-DEFD7B47D145}" dt="2024-02-08T10:43:49.737" v="183" actId="20577"/>
-        <pc:sldMkLst>
-          <pc:docMk/>
-          <pc:sldMk cId="0" sldId="262"/>
-        </pc:sldMkLst>
-        <pc:spChg chg="mod">
-          <ac:chgData name="vaibhav bhosle" userId="68d2ea067cb66f68" providerId="LiveId" clId="{CF6C4CAE-DFEF-42E7-ADFF-DEFD7B47D145}" dt="2024-02-08T10:43:49.737" v="183" actId="20577"/>
-          <ac:spMkLst>
-            <pc:docMk/>
-            <pc:sldMk cId="0" sldId="262"/>
-            <ac:spMk id="3" creationId="{00000000-0000-0000-0000-000000000000}"/>
-          </ac:spMkLst>
-        </pc:spChg>
-      </pc:sldChg>
-      <pc:sldChg chg="addSp delSp modSp mod">
-        <pc:chgData name="vaibhav bhosle" userId="68d2ea067cb66f68" providerId="LiveId" clId="{CF6C4CAE-DFEF-42E7-ADFF-DEFD7B47D145}" dt="2024-02-08T10:22:22.644" v="141" actId="962"/>
-        <pc:sldMkLst>
-          <pc:docMk/>
-          <pc:sldMk cId="3004503704" sldId="269"/>
-        </pc:sldMkLst>
-        <pc:spChg chg="add del mod">
-          <ac:chgData name="vaibhav bhosle" userId="68d2ea067cb66f68" providerId="LiveId" clId="{CF6C4CAE-DFEF-42E7-ADFF-DEFD7B47D145}" dt="2024-02-08T10:22:19.602" v="139" actId="931"/>
-          <ac:spMkLst>
-            <pc:docMk/>
-            <pc:sldMk cId="3004503704" sldId="269"/>
-            <ac:spMk id="5" creationId="{8EEEAA82-3474-C561-D625-E7AD377216E5}"/>
-          </ac:spMkLst>
-        </pc:spChg>
-        <pc:picChg chg="del">
-          <ac:chgData name="vaibhav bhosle" userId="68d2ea067cb66f68" providerId="LiveId" clId="{CF6C4CAE-DFEF-42E7-ADFF-DEFD7B47D145}" dt="2024-02-08T10:22:09.794" v="137" actId="478"/>
-          <ac:picMkLst>
-            <pc:docMk/>
-            <pc:sldMk cId="3004503704" sldId="269"/>
-            <ac:picMk id="4" creationId="{6DD5A25D-B732-79A3-E3DC-E7C5C9D433F3}"/>
-          </ac:picMkLst>
-        </pc:picChg>
-        <pc:picChg chg="del">
-          <ac:chgData name="vaibhav bhosle" userId="68d2ea067cb66f68" providerId="LiveId" clId="{CF6C4CAE-DFEF-42E7-ADFF-DEFD7B47D145}" dt="2024-02-08T10:22:11.596" v="138" actId="478"/>
-          <ac:picMkLst>
-            <pc:docMk/>
-            <pc:sldMk cId="3004503704" sldId="269"/>
-            <ac:picMk id="6" creationId="{D5F5FFB0-2FBA-D044-9588-95AAED028A87}"/>
-          </ac:picMkLst>
-        </pc:picChg>
-        <pc:picChg chg="add mod">
-          <ac:chgData name="vaibhav bhosle" userId="68d2ea067cb66f68" providerId="LiveId" clId="{CF6C4CAE-DFEF-42E7-ADFF-DEFD7B47D145}" dt="2024-02-08T10:22:22.644" v="141" actId="962"/>
-          <ac:picMkLst>
-            <pc:docMk/>
-            <pc:sldMk cId="3004503704" sldId="269"/>
-            <ac:picMk id="8" creationId="{639371F5-4E85-C95F-7506-6B12A5B2DD76}"/>
-          </ac:picMkLst>
-        </pc:picChg>
-      </pc:sldChg>
-      <pc:sldChg chg="modNotesTx">
-        <pc:chgData name="vaibhav bhosle" userId="68d2ea067cb66f68" providerId="LiveId" clId="{CF6C4CAE-DFEF-42E7-ADFF-DEFD7B47D145}" dt="2024-02-08T10:50:54.179" v="264" actId="20577"/>
-        <pc:sldMkLst>
-          <pc:docMk/>
-          <pc:sldMk cId="706350439" sldId="270"/>
-        </pc:sldMkLst>
-      </pc:sldChg>
-      <pc:sldChg chg="addSp delSp modSp mod modNotesTx">
-        <pc:chgData name="vaibhav bhosle" userId="68d2ea067cb66f68" providerId="LiveId" clId="{CF6C4CAE-DFEF-42E7-ADFF-DEFD7B47D145}" dt="2024-02-08T10:50:30.021" v="240" actId="20577"/>
-        <pc:sldMkLst>
-          <pc:docMk/>
-          <pc:sldMk cId="263020404" sldId="271"/>
-        </pc:sldMkLst>
-        <pc:spChg chg="mod">
-          <ac:chgData name="vaibhav bhosle" userId="68d2ea067cb66f68" providerId="LiveId" clId="{CF6C4CAE-DFEF-42E7-ADFF-DEFD7B47D145}" dt="2024-02-08T10:30:10.768" v="167" actId="14100"/>
-          <ac:spMkLst>
-            <pc:docMk/>
-            <pc:sldMk cId="263020404" sldId="271"/>
-            <ac:spMk id="2" creationId="{00000000-0000-0000-0000-000000000000}"/>
-          </ac:spMkLst>
-        </pc:spChg>
-        <pc:spChg chg="add del mod">
-          <ac:chgData name="vaibhav bhosle" userId="68d2ea067cb66f68" providerId="LiveId" clId="{CF6C4CAE-DFEF-42E7-ADFF-DEFD7B47D145}" dt="2024-02-08T10:21:49.272" v="129" actId="931"/>
-          <ac:spMkLst>
-            <pc:docMk/>
-            <pc:sldMk cId="263020404" sldId="271"/>
-            <ac:spMk id="4" creationId="{B636CECC-236D-A7FC-AB13-D92C445C29BA}"/>
-          </ac:spMkLst>
-        </pc:spChg>
-        <pc:spChg chg="add del mod">
-          <ac:chgData name="vaibhav bhosle" userId="68d2ea067cb66f68" providerId="LiveId" clId="{CF6C4CAE-DFEF-42E7-ADFF-DEFD7B47D145}" dt="2024-02-08T10:39:12.661" v="170" actId="931"/>
-          <ac:spMkLst>
-            <pc:docMk/>
-            <pc:sldMk cId="263020404" sldId="271"/>
-            <ac:spMk id="9" creationId="{D690690B-BC74-9DE9-613A-2227D425DC33}"/>
-          </ac:spMkLst>
-        </pc:spChg>
-        <pc:picChg chg="del">
-          <ac:chgData name="vaibhav bhosle" userId="68d2ea067cb66f68" providerId="LiveId" clId="{CF6C4CAE-DFEF-42E7-ADFF-DEFD7B47D145}" dt="2024-02-08T10:21:35.958" v="128" actId="478"/>
-          <ac:picMkLst>
-            <pc:docMk/>
-            <pc:sldMk cId="263020404" sldId="271"/>
-            <ac:picMk id="6" creationId="{9A609EC7-E79E-C140-0604-2F989655DC5A}"/>
-          </ac:picMkLst>
-        </pc:picChg>
-        <pc:picChg chg="add del mod">
-          <ac:chgData name="vaibhav bhosle" userId="68d2ea067cb66f68" providerId="LiveId" clId="{CF6C4CAE-DFEF-42E7-ADFF-DEFD7B47D145}" dt="2024-02-08T10:38:55.854" v="169" actId="478"/>
-          <ac:picMkLst>
-            <pc:docMk/>
-            <pc:sldMk cId="263020404" sldId="271"/>
-            <ac:picMk id="7" creationId="{41F779A8-BA96-7019-34E0-52225D08805F}"/>
-          </ac:picMkLst>
-        </pc:picChg>
-        <pc:picChg chg="add mod">
-          <ac:chgData name="vaibhav bhosle" userId="68d2ea067cb66f68" providerId="LiveId" clId="{CF6C4CAE-DFEF-42E7-ADFF-DEFD7B47D145}" dt="2024-02-08T10:40:04.174" v="177" actId="14100"/>
-          <ac:picMkLst>
-            <pc:docMk/>
-            <pc:sldMk cId="263020404" sldId="271"/>
-            <ac:picMk id="11" creationId="{0192138E-EECC-1A78-9172-D2D77FD51FC5}"/>
-          </ac:picMkLst>
-        </pc:picChg>
-      </pc:sldChg>
-      <pc:sldChg chg="ord modNotesTx">
-        <pc:chgData name="vaibhav bhosle" userId="68d2ea067cb66f68" providerId="LiveId" clId="{CF6C4CAE-DFEF-42E7-ADFF-DEFD7B47D145}" dt="2024-02-08T10:50:09.348" v="221" actId="20577"/>
-        <pc:sldMkLst>
-          <pc:docMk/>
-          <pc:sldMk cId="366985341" sldId="272"/>
-        </pc:sldMkLst>
-      </pc:sldChg>
-      <pc:sldChg chg="addSp delSp modSp new mod">
-        <pc:chgData name="vaibhav bhosle" userId="68d2ea067cb66f68" providerId="LiveId" clId="{CF6C4CAE-DFEF-42E7-ADFF-DEFD7B47D145}" dt="2024-02-08T10:25:17.339" v="157" actId="14100"/>
-        <pc:sldMkLst>
-          <pc:docMk/>
-          <pc:sldMk cId="2807739620" sldId="275"/>
-        </pc:sldMkLst>
-        <pc:spChg chg="del">
-          <ac:chgData name="vaibhav bhosle" userId="68d2ea067cb66f68" providerId="LiveId" clId="{CF6C4CAE-DFEF-42E7-ADFF-DEFD7B47D145}" dt="2024-02-08T10:25:14.461" v="156" actId="21"/>
-          <ac:spMkLst>
-            <pc:docMk/>
-            <pc:sldMk cId="2807739620" sldId="275"/>
-            <ac:spMk id="2" creationId="{7223B58A-95D0-C587-BD51-00A5A27C44F0}"/>
-          </ac:spMkLst>
-        </pc:spChg>
-        <pc:spChg chg="del">
-          <ac:chgData name="vaibhav bhosle" userId="68d2ea067cb66f68" providerId="LiveId" clId="{CF6C4CAE-DFEF-42E7-ADFF-DEFD7B47D145}" dt="2024-02-08T10:23:11.817" v="144" actId="931"/>
-          <ac:spMkLst>
-            <pc:docMk/>
-            <pc:sldMk cId="2807739620" sldId="275"/>
-            <ac:spMk id="3" creationId="{F9FD7CC9-0057-C020-821B-2AA13CF84C08}"/>
-          </ac:spMkLst>
-        </pc:spChg>
-        <pc:picChg chg="add mod">
-          <ac:chgData name="vaibhav bhosle" userId="68d2ea067cb66f68" providerId="LiveId" clId="{CF6C4CAE-DFEF-42E7-ADFF-DEFD7B47D145}" dt="2024-02-08T10:25:17.339" v="157" actId="14100"/>
-          <ac:picMkLst>
-            <pc:docMk/>
-            <pc:sldMk cId="2807739620" sldId="275"/>
-            <ac:picMk id="5" creationId="{A83C4D45-D172-94E2-A6EC-29A9025D035C}"/>
-          </ac:picMkLst>
-        </pc:picChg>
-      </pc:sldChg>
-      <pc:sldChg chg="addSp delSp modSp new mod ord">
-        <pc:chgData name="vaibhav bhosle" userId="68d2ea067cb66f68" providerId="LiveId" clId="{CF6C4CAE-DFEF-42E7-ADFF-DEFD7B47D145}" dt="2024-02-08T10:25:44.852" v="161"/>
-        <pc:sldMkLst>
-          <pc:docMk/>
-          <pc:sldMk cId="1786302171" sldId="276"/>
-        </pc:sldMkLst>
-        <pc:spChg chg="del">
-          <ac:chgData name="vaibhav bhosle" userId="68d2ea067cb66f68" providerId="LiveId" clId="{CF6C4CAE-DFEF-42E7-ADFF-DEFD7B47D145}" dt="2024-02-08T10:25:23.988" v="158" actId="478"/>
-          <ac:spMkLst>
-            <pc:docMk/>
-            <pc:sldMk cId="1786302171" sldId="276"/>
-            <ac:spMk id="2" creationId="{AC563809-96CD-3B3B-809D-C756F9354757}"/>
-          </ac:spMkLst>
-        </pc:spChg>
-        <pc:spChg chg="del">
-          <ac:chgData name="vaibhav bhosle" userId="68d2ea067cb66f68" providerId="LiveId" clId="{CF6C4CAE-DFEF-42E7-ADFF-DEFD7B47D145}" dt="2024-02-08T10:23:34.376" v="147" actId="931"/>
-          <ac:spMkLst>
-            <pc:docMk/>
-            <pc:sldMk cId="1786302171" sldId="276"/>
-            <ac:spMk id="3" creationId="{88FCA136-8E94-D811-6BC5-508F0D550AFB}"/>
-          </ac:spMkLst>
-        </pc:spChg>
-        <pc:picChg chg="add mod">
-          <ac:chgData name="vaibhav bhosle" userId="68d2ea067cb66f68" providerId="LiveId" clId="{CF6C4CAE-DFEF-42E7-ADFF-DEFD7B47D145}" dt="2024-02-08T10:25:27.045" v="159" actId="14100"/>
-          <ac:picMkLst>
-            <pc:docMk/>
-            <pc:sldMk cId="1786302171" sldId="276"/>
-            <ac:picMk id="5" creationId="{DF4CB1C0-8AF4-8847-EB61-D754B6ADB97B}"/>
-          </ac:picMkLst>
-        </pc:picChg>
-      </pc:sldChg>
-    </pc:docChg>
-  </pc:docChgLst>
-</pc:chgInfo>
-</file>
-
 <file path=ppt/notesMasters/notesMaster1.xml><?xml version="1.0" encoding="utf-8"?>
 <p:notesMaster xmlns:a="http://schemas.openxmlformats.org/drawingml/2006/main" xmlns:r="http://schemas.openxmlformats.org/officeDocument/2006/relationships" xmlns:p="http://schemas.openxmlformats.org/presentationml/2006/main">
   <p:cSld>
@@ -532,7 +223,7 @@
           <a:p>
             <a:fld id="{F488D1C0-1F46-4C96-A529-E7446B738FFE}" type="datetimeFigureOut">
               <a:rPr lang="en-AU" smtClean="0"/>
-              <a:t>8/02/2024</a:t>
+              <a:t>11/02/2024</a:t>
             </a:fld>
             <a:endParaRPr lang="en-AU"/>
           </a:p>
@@ -884,6 +575,603 @@
 </p:notes>
 </file>
 
+<file path=ppt/notesSlides/notesSlide10.xml><?xml version="1.0" encoding="utf-8"?>
+<p:notes xmlns:a="http://schemas.openxmlformats.org/drawingml/2006/main" xmlns:r="http://schemas.openxmlformats.org/officeDocument/2006/relationships" xmlns:p="http://schemas.openxmlformats.org/presentationml/2006/main">
+  <p:cSld>
+    <p:spTree>
+      <p:nvGrpSpPr>
+        <p:cNvPr id="1" name=""/>
+        <p:cNvGrpSpPr/>
+        <p:nvPr/>
+      </p:nvGrpSpPr>
+      <p:grpSpPr>
+        <a:xfrm>
+          <a:off x="0" y="0"/>
+          <a:ext cx="0" cy="0"/>
+          <a:chOff x="0" y="0"/>
+          <a:chExt cx="0" cy="0"/>
+        </a:xfrm>
+      </p:grpSpPr>
+      <p:sp>
+        <p:nvSpPr>
+          <p:cNvPr id="2" name="Slide Image Placeholder 1"/>
+          <p:cNvSpPr>
+            <a:spLocks noGrp="1" noRot="1" noChangeAspect="1"/>
+          </p:cNvSpPr>
+          <p:nvPr>
+            <p:ph type="sldImg"/>
+          </p:nvPr>
+        </p:nvSpPr>
+        <p:spPr/>
+      </p:sp>
+      <p:sp>
+        <p:nvSpPr>
+          <p:cNvPr id="3" name="Notes Placeholder 2"/>
+          <p:cNvSpPr>
+            <a:spLocks noGrp="1"/>
+          </p:cNvSpPr>
+          <p:nvPr>
+            <p:ph type="body" idx="1"/>
+          </p:nvPr>
+        </p:nvSpPr>
+        <p:spPr/>
+        <p:txBody>
+          <a:bodyPr/>
+          <a:lstStyle/>
+          <a:p>
+            <a:r>
+              <a:rPr lang="en-AU" dirty="0"/>
+              <a:t>It is evident with the above graph that Casey has the greatest number of open spaces and schools.</a:t>
+            </a:r>
+          </a:p>
+          <a:p>
+            <a:endParaRPr lang="en-AU" dirty="0"/>
+          </a:p>
+          <a:p>
+            <a:pPr marL="0" marR="0" lvl="0" indent="0" algn="l" defTabSz="914400" rtl="0" eaLnBrk="1" fontAlgn="auto" latinLnBrk="0" hangingPunct="1">
+              <a:lnSpc>
+                <a:spcPct val="100000"/>
+              </a:lnSpc>
+              <a:spcBef>
+                <a:spcPts val="0"/>
+              </a:spcBef>
+              <a:spcAft>
+                <a:spcPts val="0"/>
+              </a:spcAft>
+              <a:buClrTx/>
+              <a:buSzTx/>
+              <a:buFontTx/>
+              <a:buNone/>
+              <a:tabLst/>
+              <a:defRPr/>
+            </a:pPr>
+            <a:r>
+              <a:rPr lang="en-US" dirty="0"/>
+              <a:t>Last slide </a:t>
+            </a:r>
+            <a:r>
+              <a:rPr lang="en-US"/>
+              <a:t>– Laura </a:t>
+            </a:r>
+            <a:r>
+              <a:rPr lang="en-US" dirty="0"/>
+              <a:t>– Over </a:t>
+            </a:r>
+            <a:r>
+              <a:rPr lang="en-US"/>
+              <a:t>to John</a:t>
+            </a:r>
+            <a:endParaRPr lang="en-AU" dirty="0"/>
+          </a:p>
+          <a:p>
+            <a:endParaRPr lang="en-AU" dirty="0"/>
+          </a:p>
+        </p:txBody>
+      </p:sp>
+      <p:sp>
+        <p:nvSpPr>
+          <p:cNvPr id="4" name="Slide Number Placeholder 3"/>
+          <p:cNvSpPr>
+            <a:spLocks noGrp="1"/>
+          </p:cNvSpPr>
+          <p:nvPr>
+            <p:ph type="sldNum" sz="quarter" idx="5"/>
+          </p:nvPr>
+        </p:nvSpPr>
+        <p:spPr/>
+        <p:txBody>
+          <a:bodyPr/>
+          <a:lstStyle/>
+          <a:p>
+            <a:fld id="{D2EC087D-094B-4121-A536-202E43873E76}" type="slidenum">
+              <a:rPr lang="en-AU" smtClean="0"/>
+              <a:t>12</a:t>
+            </a:fld>
+            <a:endParaRPr lang="en-AU"/>
+          </a:p>
+        </p:txBody>
+      </p:sp>
+    </p:spTree>
+    <p:extLst>
+      <p:ext uri="{BB962C8B-B14F-4D97-AF65-F5344CB8AC3E}">
+        <p14:creationId xmlns:p14="http://schemas.microsoft.com/office/powerpoint/2010/main" val="1935141170"/>
+      </p:ext>
+    </p:extLst>
+  </p:cSld>
+  <p:clrMapOvr>
+    <a:masterClrMapping/>
+  </p:clrMapOvr>
+</p:notes>
+</file>
+
+<file path=ppt/notesSlides/notesSlide11.xml><?xml version="1.0" encoding="utf-8"?>
+<p:notes xmlns:a="http://schemas.openxmlformats.org/drawingml/2006/main" xmlns:r="http://schemas.openxmlformats.org/officeDocument/2006/relationships" xmlns:p="http://schemas.openxmlformats.org/presentationml/2006/main">
+  <p:cSld>
+    <p:spTree>
+      <p:nvGrpSpPr>
+        <p:cNvPr id="1" name=""/>
+        <p:cNvGrpSpPr/>
+        <p:nvPr/>
+      </p:nvGrpSpPr>
+      <p:grpSpPr>
+        <a:xfrm>
+          <a:off x="0" y="0"/>
+          <a:ext cx="0" cy="0"/>
+          <a:chOff x="0" y="0"/>
+          <a:chExt cx="0" cy="0"/>
+        </a:xfrm>
+      </p:grpSpPr>
+      <p:sp>
+        <p:nvSpPr>
+          <p:cNvPr id="2" name="Slide Image Placeholder 1"/>
+          <p:cNvSpPr>
+            <a:spLocks noGrp="1" noRot="1" noChangeAspect="1"/>
+          </p:cNvSpPr>
+          <p:nvPr>
+            <p:ph type="sldImg"/>
+          </p:nvPr>
+        </p:nvSpPr>
+        <p:spPr/>
+      </p:sp>
+      <p:sp>
+        <p:nvSpPr>
+          <p:cNvPr id="3" name="Notes Placeholder 2"/>
+          <p:cNvSpPr>
+            <a:spLocks noGrp="1"/>
+          </p:cNvSpPr>
+          <p:nvPr>
+            <p:ph type="body" idx="1"/>
+          </p:nvPr>
+        </p:nvSpPr>
+        <p:spPr/>
+        <p:txBody>
+          <a:bodyPr/>
+          <a:lstStyle/>
+          <a:p>
+            <a:r>
+              <a:rPr lang="en-US" dirty="0"/>
+              <a:t>CASEY</a:t>
+            </a:r>
+          </a:p>
+          <a:p>
+            <a:r>
+              <a:rPr lang="en-US" dirty="0"/>
+              <a:t>1800 Open spaces</a:t>
+            </a:r>
+          </a:p>
+          <a:p>
+            <a:r>
+              <a:rPr lang="en-US" dirty="0"/>
+              <a:t>83 Schools</a:t>
+            </a:r>
+          </a:p>
+          <a:p>
+            <a:r>
+              <a:rPr lang="en-US" dirty="0"/>
+              <a:t>+9273 Population</a:t>
+            </a:r>
+          </a:p>
+          <a:p>
+            <a:r>
+              <a:rPr lang="en-US" dirty="0"/>
+              <a:t>925 persons/km2</a:t>
+            </a:r>
+          </a:p>
+          <a:p>
+            <a:pPr marL="0" marR="0" lvl="0" indent="0" algn="l" defTabSz="914400" rtl="0" eaLnBrk="1" fontAlgn="auto" latinLnBrk="0" hangingPunct="1">
+              <a:lnSpc>
+                <a:spcPct val="100000"/>
+              </a:lnSpc>
+              <a:spcBef>
+                <a:spcPts val="0"/>
+              </a:spcBef>
+              <a:spcAft>
+                <a:spcPts val="0"/>
+              </a:spcAft>
+              <a:buClrTx/>
+              <a:buSzTx/>
+              <a:buFontTx/>
+              <a:buNone/>
+              <a:tabLst/>
+              <a:defRPr/>
+            </a:pPr>
+            <a:r>
+              <a:rPr lang="en-US" dirty="0"/>
+              <a:t>Above 60</a:t>
+            </a:r>
+            <a:r>
+              <a:rPr lang="en-US" baseline="30000" dirty="0"/>
+              <a:t>th</a:t>
+            </a:r>
+            <a:r>
+              <a:rPr lang="en-US" dirty="0"/>
+              <a:t> percentile pop. density</a:t>
+            </a:r>
+          </a:p>
+          <a:p>
+            <a:endParaRPr lang="en-US" dirty="0"/>
+          </a:p>
+          <a:p>
+            <a:r>
+              <a:rPr lang="en-US" dirty="0"/>
+              <a:t>YARRA RANGES</a:t>
+            </a:r>
+          </a:p>
+          <a:p>
+            <a:pPr marL="0" marR="0" lvl="0" indent="0" algn="l" defTabSz="914400" rtl="0" eaLnBrk="1" fontAlgn="auto" latinLnBrk="0" hangingPunct="1">
+              <a:lnSpc>
+                <a:spcPct val="100000"/>
+              </a:lnSpc>
+              <a:spcBef>
+                <a:spcPts val="0"/>
+              </a:spcBef>
+              <a:spcAft>
+                <a:spcPts val="0"/>
+              </a:spcAft>
+              <a:buClrTx/>
+              <a:buSzTx/>
+              <a:buFontTx/>
+              <a:buNone/>
+              <a:tabLst/>
+              <a:defRPr/>
+            </a:pPr>
+            <a:r>
+              <a:rPr lang="en-US" dirty="0"/>
+              <a:t>2300 Open Spaces</a:t>
+            </a:r>
+          </a:p>
+          <a:p>
+            <a:pPr marL="0" marR="0" lvl="0" indent="0" algn="l" defTabSz="914400" rtl="0" eaLnBrk="1" fontAlgn="auto" latinLnBrk="0" hangingPunct="1">
+              <a:lnSpc>
+                <a:spcPct val="100000"/>
+              </a:lnSpc>
+              <a:spcBef>
+                <a:spcPts val="0"/>
+              </a:spcBef>
+              <a:spcAft>
+                <a:spcPts val="0"/>
+              </a:spcAft>
+              <a:buClrTx/>
+              <a:buSzTx/>
+              <a:buFontTx/>
+              <a:buNone/>
+              <a:tabLst/>
+              <a:defRPr/>
+            </a:pPr>
+            <a:r>
+              <a:rPr lang="en-US" dirty="0"/>
+              <a:t>80 Schools</a:t>
+            </a:r>
+          </a:p>
+          <a:p>
+            <a:pPr marL="0" marR="0" lvl="0" indent="0" algn="l" defTabSz="914400" rtl="0" eaLnBrk="1" fontAlgn="auto" latinLnBrk="0" hangingPunct="1">
+              <a:lnSpc>
+                <a:spcPct val="100000"/>
+              </a:lnSpc>
+              <a:spcBef>
+                <a:spcPts val="0"/>
+              </a:spcBef>
+              <a:spcAft>
+                <a:spcPts val="0"/>
+              </a:spcAft>
+              <a:buClrTx/>
+              <a:buSzTx/>
+              <a:buFontTx/>
+              <a:buNone/>
+              <a:tabLst/>
+              <a:defRPr/>
+            </a:pPr>
+            <a:r>
+              <a:rPr lang="en-US" dirty="0"/>
+              <a:t>-33 Population</a:t>
+            </a:r>
+          </a:p>
+          <a:p>
+            <a:pPr marL="0" marR="0" lvl="0" indent="0" algn="l" defTabSz="914400" rtl="0" eaLnBrk="1" fontAlgn="auto" latinLnBrk="0" hangingPunct="1">
+              <a:lnSpc>
+                <a:spcPct val="100000"/>
+              </a:lnSpc>
+              <a:spcBef>
+                <a:spcPts val="0"/>
+              </a:spcBef>
+              <a:spcAft>
+                <a:spcPts val="0"/>
+              </a:spcAft>
+              <a:buClrTx/>
+              <a:buSzTx/>
+              <a:buFontTx/>
+              <a:buNone/>
+              <a:tabLst/>
+              <a:defRPr/>
+            </a:pPr>
+            <a:r>
+              <a:rPr lang="en-US" dirty="0"/>
+              <a:t>63 persons/km2</a:t>
+            </a:r>
+          </a:p>
+          <a:p>
+            <a:pPr marL="0" marR="0" lvl="0" indent="0" algn="l" defTabSz="914400" rtl="0" eaLnBrk="1" fontAlgn="auto" latinLnBrk="0" hangingPunct="1">
+              <a:lnSpc>
+                <a:spcPct val="100000"/>
+              </a:lnSpc>
+              <a:spcBef>
+                <a:spcPts val="0"/>
+              </a:spcBef>
+              <a:spcAft>
+                <a:spcPts val="0"/>
+              </a:spcAft>
+              <a:buClrTx/>
+              <a:buSzTx/>
+              <a:buFontTx/>
+              <a:buNone/>
+              <a:tabLst/>
+              <a:defRPr/>
+            </a:pPr>
+            <a:r>
+              <a:rPr lang="en-US" dirty="0"/>
+              <a:t>99</a:t>
+            </a:r>
+            <a:r>
+              <a:rPr lang="en-US" baseline="30000" dirty="0"/>
+              <a:t>th</a:t>
+            </a:r>
+            <a:r>
+              <a:rPr lang="en-US" dirty="0"/>
+              <a:t> percentile pop. density</a:t>
+            </a:r>
+          </a:p>
+          <a:p>
+            <a:pPr marL="0" marR="0" lvl="0" indent="0" algn="l" defTabSz="914400" rtl="0" eaLnBrk="1" fontAlgn="auto" latinLnBrk="0" hangingPunct="1">
+              <a:lnSpc>
+                <a:spcPct val="100000"/>
+              </a:lnSpc>
+              <a:spcBef>
+                <a:spcPts val="0"/>
+              </a:spcBef>
+              <a:spcAft>
+                <a:spcPts val="0"/>
+              </a:spcAft>
+              <a:buClrTx/>
+              <a:buSzTx/>
+              <a:buFontTx/>
+              <a:buNone/>
+              <a:tabLst/>
+              <a:defRPr/>
+            </a:pPr>
+            <a:endParaRPr lang="en-US" dirty="0"/>
+          </a:p>
+          <a:p>
+            <a:pPr marL="0" marR="0" lvl="0" indent="0" algn="l" defTabSz="914400" rtl="0" eaLnBrk="1" fontAlgn="auto" latinLnBrk="0" hangingPunct="1">
+              <a:lnSpc>
+                <a:spcPct val="100000"/>
+              </a:lnSpc>
+              <a:spcBef>
+                <a:spcPts val="0"/>
+              </a:spcBef>
+              <a:spcAft>
+                <a:spcPts val="0"/>
+              </a:spcAft>
+              <a:buClrTx/>
+              <a:buSzTx/>
+              <a:buFontTx/>
+              <a:buNone/>
+              <a:tabLst/>
+              <a:defRPr/>
+            </a:pPr>
+            <a:endParaRPr lang="en-US" dirty="0"/>
+          </a:p>
+          <a:p>
+            <a:r>
+              <a:rPr lang="en-US" dirty="0"/>
+              <a:t>HUME</a:t>
+            </a:r>
+          </a:p>
+          <a:p>
+            <a:r>
+              <a:rPr lang="en-US" dirty="0"/>
+              <a:t>1300 Open Spaces</a:t>
+            </a:r>
+          </a:p>
+          <a:p>
+            <a:r>
+              <a:rPr lang="en-US" dirty="0"/>
+              <a:t>64 Schools</a:t>
+            </a:r>
+          </a:p>
+          <a:p>
+            <a:r>
+              <a:rPr lang="en-US" dirty="0"/>
+              <a:t>+6067 Population</a:t>
+            </a:r>
+          </a:p>
+          <a:p>
+            <a:r>
+              <a:rPr lang="en-US" dirty="0"/>
+              <a:t>503 persons/km2</a:t>
+            </a:r>
+          </a:p>
+          <a:p>
+            <a:pPr marL="0" marR="0" lvl="0" indent="0" algn="l" defTabSz="914400" rtl="0" eaLnBrk="1" fontAlgn="auto" latinLnBrk="0" hangingPunct="1">
+              <a:lnSpc>
+                <a:spcPct val="100000"/>
+              </a:lnSpc>
+              <a:spcBef>
+                <a:spcPts val="0"/>
+              </a:spcBef>
+              <a:spcAft>
+                <a:spcPts val="0"/>
+              </a:spcAft>
+              <a:buClrTx/>
+              <a:buSzTx/>
+              <a:buFontTx/>
+              <a:buNone/>
+              <a:tabLst/>
+              <a:defRPr/>
+            </a:pPr>
+            <a:r>
+              <a:rPr lang="en-US" dirty="0"/>
+              <a:t>Above 60</a:t>
+            </a:r>
+            <a:r>
+              <a:rPr lang="en-US" baseline="30000" dirty="0"/>
+              <a:t>th</a:t>
+            </a:r>
+            <a:r>
+              <a:rPr lang="en-US" dirty="0"/>
+              <a:t> percentile pop. density</a:t>
+            </a:r>
+          </a:p>
+          <a:p>
+            <a:endParaRPr lang="en-AU" dirty="0"/>
+          </a:p>
+        </p:txBody>
+      </p:sp>
+      <p:sp>
+        <p:nvSpPr>
+          <p:cNvPr id="4" name="Slide Number Placeholder 3"/>
+          <p:cNvSpPr>
+            <a:spLocks noGrp="1"/>
+          </p:cNvSpPr>
+          <p:nvPr>
+            <p:ph type="sldNum" sz="quarter" idx="5"/>
+          </p:nvPr>
+        </p:nvSpPr>
+        <p:spPr/>
+        <p:txBody>
+          <a:bodyPr/>
+          <a:lstStyle/>
+          <a:p>
+            <a:fld id="{D2EC087D-094B-4121-A536-202E43873E76}" type="slidenum">
+              <a:rPr lang="en-AU" smtClean="0"/>
+              <a:t>13</a:t>
+            </a:fld>
+            <a:endParaRPr lang="en-AU"/>
+          </a:p>
+        </p:txBody>
+      </p:sp>
+    </p:spTree>
+    <p:extLst>
+      <p:ext uri="{BB962C8B-B14F-4D97-AF65-F5344CB8AC3E}">
+        <p14:creationId xmlns:p14="http://schemas.microsoft.com/office/powerpoint/2010/main" val="182198615"/>
+      </p:ext>
+    </p:extLst>
+  </p:cSld>
+  <p:clrMapOvr>
+    <a:masterClrMapping/>
+  </p:clrMapOvr>
+</p:notes>
+</file>
+
+<file path=ppt/notesSlides/notesSlide12.xml><?xml version="1.0" encoding="utf-8"?>
+<p:notes xmlns:a="http://schemas.openxmlformats.org/drawingml/2006/main" xmlns:r="http://schemas.openxmlformats.org/officeDocument/2006/relationships" xmlns:p="http://schemas.openxmlformats.org/presentationml/2006/main">
+  <p:cSld>
+    <p:spTree>
+      <p:nvGrpSpPr>
+        <p:cNvPr id="1" name=""/>
+        <p:cNvGrpSpPr/>
+        <p:nvPr/>
+      </p:nvGrpSpPr>
+      <p:grpSpPr>
+        <a:xfrm>
+          <a:off x="0" y="0"/>
+          <a:ext cx="0" cy="0"/>
+          <a:chOff x="0" y="0"/>
+          <a:chExt cx="0" cy="0"/>
+        </a:xfrm>
+      </p:grpSpPr>
+      <p:sp>
+        <p:nvSpPr>
+          <p:cNvPr id="2" name="Slide Image Placeholder 1"/>
+          <p:cNvSpPr>
+            <a:spLocks noGrp="1" noRot="1" noChangeAspect="1"/>
+          </p:cNvSpPr>
+          <p:nvPr>
+            <p:ph type="sldImg"/>
+          </p:nvPr>
+        </p:nvSpPr>
+        <p:spPr/>
+      </p:sp>
+      <p:sp>
+        <p:nvSpPr>
+          <p:cNvPr id="3" name="Notes Placeholder 2"/>
+          <p:cNvSpPr>
+            <a:spLocks noGrp="1"/>
+          </p:cNvSpPr>
+          <p:nvPr>
+            <p:ph type="body" idx="1"/>
+          </p:nvPr>
+        </p:nvSpPr>
+        <p:spPr/>
+        <p:txBody>
+          <a:bodyPr/>
+          <a:lstStyle/>
+          <a:p>
+            <a:endParaRPr lang="en-US" sz="1200" dirty="0"/>
+          </a:p>
+          <a:p>
+            <a:endParaRPr lang="en-US" dirty="0"/>
+          </a:p>
+          <a:p>
+            <a:endParaRPr lang="en-AU" dirty="0"/>
+          </a:p>
+        </p:txBody>
+      </p:sp>
+      <p:sp>
+        <p:nvSpPr>
+          <p:cNvPr id="4" name="Slide Number Placeholder 3"/>
+          <p:cNvSpPr>
+            <a:spLocks noGrp="1"/>
+          </p:cNvSpPr>
+          <p:nvPr>
+            <p:ph type="sldNum" sz="quarter" idx="5"/>
+          </p:nvPr>
+        </p:nvSpPr>
+        <p:spPr/>
+        <p:txBody>
+          <a:bodyPr/>
+          <a:lstStyle/>
+          <a:p>
+            <a:fld id="{D2EC087D-094B-4121-A536-202E43873E76}" type="slidenum">
+              <a:rPr lang="en-AU" smtClean="0"/>
+              <a:t>14</a:t>
+            </a:fld>
+            <a:endParaRPr lang="en-AU"/>
+          </a:p>
+        </p:txBody>
+      </p:sp>
+    </p:spTree>
+    <p:extLst>
+      <p:ext uri="{BB962C8B-B14F-4D97-AF65-F5344CB8AC3E}">
+        <p14:creationId xmlns:p14="http://schemas.microsoft.com/office/powerpoint/2010/main" val="1511425019"/>
+      </p:ext>
+    </p:extLst>
+  </p:cSld>
+  <p:clrMapOvr>
+    <a:masterClrMapping/>
+  </p:clrMapOvr>
+</p:notes>
+</file>
+
 <file path=ppt/notesSlides/notesSlide2.xml><?xml version="1.0" encoding="utf-8"?>
 <p:notes xmlns:a="http://schemas.openxmlformats.org/drawingml/2006/main" xmlns:r="http://schemas.openxmlformats.org/officeDocument/2006/relationships" xmlns:p="http://schemas.openxmlformats.org/presentationml/2006/main">
   <p:cSld>
@@ -1567,52 +1855,7 @@
           <a:bodyPr/>
           <a:lstStyle/>
           <a:p>
-            <a:r>
-              <a:rPr lang="en-AU" dirty="0"/>
-              <a:t>It is evident with the above graph that Casey has the greatest number of open spaces and schools.</a:t>
-            </a:r>
-          </a:p>
-          <a:p>
-            <a:endParaRPr lang="en-AU" dirty="0"/>
-          </a:p>
-          <a:p>
-            <a:pPr marL="0" marR="0" lvl="0" indent="0" algn="l" defTabSz="914400" rtl="0" eaLnBrk="1" fontAlgn="auto" latinLnBrk="0" hangingPunct="1">
-              <a:lnSpc>
-                <a:spcPct val="100000"/>
-              </a:lnSpc>
-              <a:spcBef>
-                <a:spcPts val="0"/>
-              </a:spcBef>
-              <a:spcAft>
-                <a:spcPts val="0"/>
-              </a:spcAft>
-              <a:buClrTx/>
-              <a:buSzTx/>
-              <a:buFontTx/>
-              <a:buNone/>
-              <a:tabLst/>
-              <a:defRPr/>
-            </a:pPr>
-            <a:r>
-              <a:rPr lang="en-US" dirty="0"/>
-              <a:t>Last slide </a:t>
-            </a:r>
-            <a:r>
-              <a:rPr lang="en-US"/>
-              <a:t>– Laura </a:t>
-            </a:r>
-            <a:r>
-              <a:rPr lang="en-US" dirty="0"/>
-              <a:t>– Over </a:t>
-            </a:r>
-            <a:r>
-              <a:rPr lang="en-US"/>
-              <a:t>to John</a:t>
-            </a:r>
-            <a:endParaRPr lang="en-AU" dirty="0"/>
-          </a:p>
-          <a:p>
-            <a:endParaRPr lang="en-AU" dirty="0"/>
+            <a:endParaRPr lang="en-AU"/>
           </a:p>
         </p:txBody>
       </p:sp>
@@ -1633,7 +1876,7 @@
           <a:p>
             <a:fld id="{D2EC087D-094B-4121-A536-202E43873E76}" type="slidenum">
               <a:rPr lang="en-AU" smtClean="0"/>
-              <a:t>12</a:t>
+              <a:t>10</a:t>
             </a:fld>
             <a:endParaRPr lang="en-AU"/>
           </a:p>
@@ -1642,7 +1885,91 @@
     </p:spTree>
     <p:extLst>
       <p:ext uri="{BB962C8B-B14F-4D97-AF65-F5344CB8AC3E}">
-        <p14:creationId xmlns:p14="http://schemas.microsoft.com/office/powerpoint/2010/main" val="1935141170"/>
+        <p14:creationId xmlns:p14="http://schemas.microsoft.com/office/powerpoint/2010/main" val="2488075353"/>
+      </p:ext>
+    </p:extLst>
+  </p:cSld>
+  <p:clrMapOvr>
+    <a:masterClrMapping/>
+  </p:clrMapOvr>
+</p:notes>
+</file>
+
+<file path=ppt/notesSlides/notesSlide9.xml><?xml version="1.0" encoding="utf-8"?>
+<p:notes xmlns:a="http://schemas.openxmlformats.org/drawingml/2006/main" xmlns:r="http://schemas.openxmlformats.org/officeDocument/2006/relationships" xmlns:p="http://schemas.openxmlformats.org/presentationml/2006/main">
+  <p:cSld>
+    <p:spTree>
+      <p:nvGrpSpPr>
+        <p:cNvPr id="1" name=""/>
+        <p:cNvGrpSpPr/>
+        <p:nvPr/>
+      </p:nvGrpSpPr>
+      <p:grpSpPr>
+        <a:xfrm>
+          <a:off x="0" y="0"/>
+          <a:ext cx="0" cy="0"/>
+          <a:chOff x="0" y="0"/>
+          <a:chExt cx="0" cy="0"/>
+        </a:xfrm>
+      </p:grpSpPr>
+      <p:sp>
+        <p:nvSpPr>
+          <p:cNvPr id="2" name="Slide Image Placeholder 1"/>
+          <p:cNvSpPr>
+            <a:spLocks noGrp="1" noRot="1" noChangeAspect="1"/>
+          </p:cNvSpPr>
+          <p:nvPr>
+            <p:ph type="sldImg"/>
+          </p:nvPr>
+        </p:nvSpPr>
+        <p:spPr/>
+      </p:sp>
+      <p:sp>
+        <p:nvSpPr>
+          <p:cNvPr id="3" name="Notes Placeholder 2"/>
+          <p:cNvSpPr>
+            <a:spLocks noGrp="1"/>
+          </p:cNvSpPr>
+          <p:nvPr>
+            <p:ph type="body" idx="1"/>
+          </p:nvPr>
+        </p:nvSpPr>
+        <p:spPr/>
+        <p:txBody>
+          <a:bodyPr/>
+          <a:lstStyle/>
+          <a:p>
+            <a:endParaRPr lang="en-AU"/>
+          </a:p>
+        </p:txBody>
+      </p:sp>
+      <p:sp>
+        <p:nvSpPr>
+          <p:cNvPr id="4" name="Slide Number Placeholder 3"/>
+          <p:cNvSpPr>
+            <a:spLocks noGrp="1"/>
+          </p:cNvSpPr>
+          <p:nvPr>
+            <p:ph type="sldNum" sz="quarter" idx="5"/>
+          </p:nvPr>
+        </p:nvSpPr>
+        <p:spPr/>
+        <p:txBody>
+          <a:bodyPr/>
+          <a:lstStyle/>
+          <a:p>
+            <a:fld id="{D2EC087D-094B-4121-A536-202E43873E76}" type="slidenum">
+              <a:rPr lang="en-AU" smtClean="0"/>
+              <a:t>11</a:t>
+            </a:fld>
+            <a:endParaRPr lang="en-AU"/>
+          </a:p>
+        </p:txBody>
+      </p:sp>
+    </p:spTree>
+    <p:extLst>
+      <p:ext uri="{BB962C8B-B14F-4D97-AF65-F5344CB8AC3E}">
+        <p14:creationId xmlns:p14="http://schemas.microsoft.com/office/powerpoint/2010/main" val="4208164843"/>
       </p:ext>
     </p:extLst>
   </p:cSld>
@@ -1831,7 +2158,7 @@
           <a:p>
             <a:fld id="{5BCAD085-E8A6-8845-BD4E-CB4CCA059FC4}" type="datetimeFigureOut">
               <a:rPr lang="en-US" smtClean="0"/>
-              <a:t>2/8/2024</a:t>
+              <a:t>2/11/2024</a:t>
             </a:fld>
             <a:endParaRPr lang="en-US"/>
           </a:p>
@@ -1999,7 +2326,7 @@
           <a:p>
             <a:fld id="{5BCAD085-E8A6-8845-BD4E-CB4CCA059FC4}" type="datetimeFigureOut">
               <a:rPr lang="en-US" smtClean="0"/>
-              <a:t>2/8/2024</a:t>
+              <a:t>2/11/2024</a:t>
             </a:fld>
             <a:endParaRPr lang="en-US"/>
           </a:p>
@@ -2177,7 +2504,7 @@
           <a:p>
             <a:fld id="{5BCAD085-E8A6-8845-BD4E-CB4CCA059FC4}" type="datetimeFigureOut">
               <a:rPr lang="en-US" smtClean="0"/>
-              <a:t>2/8/2024</a:t>
+              <a:t>2/11/2024</a:t>
             </a:fld>
             <a:endParaRPr lang="en-US"/>
           </a:p>
@@ -2345,7 +2672,7 @@
           <a:p>
             <a:fld id="{5BCAD085-E8A6-8845-BD4E-CB4CCA059FC4}" type="datetimeFigureOut">
               <a:rPr lang="en-US" smtClean="0"/>
-              <a:t>2/8/2024</a:t>
+              <a:t>2/11/2024</a:t>
             </a:fld>
             <a:endParaRPr lang="en-US"/>
           </a:p>
@@ -2590,7 +2917,7 @@
           <a:p>
             <a:fld id="{5BCAD085-E8A6-8845-BD4E-CB4CCA059FC4}" type="datetimeFigureOut">
               <a:rPr lang="en-US" smtClean="0"/>
-              <a:t>2/8/2024</a:t>
+              <a:t>2/11/2024</a:t>
             </a:fld>
             <a:endParaRPr lang="en-US"/>
           </a:p>
@@ -2875,7 +3202,7 @@
           <a:p>
             <a:fld id="{5BCAD085-E8A6-8845-BD4E-CB4CCA059FC4}" type="datetimeFigureOut">
               <a:rPr lang="en-US" smtClean="0"/>
-              <a:t>2/8/2024</a:t>
+              <a:t>2/11/2024</a:t>
             </a:fld>
             <a:endParaRPr lang="en-US"/>
           </a:p>
@@ -3294,7 +3621,7 @@
           <a:p>
             <a:fld id="{5BCAD085-E8A6-8845-BD4E-CB4CCA059FC4}" type="datetimeFigureOut">
               <a:rPr lang="en-US" smtClean="0"/>
-              <a:t>2/8/2024</a:t>
+              <a:t>2/11/2024</a:t>
             </a:fld>
             <a:endParaRPr lang="en-US"/>
           </a:p>
@@ -3411,7 +3738,7 @@
           <a:p>
             <a:fld id="{5BCAD085-E8A6-8845-BD4E-CB4CCA059FC4}" type="datetimeFigureOut">
               <a:rPr lang="en-US" smtClean="0"/>
-              <a:t>2/8/2024</a:t>
+              <a:t>2/11/2024</a:t>
             </a:fld>
             <a:endParaRPr lang="en-US"/>
           </a:p>
@@ -3506,7 +3833,7 @@
           <a:p>
             <a:fld id="{5BCAD085-E8A6-8845-BD4E-CB4CCA059FC4}" type="datetimeFigureOut">
               <a:rPr lang="en-US" smtClean="0"/>
-              <a:t>2/8/2024</a:t>
+              <a:t>2/11/2024</a:t>
             </a:fld>
             <a:endParaRPr lang="en-US"/>
           </a:p>
@@ -3781,7 +4108,7 @@
           <a:p>
             <a:fld id="{5BCAD085-E8A6-8845-BD4E-CB4CCA059FC4}" type="datetimeFigureOut">
               <a:rPr lang="en-US" smtClean="0"/>
-              <a:t>2/8/2024</a:t>
+              <a:t>2/11/2024</a:t>
             </a:fld>
             <a:endParaRPr lang="en-US"/>
           </a:p>
@@ -4033,7 +4360,7 @@
           <a:p>
             <a:fld id="{5BCAD085-E8A6-8845-BD4E-CB4CCA059FC4}" type="datetimeFigureOut">
               <a:rPr lang="en-US" smtClean="0"/>
-              <a:t>2/8/2024</a:t>
+              <a:t>2/11/2024</a:t>
             </a:fld>
             <a:endParaRPr lang="en-US"/>
           </a:p>
@@ -4244,7 +4571,7 @@
           <a:p>
             <a:fld id="{5BCAD085-E8A6-8845-BD4E-CB4CCA059FC4}" type="datetimeFigureOut">
               <a:rPr lang="en-US" smtClean="0"/>
-              <a:t>2/8/2024</a:t>
+              <a:t>2/11/2024</a:t>
             </a:fld>
             <a:endParaRPr lang="en-US"/>
           </a:p>
@@ -4962,7 +5289,7 @@
           </p:nvPr>
         </p:nvPicPr>
         <p:blipFill>
-          <a:blip r:embed="rId2"/>
+          <a:blip r:embed="rId3"/>
           <a:stretch>
             <a:fillRect/>
           </a:stretch>
@@ -5021,7 +5348,7 @@
           </p:nvPr>
         </p:nvPicPr>
         <p:blipFill>
-          <a:blip r:embed="rId2"/>
+          <a:blip r:embed="rId3"/>
           <a:stretch>
             <a:fillRect/>
           </a:stretch>
@@ -5170,7 +5497,12 @@
             <p:ph type="title"/>
           </p:nvPr>
         </p:nvSpPr>
-        <p:spPr/>
+        <p:spPr>
+          <a:xfrm>
+            <a:off x="457200" y="0"/>
+            <a:ext cx="8229600" cy="914400"/>
+          </a:xfrm>
+        </p:spPr>
         <p:txBody>
           <a:bodyPr>
             <a:normAutofit fontScale="90000"/>
@@ -5192,43 +5524,2140 @@
           </a:p>
         </p:txBody>
       </p:sp>
-      <p:sp>
-        <p:nvSpPr>
-          <p:cNvPr id="3" name="Content Placeholder 2"/>
-          <p:cNvSpPr>
-            <a:spLocks noGrp="1"/>
-          </p:cNvSpPr>
-          <p:nvPr>
-            <p:ph idx="1"/>
-          </p:nvPr>
-        </p:nvSpPr>
-        <p:spPr/>
-        <p:txBody>
-          <a:bodyPr>
-            <a:normAutofit/>
-          </a:bodyPr>
-          <a:lstStyle/>
-          <a:p>
-            <a:r>
-              <a:rPr lang="en-AU" sz="2000" dirty="0"/>
-              <a:t>It was evident from our project the LGA with the highest density of population will not have greater number of parks.</a:t>
-            </a:r>
-          </a:p>
-          <a:p>
-            <a:r>
-              <a:rPr lang="en-AU" sz="2000" dirty="0"/>
-              <a:t>Other factors like schools also play an important role in decision making.</a:t>
-            </a:r>
-          </a:p>
-          <a:p>
-            <a:r>
-              <a:rPr lang="en-AU" sz="2000" dirty="0"/>
-              <a:t>Our recommendation for families looking for a balanced lifestyle will be to consider Yarra ranges and Casey due to higher number of parks and schools.</a:t>
-            </a:r>
-            <a:endParaRPr sz="2000" dirty="0"/>
-          </a:p>
-        </p:txBody>
-      </p:sp>
+      <p:graphicFrame>
+        <p:nvGraphicFramePr>
+          <p:cNvPr id="5" name="Table 4">
+            <a:extLst>
+              <a:ext uri="{FF2B5EF4-FFF2-40B4-BE49-F238E27FC236}">
+                <a16:creationId xmlns:a16="http://schemas.microsoft.com/office/drawing/2014/main" id="{5A283A6E-3F1B-46E0-6249-FF73C96814D6}"/>
+              </a:ext>
+            </a:extLst>
+          </p:cNvPr>
+          <p:cNvGraphicFramePr>
+            <a:graphicFrameLocks noGrp="1"/>
+          </p:cNvGraphicFramePr>
+          <p:nvPr>
+            <p:extLst>
+              <p:ext uri="{D42A27DB-BD31-4B8C-83A1-F6EECF244321}">
+                <p14:modId xmlns:p14="http://schemas.microsoft.com/office/powerpoint/2010/main" val="422595621"/>
+              </p:ext>
+            </p:extLst>
+          </p:nvPr>
+        </p:nvGraphicFramePr>
+        <p:xfrm>
+          <a:off x="178212" y="926737"/>
+          <a:ext cx="8787575" cy="5527040"/>
+        </p:xfrm>
+        <a:graphic>
+          <a:graphicData uri="http://schemas.openxmlformats.org/drawingml/2006/table">
+            <a:tbl>
+              <a:tblPr firstRow="1" bandRow="1">
+                <a:tableStyleId>{5C22544A-7EE6-4342-B048-85BDC9FD1C3A}</a:tableStyleId>
+              </a:tblPr>
+              <a:tblGrid>
+                <a:gridCol w="2869788">
+                  <a:extLst>
+                    <a:ext uri="{9D8B030D-6E8A-4147-A177-3AD203B41FA5}">
+                      <a16:colId xmlns:a16="http://schemas.microsoft.com/office/drawing/2014/main" val="1674494052"/>
+                    </a:ext>
+                  </a:extLst>
+                </a:gridCol>
+                <a:gridCol w="3018971">
+                  <a:extLst>
+                    <a:ext uri="{9D8B030D-6E8A-4147-A177-3AD203B41FA5}">
+                      <a16:colId xmlns:a16="http://schemas.microsoft.com/office/drawing/2014/main" val="2724071861"/>
+                    </a:ext>
+                  </a:extLst>
+                </a:gridCol>
+                <a:gridCol w="2898816">
+                  <a:extLst>
+                    <a:ext uri="{9D8B030D-6E8A-4147-A177-3AD203B41FA5}">
+                      <a16:colId xmlns:a16="http://schemas.microsoft.com/office/drawing/2014/main" val="711737545"/>
+                    </a:ext>
+                  </a:extLst>
+                </a:gridCol>
+              </a:tblGrid>
+              <a:tr h="370840">
+                <a:tc gridSpan="3">
+                  <a:txBody>
+                    <a:bodyPr/>
+                    <a:lstStyle/>
+                    <a:p>
+                      <a:r>
+                        <a:rPr lang="en-US" dirty="0"/>
+                        <a:t>3-Candidate Analysis</a:t>
+                      </a:r>
+                    </a:p>
+                  </a:txBody>
+                  <a:tcPr>
+                    <a:lnL w="12700" cap="flat" cmpd="sng" algn="ctr">
+                      <a:noFill/>
+                      <a:prstDash val="solid"/>
+                      <a:round/>
+                      <a:headEnd type="none" w="med" len="med"/>
+                      <a:tailEnd type="none" w="med" len="med"/>
+                    </a:lnL>
+                    <a:lnR w="12700" cap="flat" cmpd="sng" algn="ctr">
+                      <a:noFill/>
+                      <a:prstDash val="solid"/>
+                      <a:round/>
+                      <a:headEnd type="none" w="med" len="med"/>
+                      <a:tailEnd type="none" w="med" len="med"/>
+                    </a:lnR>
+                    <a:lnB w="12700" cap="flat" cmpd="sng" algn="ctr">
+                      <a:solidFill>
+                        <a:schemeClr val="tx1"/>
+                      </a:solidFill>
+                      <a:prstDash val="solid"/>
+                      <a:round/>
+                      <a:headEnd type="none" w="med" len="med"/>
+                      <a:tailEnd type="none" w="med" len="med"/>
+                    </a:lnB>
+                  </a:tcPr>
+                </a:tc>
+                <a:tc hMerge="1">
+                  <a:txBody>
+                    <a:bodyPr/>
+                    <a:lstStyle/>
+                    <a:p>
+                      <a:endParaRPr lang="en-AU"/>
+                    </a:p>
+                  </a:txBody>
+                  <a:tcPr/>
+                </a:tc>
+                <a:tc hMerge="1">
+                  <a:txBody>
+                    <a:bodyPr/>
+                    <a:lstStyle/>
+                    <a:p>
+                      <a:endParaRPr lang="en-AU" dirty="0"/>
+                    </a:p>
+                  </a:txBody>
+                  <a:tcPr/>
+                </a:tc>
+                <a:extLst>
+                  <a:ext uri="{0D108BD9-81ED-4DB2-BD59-A6C34878D82A}">
+                    <a16:rowId xmlns:a16="http://schemas.microsoft.com/office/drawing/2014/main" val="386624370"/>
+                  </a:ext>
+                </a:extLst>
+              </a:tr>
+              <a:tr h="370840">
+                <a:tc>
+                  <a:txBody>
+                    <a:bodyPr/>
+                    <a:lstStyle/>
+                    <a:p>
+                      <a:r>
+                        <a:rPr lang="en-US" i="1" dirty="0"/>
+                        <a:t>City/Suburban</a:t>
+                      </a:r>
+                      <a:endParaRPr lang="en-AU" i="1" dirty="0"/>
+                    </a:p>
+                  </a:txBody>
+                  <a:tcPr>
+                    <a:lnL w="12700" cap="flat" cmpd="sng" algn="ctr">
+                      <a:solidFill>
+                        <a:schemeClr val="tx1"/>
+                      </a:solidFill>
+                      <a:prstDash val="solid"/>
+                      <a:round/>
+                      <a:headEnd type="none" w="med" len="med"/>
+                      <a:tailEnd type="none" w="med" len="med"/>
+                    </a:lnL>
+                    <a:lnR w="12700" cap="flat" cmpd="sng" algn="ctr">
+                      <a:solidFill>
+                        <a:schemeClr val="tx1"/>
+                      </a:solidFill>
+                      <a:prstDash val="solid"/>
+                      <a:round/>
+                      <a:headEnd type="none" w="med" len="med"/>
+                      <a:tailEnd type="none" w="med" len="med"/>
+                    </a:lnR>
+                    <a:lnT w="12700" cap="flat" cmpd="sng" algn="ctr">
+                      <a:solidFill>
+                        <a:schemeClr val="tx1"/>
+                      </a:solidFill>
+                      <a:prstDash val="solid"/>
+                      <a:round/>
+                      <a:headEnd type="none" w="med" len="med"/>
+                      <a:tailEnd type="none" w="med" len="med"/>
+                    </a:lnT>
+                    <a:lnB w="12700" cap="flat" cmpd="sng" algn="ctr">
+                      <a:solidFill>
+                        <a:schemeClr val="tx1"/>
+                      </a:solidFill>
+                      <a:prstDash val="solid"/>
+                      <a:round/>
+                      <a:headEnd type="none" w="med" len="med"/>
+                      <a:tailEnd type="none" w="med" len="med"/>
+                    </a:lnB>
+                  </a:tcPr>
+                </a:tc>
+                <a:tc>
+                  <a:txBody>
+                    <a:bodyPr/>
+                    <a:lstStyle/>
+                    <a:p>
+                      <a:r>
+                        <a:rPr lang="en-US" i="1" dirty="0"/>
+                        <a:t>Suburban/Rural</a:t>
+                      </a:r>
+                      <a:endParaRPr lang="en-AU" i="1" dirty="0"/>
+                    </a:p>
+                  </a:txBody>
+                  <a:tcPr>
+                    <a:lnL w="12700" cap="flat" cmpd="sng" algn="ctr">
+                      <a:solidFill>
+                        <a:schemeClr val="tx1"/>
+                      </a:solidFill>
+                      <a:prstDash val="solid"/>
+                      <a:round/>
+                      <a:headEnd type="none" w="med" len="med"/>
+                      <a:tailEnd type="none" w="med" len="med"/>
+                    </a:lnL>
+                    <a:lnR w="12700" cap="flat" cmpd="sng" algn="ctr">
+                      <a:solidFill>
+                        <a:schemeClr val="tx1"/>
+                      </a:solidFill>
+                      <a:prstDash val="solid"/>
+                      <a:round/>
+                      <a:headEnd type="none" w="med" len="med"/>
+                      <a:tailEnd type="none" w="med" len="med"/>
+                    </a:lnR>
+                    <a:lnT w="12700" cap="flat" cmpd="sng" algn="ctr">
+                      <a:solidFill>
+                        <a:schemeClr val="tx1"/>
+                      </a:solidFill>
+                      <a:prstDash val="solid"/>
+                      <a:round/>
+                      <a:headEnd type="none" w="med" len="med"/>
+                      <a:tailEnd type="none" w="med" len="med"/>
+                    </a:lnT>
+                    <a:lnB w="12700" cap="flat" cmpd="sng" algn="ctr">
+                      <a:solidFill>
+                        <a:schemeClr val="tx1"/>
+                      </a:solidFill>
+                      <a:prstDash val="solid"/>
+                      <a:round/>
+                      <a:headEnd type="none" w="med" len="med"/>
+                      <a:tailEnd type="none" w="med" len="med"/>
+                    </a:lnB>
+                  </a:tcPr>
+                </a:tc>
+                <a:tc>
+                  <a:txBody>
+                    <a:bodyPr/>
+                    <a:lstStyle/>
+                    <a:p>
+                      <a:r>
+                        <a:rPr lang="en-US" i="1" dirty="0"/>
+                        <a:t>Rural/Remote</a:t>
+                      </a:r>
+                      <a:endParaRPr lang="en-AU" i="1" dirty="0"/>
+                    </a:p>
+                  </a:txBody>
+                  <a:tcPr>
+                    <a:lnL w="12700" cap="flat" cmpd="sng" algn="ctr">
+                      <a:solidFill>
+                        <a:schemeClr val="tx1"/>
+                      </a:solidFill>
+                      <a:prstDash val="solid"/>
+                      <a:round/>
+                      <a:headEnd type="none" w="med" len="med"/>
+                      <a:tailEnd type="none" w="med" len="med"/>
+                    </a:lnL>
+                    <a:lnR w="12700" cap="flat" cmpd="sng" algn="ctr">
+                      <a:solidFill>
+                        <a:schemeClr val="tx1"/>
+                      </a:solidFill>
+                      <a:prstDash val="solid"/>
+                      <a:round/>
+                      <a:headEnd type="none" w="med" len="med"/>
+                      <a:tailEnd type="none" w="med" len="med"/>
+                    </a:lnR>
+                    <a:lnT w="12700" cap="flat" cmpd="sng" algn="ctr">
+                      <a:solidFill>
+                        <a:schemeClr val="tx1"/>
+                      </a:solidFill>
+                      <a:prstDash val="solid"/>
+                      <a:round/>
+                      <a:headEnd type="none" w="med" len="med"/>
+                      <a:tailEnd type="none" w="med" len="med"/>
+                    </a:lnT>
+                    <a:lnB w="12700" cap="flat" cmpd="sng" algn="ctr">
+                      <a:solidFill>
+                        <a:schemeClr val="tx1"/>
+                      </a:solidFill>
+                      <a:prstDash val="solid"/>
+                      <a:round/>
+                      <a:headEnd type="none" w="med" len="med"/>
+                      <a:tailEnd type="none" w="med" len="med"/>
+                    </a:lnB>
+                  </a:tcPr>
+                </a:tc>
+                <a:extLst>
+                  <a:ext uri="{0D108BD9-81ED-4DB2-BD59-A6C34878D82A}">
+                    <a16:rowId xmlns:a16="http://schemas.microsoft.com/office/drawing/2014/main" val="213350140"/>
+                  </a:ext>
+                </a:extLst>
+              </a:tr>
+              <a:tr h="185420">
+                <a:tc>
+                  <a:txBody>
+                    <a:bodyPr/>
+                    <a:lstStyle/>
+                    <a:p>
+                      <a:r>
+                        <a:rPr lang="en-US" sz="2000" b="1" i="1" dirty="0"/>
+                        <a:t>Casey</a:t>
+                      </a:r>
+                      <a:endParaRPr lang="en-AU" sz="2000" b="1" i="1" dirty="0"/>
+                    </a:p>
+                  </a:txBody>
+                  <a:tcPr>
+                    <a:lnL w="12700" cap="flat" cmpd="sng" algn="ctr">
+                      <a:solidFill>
+                        <a:schemeClr val="tx1"/>
+                      </a:solidFill>
+                      <a:prstDash val="solid"/>
+                      <a:round/>
+                      <a:headEnd type="none" w="med" len="med"/>
+                      <a:tailEnd type="none" w="med" len="med"/>
+                    </a:lnL>
+                    <a:lnR w="12700" cap="flat" cmpd="sng" algn="ctr">
+                      <a:solidFill>
+                        <a:schemeClr val="tx1"/>
+                      </a:solidFill>
+                      <a:prstDash val="solid"/>
+                      <a:round/>
+                      <a:headEnd type="none" w="med" len="med"/>
+                      <a:tailEnd type="none" w="med" len="med"/>
+                    </a:lnR>
+                    <a:lnT w="12700" cap="flat" cmpd="sng" algn="ctr">
+                      <a:solidFill>
+                        <a:schemeClr val="tx1"/>
+                      </a:solidFill>
+                      <a:prstDash val="solid"/>
+                      <a:round/>
+                      <a:headEnd type="none" w="med" len="med"/>
+                      <a:tailEnd type="none" w="med" len="med"/>
+                    </a:lnT>
+                    <a:lnB w="12700" cap="flat" cmpd="sng" algn="ctr">
+                      <a:solidFill>
+                        <a:schemeClr val="tx1"/>
+                      </a:solidFill>
+                      <a:prstDash val="solid"/>
+                      <a:round/>
+                      <a:headEnd type="none" w="med" len="med"/>
+                      <a:tailEnd type="none" w="med" len="med"/>
+                    </a:lnB>
+                  </a:tcPr>
+                </a:tc>
+                <a:tc>
+                  <a:txBody>
+                    <a:bodyPr/>
+                    <a:lstStyle/>
+                    <a:p>
+                      <a:r>
+                        <a:rPr lang="en-US" sz="2000" b="1" i="1" dirty="0"/>
+                        <a:t>Hume</a:t>
+                      </a:r>
+                      <a:endParaRPr lang="en-AU" sz="2000" b="1" i="1" dirty="0"/>
+                    </a:p>
+                  </a:txBody>
+                  <a:tcPr>
+                    <a:lnL w="12700" cap="flat" cmpd="sng" algn="ctr">
+                      <a:solidFill>
+                        <a:schemeClr val="tx1"/>
+                      </a:solidFill>
+                      <a:prstDash val="solid"/>
+                      <a:round/>
+                      <a:headEnd type="none" w="med" len="med"/>
+                      <a:tailEnd type="none" w="med" len="med"/>
+                    </a:lnL>
+                    <a:lnR w="12700" cap="flat" cmpd="sng" algn="ctr">
+                      <a:solidFill>
+                        <a:schemeClr val="tx1"/>
+                      </a:solidFill>
+                      <a:prstDash val="solid"/>
+                      <a:round/>
+                      <a:headEnd type="none" w="med" len="med"/>
+                      <a:tailEnd type="none" w="med" len="med"/>
+                    </a:lnR>
+                    <a:lnT w="12700" cap="flat" cmpd="sng" algn="ctr">
+                      <a:solidFill>
+                        <a:schemeClr val="tx1"/>
+                      </a:solidFill>
+                      <a:prstDash val="solid"/>
+                      <a:round/>
+                      <a:headEnd type="none" w="med" len="med"/>
+                      <a:tailEnd type="none" w="med" len="med"/>
+                    </a:lnT>
+                    <a:lnB w="12700" cap="flat" cmpd="sng" algn="ctr">
+                      <a:solidFill>
+                        <a:schemeClr val="tx1"/>
+                      </a:solidFill>
+                      <a:prstDash val="solid"/>
+                      <a:round/>
+                      <a:headEnd type="none" w="med" len="med"/>
+                      <a:tailEnd type="none" w="med" len="med"/>
+                    </a:lnB>
+                  </a:tcPr>
+                </a:tc>
+                <a:tc>
+                  <a:txBody>
+                    <a:bodyPr/>
+                    <a:lstStyle/>
+                    <a:p>
+                      <a:r>
+                        <a:rPr lang="en-US" sz="2000" b="1" i="1" dirty="0" err="1"/>
+                        <a:t>Yarra</a:t>
+                      </a:r>
+                      <a:r>
+                        <a:rPr lang="en-US" sz="2000" b="1" i="1" dirty="0"/>
+                        <a:t> Ranges</a:t>
+                      </a:r>
+                      <a:endParaRPr lang="en-AU" sz="2000" b="1" i="1" dirty="0"/>
+                    </a:p>
+                  </a:txBody>
+                  <a:tcPr>
+                    <a:lnL w="12700" cap="flat" cmpd="sng" algn="ctr">
+                      <a:solidFill>
+                        <a:schemeClr val="tx1"/>
+                      </a:solidFill>
+                      <a:prstDash val="solid"/>
+                      <a:round/>
+                      <a:headEnd type="none" w="med" len="med"/>
+                      <a:tailEnd type="none" w="med" len="med"/>
+                    </a:lnL>
+                    <a:lnR w="12700" cap="flat" cmpd="sng" algn="ctr">
+                      <a:solidFill>
+                        <a:schemeClr val="tx1"/>
+                      </a:solidFill>
+                      <a:prstDash val="solid"/>
+                      <a:round/>
+                      <a:headEnd type="none" w="med" len="med"/>
+                      <a:tailEnd type="none" w="med" len="med"/>
+                    </a:lnR>
+                    <a:lnT w="12700" cap="flat" cmpd="sng" algn="ctr">
+                      <a:solidFill>
+                        <a:schemeClr val="tx1"/>
+                      </a:solidFill>
+                      <a:prstDash val="solid"/>
+                      <a:round/>
+                      <a:headEnd type="none" w="med" len="med"/>
+                      <a:tailEnd type="none" w="med" len="med"/>
+                    </a:lnT>
+                    <a:lnB w="12700" cap="flat" cmpd="sng" algn="ctr">
+                      <a:solidFill>
+                        <a:schemeClr val="tx1"/>
+                      </a:solidFill>
+                      <a:prstDash val="solid"/>
+                      <a:round/>
+                      <a:headEnd type="none" w="med" len="med"/>
+                      <a:tailEnd type="none" w="med" len="med"/>
+                    </a:lnB>
+                  </a:tcPr>
+                </a:tc>
+                <a:extLst>
+                  <a:ext uri="{0D108BD9-81ED-4DB2-BD59-A6C34878D82A}">
+                    <a16:rowId xmlns:a16="http://schemas.microsoft.com/office/drawing/2014/main" val="1744985780"/>
+                  </a:ext>
+                </a:extLst>
+              </a:tr>
+              <a:tr h="320040">
+                <a:tc>
+                  <a:txBody>
+                    <a:bodyPr/>
+                    <a:lstStyle/>
+                    <a:p>
+                      <a:r>
+                        <a:rPr lang="en-US" b="1" dirty="0"/>
+                        <a:t>Open Space Rank:</a:t>
+                      </a:r>
+                    </a:p>
+                  </a:txBody>
+                  <a:tcPr>
+                    <a:lnL w="12700" cap="flat" cmpd="sng" algn="ctr">
+                      <a:solidFill>
+                        <a:schemeClr val="tx1"/>
+                      </a:solidFill>
+                      <a:prstDash val="solid"/>
+                      <a:round/>
+                      <a:headEnd type="none" w="med" len="med"/>
+                      <a:tailEnd type="none" w="med" len="med"/>
+                    </a:lnL>
+                    <a:lnR w="12700" cap="flat" cmpd="sng" algn="ctr">
+                      <a:solidFill>
+                        <a:schemeClr val="tx1"/>
+                      </a:solidFill>
+                      <a:prstDash val="solid"/>
+                      <a:round/>
+                      <a:headEnd type="none" w="med" len="med"/>
+                      <a:tailEnd type="none" w="med" len="med"/>
+                    </a:lnR>
+                    <a:lnT w="12700" cap="flat" cmpd="sng" algn="ctr">
+                      <a:solidFill>
+                        <a:schemeClr val="tx1"/>
+                      </a:solidFill>
+                      <a:prstDash val="solid"/>
+                      <a:round/>
+                      <a:headEnd type="none" w="med" len="med"/>
+                      <a:tailEnd type="none" w="med" len="med"/>
+                    </a:lnT>
+                  </a:tcPr>
+                </a:tc>
+                <a:tc>
+                  <a:txBody>
+                    <a:bodyPr/>
+                    <a:lstStyle/>
+                    <a:p>
+                      <a:pPr marL="0" marR="0" lvl="0" indent="0" algn="l" defTabSz="457200" rtl="0" eaLnBrk="1" fontAlgn="auto" latinLnBrk="0" hangingPunct="1">
+                        <a:lnSpc>
+                          <a:spcPct val="100000"/>
+                        </a:lnSpc>
+                        <a:spcBef>
+                          <a:spcPts val="0"/>
+                        </a:spcBef>
+                        <a:spcAft>
+                          <a:spcPts val="0"/>
+                        </a:spcAft>
+                        <a:buClrTx/>
+                        <a:buSzTx/>
+                        <a:buFontTx/>
+                        <a:buNone/>
+                        <a:tabLst/>
+                        <a:defRPr/>
+                      </a:pPr>
+                      <a:r>
+                        <a:rPr lang="en-US" b="1" dirty="0"/>
+                        <a:t>Open Space Rank:</a:t>
+                      </a:r>
+                    </a:p>
+                  </a:txBody>
+                  <a:tcPr>
+                    <a:lnL w="12700" cap="flat" cmpd="sng" algn="ctr">
+                      <a:solidFill>
+                        <a:schemeClr val="tx1"/>
+                      </a:solidFill>
+                      <a:prstDash val="solid"/>
+                      <a:round/>
+                      <a:headEnd type="none" w="med" len="med"/>
+                      <a:tailEnd type="none" w="med" len="med"/>
+                    </a:lnL>
+                    <a:lnR w="12700" cap="flat" cmpd="sng" algn="ctr">
+                      <a:solidFill>
+                        <a:schemeClr val="tx1"/>
+                      </a:solidFill>
+                      <a:prstDash val="solid"/>
+                      <a:round/>
+                      <a:headEnd type="none" w="med" len="med"/>
+                      <a:tailEnd type="none" w="med" len="med"/>
+                    </a:lnR>
+                    <a:lnT w="12700" cap="flat" cmpd="sng" algn="ctr">
+                      <a:solidFill>
+                        <a:schemeClr val="tx1"/>
+                      </a:solidFill>
+                      <a:prstDash val="solid"/>
+                      <a:round/>
+                      <a:headEnd type="none" w="med" len="med"/>
+                      <a:tailEnd type="none" w="med" len="med"/>
+                    </a:lnT>
+                  </a:tcPr>
+                </a:tc>
+                <a:tc>
+                  <a:txBody>
+                    <a:bodyPr/>
+                    <a:lstStyle/>
+                    <a:p>
+                      <a:pPr marL="0" marR="0" lvl="0" indent="0" algn="l" defTabSz="457200" rtl="0" eaLnBrk="1" fontAlgn="auto" latinLnBrk="0" hangingPunct="1">
+                        <a:lnSpc>
+                          <a:spcPct val="100000"/>
+                        </a:lnSpc>
+                        <a:spcBef>
+                          <a:spcPts val="0"/>
+                        </a:spcBef>
+                        <a:spcAft>
+                          <a:spcPts val="0"/>
+                        </a:spcAft>
+                        <a:buClrTx/>
+                        <a:buSzTx/>
+                        <a:buFontTx/>
+                        <a:buNone/>
+                        <a:tabLst/>
+                        <a:defRPr/>
+                      </a:pPr>
+                      <a:r>
+                        <a:rPr lang="en-US" b="1" dirty="0"/>
+                        <a:t>Open Space Rank:</a:t>
+                      </a:r>
+                    </a:p>
+                  </a:txBody>
+                  <a:tcPr>
+                    <a:lnL w="12700" cap="flat" cmpd="sng" algn="ctr">
+                      <a:solidFill>
+                        <a:schemeClr val="tx1"/>
+                      </a:solidFill>
+                      <a:prstDash val="solid"/>
+                      <a:round/>
+                      <a:headEnd type="none" w="med" len="med"/>
+                      <a:tailEnd type="none" w="med" len="med"/>
+                    </a:lnL>
+                    <a:lnR w="12700" cap="flat" cmpd="sng" algn="ctr">
+                      <a:solidFill>
+                        <a:schemeClr val="tx1"/>
+                      </a:solidFill>
+                      <a:prstDash val="solid"/>
+                      <a:round/>
+                      <a:headEnd type="none" w="med" len="med"/>
+                      <a:tailEnd type="none" w="med" len="med"/>
+                    </a:lnR>
+                    <a:lnT w="12700" cap="flat" cmpd="sng" algn="ctr">
+                      <a:solidFill>
+                        <a:schemeClr val="tx1"/>
+                      </a:solidFill>
+                      <a:prstDash val="solid"/>
+                      <a:round/>
+                      <a:headEnd type="none" w="med" len="med"/>
+                      <a:tailEnd type="none" w="med" len="med"/>
+                    </a:lnT>
+                  </a:tcPr>
+                </a:tc>
+                <a:extLst>
+                  <a:ext uri="{0D108BD9-81ED-4DB2-BD59-A6C34878D82A}">
+                    <a16:rowId xmlns:a16="http://schemas.microsoft.com/office/drawing/2014/main" val="4243755196"/>
+                  </a:ext>
+                </a:extLst>
+              </a:tr>
+              <a:tr h="320040">
+                <a:tc>
+                  <a:txBody>
+                    <a:bodyPr/>
+                    <a:lstStyle/>
+                    <a:p>
+                      <a:pPr marL="0" marR="0" lvl="0" indent="0" algn="l" defTabSz="457200" rtl="0" eaLnBrk="1" fontAlgn="auto" latinLnBrk="0" hangingPunct="1">
+                        <a:lnSpc>
+                          <a:spcPct val="100000"/>
+                        </a:lnSpc>
+                        <a:spcBef>
+                          <a:spcPts val="0"/>
+                        </a:spcBef>
+                        <a:spcAft>
+                          <a:spcPts val="0"/>
+                        </a:spcAft>
+                        <a:buClrTx/>
+                        <a:buSzTx/>
+                        <a:buFontTx/>
+                        <a:buNone/>
+                        <a:tabLst/>
+                        <a:defRPr/>
+                      </a:pPr>
+                      <a:r>
+                        <a:rPr lang="en-US" dirty="0"/>
+                        <a:t>2</a:t>
+                      </a:r>
+                      <a:r>
+                        <a:rPr lang="en-US" baseline="30000" dirty="0"/>
+                        <a:t>nd</a:t>
+                      </a:r>
+                      <a:endParaRPr lang="en-AU" dirty="0"/>
+                    </a:p>
+                  </a:txBody>
+                  <a:tcPr>
+                    <a:lnL w="12700" cap="flat" cmpd="sng" algn="ctr">
+                      <a:solidFill>
+                        <a:schemeClr val="tx1"/>
+                      </a:solidFill>
+                      <a:prstDash val="solid"/>
+                      <a:round/>
+                      <a:headEnd type="none" w="med" len="med"/>
+                      <a:tailEnd type="none" w="med" len="med"/>
+                    </a:lnL>
+                    <a:lnR w="12700" cap="flat" cmpd="sng" algn="ctr">
+                      <a:solidFill>
+                        <a:schemeClr val="tx1"/>
+                      </a:solidFill>
+                      <a:prstDash val="solid"/>
+                      <a:round/>
+                      <a:headEnd type="none" w="med" len="med"/>
+                      <a:tailEnd type="none" w="med" len="med"/>
+                    </a:lnR>
+                    <a:lnB w="12700" cap="flat" cmpd="sng" algn="ctr">
+                      <a:solidFill>
+                        <a:schemeClr val="tx1"/>
+                      </a:solidFill>
+                      <a:prstDash val="solid"/>
+                      <a:round/>
+                      <a:headEnd type="none" w="med" len="med"/>
+                      <a:tailEnd type="none" w="med" len="med"/>
+                    </a:lnB>
+                  </a:tcPr>
+                </a:tc>
+                <a:tc>
+                  <a:txBody>
+                    <a:bodyPr/>
+                    <a:lstStyle/>
+                    <a:p>
+                      <a:r>
+                        <a:rPr lang="en-US" dirty="0"/>
+                        <a:t>4</a:t>
+                      </a:r>
+                      <a:r>
+                        <a:rPr lang="en-US" baseline="30000" dirty="0"/>
+                        <a:t>th</a:t>
+                      </a:r>
+                      <a:r>
+                        <a:rPr lang="en-US" dirty="0"/>
+                        <a:t> </a:t>
+                      </a:r>
+                      <a:endParaRPr lang="en-AU" dirty="0"/>
+                    </a:p>
+                  </a:txBody>
+                  <a:tcPr>
+                    <a:lnL w="12700" cap="flat" cmpd="sng" algn="ctr">
+                      <a:solidFill>
+                        <a:schemeClr val="tx1"/>
+                      </a:solidFill>
+                      <a:prstDash val="solid"/>
+                      <a:round/>
+                      <a:headEnd type="none" w="med" len="med"/>
+                      <a:tailEnd type="none" w="med" len="med"/>
+                    </a:lnL>
+                    <a:lnR w="12700" cap="flat" cmpd="sng" algn="ctr">
+                      <a:solidFill>
+                        <a:schemeClr val="tx1"/>
+                      </a:solidFill>
+                      <a:prstDash val="solid"/>
+                      <a:round/>
+                      <a:headEnd type="none" w="med" len="med"/>
+                      <a:tailEnd type="none" w="med" len="med"/>
+                    </a:lnR>
+                    <a:lnB w="12700" cap="flat" cmpd="sng" algn="ctr">
+                      <a:solidFill>
+                        <a:schemeClr val="tx1"/>
+                      </a:solidFill>
+                      <a:prstDash val="solid"/>
+                      <a:round/>
+                      <a:headEnd type="none" w="med" len="med"/>
+                      <a:tailEnd type="none" w="med" len="med"/>
+                    </a:lnB>
+                  </a:tcPr>
+                </a:tc>
+                <a:tc>
+                  <a:txBody>
+                    <a:bodyPr/>
+                    <a:lstStyle/>
+                    <a:p>
+                      <a:r>
+                        <a:rPr lang="en-US" dirty="0"/>
+                        <a:t>1</a:t>
+                      </a:r>
+                      <a:r>
+                        <a:rPr lang="en-US" baseline="30000" dirty="0"/>
+                        <a:t>st</a:t>
+                      </a:r>
+                      <a:r>
+                        <a:rPr lang="en-US" dirty="0"/>
+                        <a:t> </a:t>
+                      </a:r>
+                      <a:endParaRPr lang="en-AU" dirty="0"/>
+                    </a:p>
+                  </a:txBody>
+                  <a:tcPr>
+                    <a:lnL w="12700" cap="flat" cmpd="sng" algn="ctr">
+                      <a:solidFill>
+                        <a:schemeClr val="tx1"/>
+                      </a:solidFill>
+                      <a:prstDash val="solid"/>
+                      <a:round/>
+                      <a:headEnd type="none" w="med" len="med"/>
+                      <a:tailEnd type="none" w="med" len="med"/>
+                    </a:lnL>
+                    <a:lnR w="12700" cap="flat" cmpd="sng" algn="ctr">
+                      <a:solidFill>
+                        <a:schemeClr val="tx1"/>
+                      </a:solidFill>
+                      <a:prstDash val="solid"/>
+                      <a:round/>
+                      <a:headEnd type="none" w="med" len="med"/>
+                      <a:tailEnd type="none" w="med" len="med"/>
+                    </a:lnR>
+                    <a:lnB w="12700" cap="flat" cmpd="sng" algn="ctr">
+                      <a:solidFill>
+                        <a:schemeClr val="tx1"/>
+                      </a:solidFill>
+                      <a:prstDash val="solid"/>
+                      <a:round/>
+                      <a:headEnd type="none" w="med" len="med"/>
+                      <a:tailEnd type="none" w="med" len="med"/>
+                    </a:lnB>
+                  </a:tcPr>
+                </a:tc>
+                <a:extLst>
+                  <a:ext uri="{0D108BD9-81ED-4DB2-BD59-A6C34878D82A}">
+                    <a16:rowId xmlns:a16="http://schemas.microsoft.com/office/drawing/2014/main" val="305211301"/>
+                  </a:ext>
+                </a:extLst>
+              </a:tr>
+              <a:tr h="320040">
+                <a:tc>
+                  <a:txBody>
+                    <a:bodyPr/>
+                    <a:lstStyle/>
+                    <a:p>
+                      <a:r>
+                        <a:rPr lang="en-US" b="1" dirty="0"/>
+                        <a:t>School Count:</a:t>
+                      </a:r>
+                    </a:p>
+                  </a:txBody>
+                  <a:tcPr>
+                    <a:lnL w="12700" cap="flat" cmpd="sng" algn="ctr">
+                      <a:solidFill>
+                        <a:schemeClr val="tx1"/>
+                      </a:solidFill>
+                      <a:prstDash val="solid"/>
+                      <a:round/>
+                      <a:headEnd type="none" w="med" len="med"/>
+                      <a:tailEnd type="none" w="med" len="med"/>
+                    </a:lnL>
+                    <a:lnR w="12700" cap="flat" cmpd="sng" algn="ctr">
+                      <a:solidFill>
+                        <a:schemeClr val="tx1"/>
+                      </a:solidFill>
+                      <a:prstDash val="solid"/>
+                      <a:round/>
+                      <a:headEnd type="none" w="med" len="med"/>
+                      <a:tailEnd type="none" w="med" len="med"/>
+                    </a:lnR>
+                    <a:lnT w="12700" cap="flat" cmpd="sng" algn="ctr">
+                      <a:solidFill>
+                        <a:schemeClr val="tx1"/>
+                      </a:solidFill>
+                      <a:prstDash val="solid"/>
+                      <a:round/>
+                      <a:headEnd type="none" w="med" len="med"/>
+                      <a:tailEnd type="none" w="med" len="med"/>
+                    </a:lnT>
+                  </a:tcPr>
+                </a:tc>
+                <a:tc>
+                  <a:txBody>
+                    <a:bodyPr/>
+                    <a:lstStyle/>
+                    <a:p>
+                      <a:pPr marL="0" marR="0" lvl="0" indent="0" algn="l" defTabSz="457200" rtl="0" eaLnBrk="1" fontAlgn="auto" latinLnBrk="0" hangingPunct="1">
+                        <a:lnSpc>
+                          <a:spcPct val="100000"/>
+                        </a:lnSpc>
+                        <a:spcBef>
+                          <a:spcPts val="0"/>
+                        </a:spcBef>
+                        <a:spcAft>
+                          <a:spcPts val="0"/>
+                        </a:spcAft>
+                        <a:buClrTx/>
+                        <a:buSzTx/>
+                        <a:buFontTx/>
+                        <a:buNone/>
+                        <a:tabLst/>
+                        <a:defRPr/>
+                      </a:pPr>
+                      <a:r>
+                        <a:rPr lang="en-US" b="1" dirty="0"/>
+                        <a:t>School Count:</a:t>
+                      </a:r>
+                      <a:endParaRPr lang="en-AU" b="1" dirty="0"/>
+                    </a:p>
+                  </a:txBody>
+                  <a:tcPr>
+                    <a:lnL w="12700" cap="flat" cmpd="sng" algn="ctr">
+                      <a:solidFill>
+                        <a:schemeClr val="tx1"/>
+                      </a:solidFill>
+                      <a:prstDash val="solid"/>
+                      <a:round/>
+                      <a:headEnd type="none" w="med" len="med"/>
+                      <a:tailEnd type="none" w="med" len="med"/>
+                    </a:lnL>
+                    <a:lnR w="12700" cap="flat" cmpd="sng" algn="ctr">
+                      <a:solidFill>
+                        <a:schemeClr val="tx1"/>
+                      </a:solidFill>
+                      <a:prstDash val="solid"/>
+                      <a:round/>
+                      <a:headEnd type="none" w="med" len="med"/>
+                      <a:tailEnd type="none" w="med" len="med"/>
+                    </a:lnR>
+                    <a:lnT w="12700" cap="flat" cmpd="sng" algn="ctr">
+                      <a:solidFill>
+                        <a:schemeClr val="tx1"/>
+                      </a:solidFill>
+                      <a:prstDash val="solid"/>
+                      <a:round/>
+                      <a:headEnd type="none" w="med" len="med"/>
+                      <a:tailEnd type="none" w="med" len="med"/>
+                    </a:lnT>
+                  </a:tcPr>
+                </a:tc>
+                <a:tc>
+                  <a:txBody>
+                    <a:bodyPr/>
+                    <a:lstStyle/>
+                    <a:p>
+                      <a:pPr marL="0" marR="0" lvl="0" indent="0" algn="l" defTabSz="457200" rtl="0" eaLnBrk="1" fontAlgn="auto" latinLnBrk="0" hangingPunct="1">
+                        <a:lnSpc>
+                          <a:spcPct val="100000"/>
+                        </a:lnSpc>
+                        <a:spcBef>
+                          <a:spcPts val="0"/>
+                        </a:spcBef>
+                        <a:spcAft>
+                          <a:spcPts val="0"/>
+                        </a:spcAft>
+                        <a:buClrTx/>
+                        <a:buSzTx/>
+                        <a:buFontTx/>
+                        <a:buNone/>
+                        <a:tabLst/>
+                        <a:defRPr/>
+                      </a:pPr>
+                      <a:r>
+                        <a:rPr lang="en-US" b="1" dirty="0"/>
+                        <a:t>School Count:</a:t>
+                      </a:r>
+                      <a:endParaRPr lang="en-AU" b="1" dirty="0"/>
+                    </a:p>
+                  </a:txBody>
+                  <a:tcPr>
+                    <a:lnL w="12700" cap="flat" cmpd="sng" algn="ctr">
+                      <a:solidFill>
+                        <a:schemeClr val="tx1"/>
+                      </a:solidFill>
+                      <a:prstDash val="solid"/>
+                      <a:round/>
+                      <a:headEnd type="none" w="med" len="med"/>
+                      <a:tailEnd type="none" w="med" len="med"/>
+                    </a:lnL>
+                    <a:lnR w="12700" cap="flat" cmpd="sng" algn="ctr">
+                      <a:solidFill>
+                        <a:schemeClr val="tx1"/>
+                      </a:solidFill>
+                      <a:prstDash val="solid"/>
+                      <a:round/>
+                      <a:headEnd type="none" w="med" len="med"/>
+                      <a:tailEnd type="none" w="med" len="med"/>
+                    </a:lnR>
+                    <a:lnT w="12700" cap="flat" cmpd="sng" algn="ctr">
+                      <a:solidFill>
+                        <a:schemeClr val="tx1"/>
+                      </a:solidFill>
+                      <a:prstDash val="solid"/>
+                      <a:round/>
+                      <a:headEnd type="none" w="med" len="med"/>
+                      <a:tailEnd type="none" w="med" len="med"/>
+                    </a:lnT>
+                  </a:tcPr>
+                </a:tc>
+                <a:extLst>
+                  <a:ext uri="{0D108BD9-81ED-4DB2-BD59-A6C34878D82A}">
+                    <a16:rowId xmlns:a16="http://schemas.microsoft.com/office/drawing/2014/main" val="1577449046"/>
+                  </a:ext>
+                </a:extLst>
+              </a:tr>
+              <a:tr h="320040">
+                <a:tc>
+                  <a:txBody>
+                    <a:bodyPr/>
+                    <a:lstStyle/>
+                    <a:p>
+                      <a:r>
+                        <a:rPr lang="en-US" dirty="0"/>
+                        <a:t>1</a:t>
+                      </a:r>
+                      <a:r>
+                        <a:rPr lang="en-US" baseline="30000" dirty="0"/>
+                        <a:t>st</a:t>
+                      </a:r>
+                      <a:r>
+                        <a:rPr lang="en-US" dirty="0"/>
+                        <a:t> </a:t>
+                      </a:r>
+                      <a:endParaRPr lang="en-AU" dirty="0"/>
+                    </a:p>
+                  </a:txBody>
+                  <a:tcPr>
+                    <a:lnL w="12700" cap="flat" cmpd="sng" algn="ctr">
+                      <a:solidFill>
+                        <a:schemeClr val="tx1"/>
+                      </a:solidFill>
+                      <a:prstDash val="solid"/>
+                      <a:round/>
+                      <a:headEnd type="none" w="med" len="med"/>
+                      <a:tailEnd type="none" w="med" len="med"/>
+                    </a:lnL>
+                    <a:lnR w="12700" cap="flat" cmpd="sng" algn="ctr">
+                      <a:solidFill>
+                        <a:schemeClr val="tx1"/>
+                      </a:solidFill>
+                      <a:prstDash val="solid"/>
+                      <a:round/>
+                      <a:headEnd type="none" w="med" len="med"/>
+                      <a:tailEnd type="none" w="med" len="med"/>
+                    </a:lnR>
+                    <a:lnB w="12700" cap="flat" cmpd="sng" algn="ctr">
+                      <a:solidFill>
+                        <a:schemeClr val="tx1"/>
+                      </a:solidFill>
+                      <a:prstDash val="solid"/>
+                      <a:round/>
+                      <a:headEnd type="none" w="med" len="med"/>
+                      <a:tailEnd type="none" w="med" len="med"/>
+                    </a:lnB>
+                  </a:tcPr>
+                </a:tc>
+                <a:tc>
+                  <a:txBody>
+                    <a:bodyPr/>
+                    <a:lstStyle/>
+                    <a:p>
+                      <a:r>
+                        <a:rPr lang="en-US" dirty="0"/>
+                        <a:t>3</a:t>
+                      </a:r>
+                      <a:r>
+                        <a:rPr lang="en-US" baseline="30000" dirty="0"/>
+                        <a:t>rd</a:t>
+                      </a:r>
+                      <a:r>
+                        <a:rPr lang="en-US" dirty="0"/>
+                        <a:t> </a:t>
+                      </a:r>
+                      <a:endParaRPr lang="en-AU" dirty="0"/>
+                    </a:p>
+                  </a:txBody>
+                  <a:tcPr>
+                    <a:lnL w="12700" cap="flat" cmpd="sng" algn="ctr">
+                      <a:solidFill>
+                        <a:schemeClr val="tx1"/>
+                      </a:solidFill>
+                      <a:prstDash val="solid"/>
+                      <a:round/>
+                      <a:headEnd type="none" w="med" len="med"/>
+                      <a:tailEnd type="none" w="med" len="med"/>
+                    </a:lnL>
+                    <a:lnR w="12700" cap="flat" cmpd="sng" algn="ctr">
+                      <a:solidFill>
+                        <a:schemeClr val="tx1"/>
+                      </a:solidFill>
+                      <a:prstDash val="solid"/>
+                      <a:round/>
+                      <a:headEnd type="none" w="med" len="med"/>
+                      <a:tailEnd type="none" w="med" len="med"/>
+                    </a:lnR>
+                    <a:lnB w="12700" cap="flat" cmpd="sng" algn="ctr">
+                      <a:solidFill>
+                        <a:schemeClr val="tx1"/>
+                      </a:solidFill>
+                      <a:prstDash val="solid"/>
+                      <a:round/>
+                      <a:headEnd type="none" w="med" len="med"/>
+                      <a:tailEnd type="none" w="med" len="med"/>
+                    </a:lnB>
+                  </a:tcPr>
+                </a:tc>
+                <a:tc>
+                  <a:txBody>
+                    <a:bodyPr/>
+                    <a:lstStyle/>
+                    <a:p>
+                      <a:r>
+                        <a:rPr lang="en-US" dirty="0"/>
+                        <a:t>2</a:t>
+                      </a:r>
+                      <a:r>
+                        <a:rPr lang="en-US" baseline="30000" dirty="0"/>
+                        <a:t>nd</a:t>
+                      </a:r>
+                      <a:r>
+                        <a:rPr lang="en-US" dirty="0"/>
+                        <a:t> </a:t>
+                      </a:r>
+                      <a:endParaRPr lang="en-AU" dirty="0"/>
+                    </a:p>
+                  </a:txBody>
+                  <a:tcPr>
+                    <a:lnL w="12700" cap="flat" cmpd="sng" algn="ctr">
+                      <a:solidFill>
+                        <a:schemeClr val="tx1"/>
+                      </a:solidFill>
+                      <a:prstDash val="solid"/>
+                      <a:round/>
+                      <a:headEnd type="none" w="med" len="med"/>
+                      <a:tailEnd type="none" w="med" len="med"/>
+                    </a:lnL>
+                    <a:lnR w="12700" cap="flat" cmpd="sng" algn="ctr">
+                      <a:solidFill>
+                        <a:schemeClr val="tx1"/>
+                      </a:solidFill>
+                      <a:prstDash val="solid"/>
+                      <a:round/>
+                      <a:headEnd type="none" w="med" len="med"/>
+                      <a:tailEnd type="none" w="med" len="med"/>
+                    </a:lnR>
+                    <a:lnB w="12700" cap="flat" cmpd="sng" algn="ctr">
+                      <a:solidFill>
+                        <a:schemeClr val="tx1"/>
+                      </a:solidFill>
+                      <a:prstDash val="solid"/>
+                      <a:round/>
+                      <a:headEnd type="none" w="med" len="med"/>
+                      <a:tailEnd type="none" w="med" len="med"/>
+                    </a:lnB>
+                  </a:tcPr>
+                </a:tc>
+                <a:extLst>
+                  <a:ext uri="{0D108BD9-81ED-4DB2-BD59-A6C34878D82A}">
+                    <a16:rowId xmlns:a16="http://schemas.microsoft.com/office/drawing/2014/main" val="1431990709"/>
+                  </a:ext>
+                </a:extLst>
+              </a:tr>
+              <a:tr h="320040">
+                <a:tc>
+                  <a:txBody>
+                    <a:bodyPr/>
+                    <a:lstStyle/>
+                    <a:p>
+                      <a:r>
+                        <a:rPr lang="en-US" b="1" dirty="0"/>
+                        <a:t>Population Change:</a:t>
+                      </a:r>
+                    </a:p>
+                  </a:txBody>
+                  <a:tcPr>
+                    <a:lnL w="12700" cap="flat" cmpd="sng" algn="ctr">
+                      <a:solidFill>
+                        <a:schemeClr val="tx1"/>
+                      </a:solidFill>
+                      <a:prstDash val="solid"/>
+                      <a:round/>
+                      <a:headEnd type="none" w="med" len="med"/>
+                      <a:tailEnd type="none" w="med" len="med"/>
+                    </a:lnL>
+                    <a:lnR w="12700" cap="flat" cmpd="sng" algn="ctr">
+                      <a:solidFill>
+                        <a:schemeClr val="tx1"/>
+                      </a:solidFill>
+                      <a:prstDash val="solid"/>
+                      <a:round/>
+                      <a:headEnd type="none" w="med" len="med"/>
+                      <a:tailEnd type="none" w="med" len="med"/>
+                    </a:lnR>
+                    <a:lnT w="12700" cap="flat" cmpd="sng" algn="ctr">
+                      <a:solidFill>
+                        <a:schemeClr val="tx1"/>
+                      </a:solidFill>
+                      <a:prstDash val="solid"/>
+                      <a:round/>
+                      <a:headEnd type="none" w="med" len="med"/>
+                      <a:tailEnd type="none" w="med" len="med"/>
+                    </a:lnT>
+                  </a:tcPr>
+                </a:tc>
+                <a:tc>
+                  <a:txBody>
+                    <a:bodyPr/>
+                    <a:lstStyle/>
+                    <a:p>
+                      <a:r>
+                        <a:rPr lang="en-US" b="1" dirty="0"/>
+                        <a:t>Population Change:</a:t>
+                      </a:r>
+                    </a:p>
+                  </a:txBody>
+                  <a:tcPr>
+                    <a:lnL w="12700" cap="flat" cmpd="sng" algn="ctr">
+                      <a:solidFill>
+                        <a:schemeClr val="tx1"/>
+                      </a:solidFill>
+                      <a:prstDash val="solid"/>
+                      <a:round/>
+                      <a:headEnd type="none" w="med" len="med"/>
+                      <a:tailEnd type="none" w="med" len="med"/>
+                    </a:lnL>
+                    <a:lnR w="12700" cap="flat" cmpd="sng" algn="ctr">
+                      <a:solidFill>
+                        <a:schemeClr val="tx1"/>
+                      </a:solidFill>
+                      <a:prstDash val="solid"/>
+                      <a:round/>
+                      <a:headEnd type="none" w="med" len="med"/>
+                      <a:tailEnd type="none" w="med" len="med"/>
+                    </a:lnR>
+                    <a:lnT w="12700" cap="flat" cmpd="sng" algn="ctr">
+                      <a:solidFill>
+                        <a:schemeClr val="tx1"/>
+                      </a:solidFill>
+                      <a:prstDash val="solid"/>
+                      <a:round/>
+                      <a:headEnd type="none" w="med" len="med"/>
+                      <a:tailEnd type="none" w="med" len="med"/>
+                    </a:lnT>
+                  </a:tcPr>
+                </a:tc>
+                <a:tc>
+                  <a:txBody>
+                    <a:bodyPr/>
+                    <a:lstStyle/>
+                    <a:p>
+                      <a:r>
+                        <a:rPr lang="en-US" b="1" dirty="0"/>
+                        <a:t>Population Change:</a:t>
+                      </a:r>
+                    </a:p>
+                  </a:txBody>
+                  <a:tcPr>
+                    <a:lnL w="12700" cap="flat" cmpd="sng" algn="ctr">
+                      <a:solidFill>
+                        <a:schemeClr val="tx1"/>
+                      </a:solidFill>
+                      <a:prstDash val="solid"/>
+                      <a:round/>
+                      <a:headEnd type="none" w="med" len="med"/>
+                      <a:tailEnd type="none" w="med" len="med"/>
+                    </a:lnL>
+                    <a:lnR w="12700" cap="flat" cmpd="sng" algn="ctr">
+                      <a:solidFill>
+                        <a:schemeClr val="tx1"/>
+                      </a:solidFill>
+                      <a:prstDash val="solid"/>
+                      <a:round/>
+                      <a:headEnd type="none" w="med" len="med"/>
+                      <a:tailEnd type="none" w="med" len="med"/>
+                    </a:lnR>
+                    <a:lnT w="12700" cap="flat" cmpd="sng" algn="ctr">
+                      <a:solidFill>
+                        <a:schemeClr val="tx1"/>
+                      </a:solidFill>
+                      <a:prstDash val="solid"/>
+                      <a:round/>
+                      <a:headEnd type="none" w="med" len="med"/>
+                      <a:tailEnd type="none" w="med" len="med"/>
+                    </a:lnT>
+                  </a:tcPr>
+                </a:tc>
+                <a:extLst>
+                  <a:ext uri="{0D108BD9-81ED-4DB2-BD59-A6C34878D82A}">
+                    <a16:rowId xmlns:a16="http://schemas.microsoft.com/office/drawing/2014/main" val="1924717492"/>
+                  </a:ext>
+                </a:extLst>
+              </a:tr>
+              <a:tr h="320040">
+                <a:tc>
+                  <a:txBody>
+                    <a:bodyPr/>
+                    <a:lstStyle/>
+                    <a:p>
+                      <a:pPr marL="0" marR="0" lvl="0" indent="0" algn="l" defTabSz="457200" rtl="0" eaLnBrk="1" fontAlgn="auto" latinLnBrk="0" hangingPunct="1">
+                        <a:lnSpc>
+                          <a:spcPct val="100000"/>
+                        </a:lnSpc>
+                        <a:spcBef>
+                          <a:spcPts val="0"/>
+                        </a:spcBef>
+                        <a:spcAft>
+                          <a:spcPts val="0"/>
+                        </a:spcAft>
+                        <a:buClrTx/>
+                        <a:buSzTx/>
+                        <a:buFontTx/>
+                        <a:buNone/>
+                        <a:tabLst/>
+                        <a:defRPr/>
+                      </a:pPr>
+                      <a:r>
+                        <a:rPr lang="en-US" dirty="0"/>
+                        <a:t>+2.5%</a:t>
+                      </a:r>
+                      <a:endParaRPr lang="en-AU" dirty="0"/>
+                    </a:p>
+                  </a:txBody>
+                  <a:tcPr>
+                    <a:lnL w="12700" cap="flat" cmpd="sng" algn="ctr">
+                      <a:solidFill>
+                        <a:schemeClr val="tx1"/>
+                      </a:solidFill>
+                      <a:prstDash val="solid"/>
+                      <a:round/>
+                      <a:headEnd type="none" w="med" len="med"/>
+                      <a:tailEnd type="none" w="med" len="med"/>
+                    </a:lnL>
+                    <a:lnR w="12700" cap="flat" cmpd="sng" algn="ctr">
+                      <a:solidFill>
+                        <a:schemeClr val="tx1"/>
+                      </a:solidFill>
+                      <a:prstDash val="solid"/>
+                      <a:round/>
+                      <a:headEnd type="none" w="med" len="med"/>
+                      <a:tailEnd type="none" w="med" len="med"/>
+                    </a:lnR>
+                  </a:tcPr>
+                </a:tc>
+                <a:tc>
+                  <a:txBody>
+                    <a:bodyPr/>
+                    <a:lstStyle/>
+                    <a:p>
+                      <a:r>
+                        <a:rPr lang="en-US" dirty="0"/>
+                        <a:t>+2.5%</a:t>
+                      </a:r>
+                      <a:endParaRPr lang="en-AU" dirty="0"/>
+                    </a:p>
+                  </a:txBody>
+                  <a:tcPr>
+                    <a:lnL w="12700" cap="flat" cmpd="sng" algn="ctr">
+                      <a:solidFill>
+                        <a:schemeClr val="tx1"/>
+                      </a:solidFill>
+                      <a:prstDash val="solid"/>
+                      <a:round/>
+                      <a:headEnd type="none" w="med" len="med"/>
+                      <a:tailEnd type="none" w="med" len="med"/>
+                    </a:lnL>
+                    <a:lnR w="12700" cap="flat" cmpd="sng" algn="ctr">
+                      <a:solidFill>
+                        <a:schemeClr val="tx1"/>
+                      </a:solidFill>
+                      <a:prstDash val="solid"/>
+                      <a:round/>
+                      <a:headEnd type="none" w="med" len="med"/>
+                      <a:tailEnd type="none" w="med" len="med"/>
+                    </a:lnR>
+                  </a:tcPr>
+                </a:tc>
+                <a:tc>
+                  <a:txBody>
+                    <a:bodyPr/>
+                    <a:lstStyle/>
+                    <a:p>
+                      <a:pPr marL="0" marR="0" lvl="0" indent="0" algn="l" defTabSz="457200" rtl="0" eaLnBrk="1" fontAlgn="auto" latinLnBrk="0" hangingPunct="1">
+                        <a:lnSpc>
+                          <a:spcPct val="100000"/>
+                        </a:lnSpc>
+                        <a:spcBef>
+                          <a:spcPts val="0"/>
+                        </a:spcBef>
+                        <a:spcAft>
+                          <a:spcPts val="0"/>
+                        </a:spcAft>
+                        <a:buClrTx/>
+                        <a:buSzTx/>
+                        <a:buFontTx/>
+                        <a:buNone/>
+                        <a:tabLst/>
+                        <a:defRPr/>
+                      </a:pPr>
+                      <a:r>
+                        <a:rPr lang="en-US" dirty="0"/>
+                        <a:t>0%</a:t>
+                      </a:r>
+                      <a:endParaRPr lang="en-AU" dirty="0"/>
+                    </a:p>
+                  </a:txBody>
+                  <a:tcPr>
+                    <a:lnL w="12700" cap="flat" cmpd="sng" algn="ctr">
+                      <a:solidFill>
+                        <a:schemeClr val="tx1"/>
+                      </a:solidFill>
+                      <a:prstDash val="solid"/>
+                      <a:round/>
+                      <a:headEnd type="none" w="med" len="med"/>
+                      <a:tailEnd type="none" w="med" len="med"/>
+                    </a:lnL>
+                    <a:lnR w="12700" cap="flat" cmpd="sng" algn="ctr">
+                      <a:solidFill>
+                        <a:schemeClr val="tx1"/>
+                      </a:solidFill>
+                      <a:prstDash val="solid"/>
+                      <a:round/>
+                      <a:headEnd type="none" w="med" len="med"/>
+                      <a:tailEnd type="none" w="med" len="med"/>
+                    </a:lnR>
+                  </a:tcPr>
+                </a:tc>
+                <a:extLst>
+                  <a:ext uri="{0D108BD9-81ED-4DB2-BD59-A6C34878D82A}">
+                    <a16:rowId xmlns:a16="http://schemas.microsoft.com/office/drawing/2014/main" val="1679149586"/>
+                  </a:ext>
+                </a:extLst>
+              </a:tr>
+              <a:tr h="256032">
+                <a:tc>
+                  <a:txBody>
+                    <a:bodyPr/>
+                    <a:lstStyle/>
+                    <a:p>
+                      <a:r>
+                        <a:rPr lang="en-US" dirty="0"/>
+                        <a:t>Low population density</a:t>
+                      </a:r>
+                      <a:endParaRPr lang="en-AU" dirty="0"/>
+                    </a:p>
+                  </a:txBody>
+                  <a:tcPr>
+                    <a:lnL w="12700" cap="flat" cmpd="sng" algn="ctr">
+                      <a:solidFill>
+                        <a:schemeClr val="tx1"/>
+                      </a:solidFill>
+                      <a:prstDash val="solid"/>
+                      <a:round/>
+                      <a:headEnd type="none" w="med" len="med"/>
+                      <a:tailEnd type="none" w="med" len="med"/>
+                    </a:lnL>
+                    <a:lnR w="12700" cap="flat" cmpd="sng" algn="ctr">
+                      <a:solidFill>
+                        <a:schemeClr val="tx1"/>
+                      </a:solidFill>
+                      <a:prstDash val="solid"/>
+                      <a:round/>
+                      <a:headEnd type="none" w="med" len="med"/>
+                      <a:tailEnd type="none" w="med" len="med"/>
+                    </a:lnR>
+                    <a:lnB w="12700" cap="flat" cmpd="sng" algn="ctr">
+                      <a:solidFill>
+                        <a:schemeClr val="tx1"/>
+                      </a:solidFill>
+                      <a:prstDash val="solid"/>
+                      <a:round/>
+                      <a:headEnd type="none" w="med" len="med"/>
+                      <a:tailEnd type="none" w="med" len="med"/>
+                    </a:lnB>
+                  </a:tcPr>
+                </a:tc>
+                <a:tc>
+                  <a:txBody>
+                    <a:bodyPr/>
+                    <a:lstStyle/>
+                    <a:p>
+                      <a:pPr marL="0" marR="0" lvl="0" indent="0" algn="l" defTabSz="457200" rtl="0" eaLnBrk="1" fontAlgn="auto" latinLnBrk="0" hangingPunct="1">
+                        <a:lnSpc>
+                          <a:spcPct val="100000"/>
+                        </a:lnSpc>
+                        <a:spcBef>
+                          <a:spcPts val="0"/>
+                        </a:spcBef>
+                        <a:spcAft>
+                          <a:spcPts val="0"/>
+                        </a:spcAft>
+                        <a:buClrTx/>
+                        <a:buSzTx/>
+                        <a:buFontTx/>
+                        <a:buNone/>
+                        <a:tabLst/>
+                        <a:defRPr/>
+                      </a:pPr>
+                      <a:r>
+                        <a:rPr lang="en-US" dirty="0"/>
+                        <a:t>Low population density</a:t>
+                      </a:r>
+                      <a:endParaRPr lang="en-AU" dirty="0"/>
+                    </a:p>
+                  </a:txBody>
+                  <a:tcPr>
+                    <a:lnL w="12700" cap="flat" cmpd="sng" algn="ctr">
+                      <a:solidFill>
+                        <a:schemeClr val="tx1"/>
+                      </a:solidFill>
+                      <a:prstDash val="solid"/>
+                      <a:round/>
+                      <a:headEnd type="none" w="med" len="med"/>
+                      <a:tailEnd type="none" w="med" len="med"/>
+                    </a:lnL>
+                    <a:lnR w="12700" cap="flat" cmpd="sng" algn="ctr">
+                      <a:solidFill>
+                        <a:schemeClr val="tx1"/>
+                      </a:solidFill>
+                      <a:prstDash val="solid"/>
+                      <a:round/>
+                      <a:headEnd type="none" w="med" len="med"/>
+                      <a:tailEnd type="none" w="med" len="med"/>
+                    </a:lnR>
+                    <a:lnB w="12700" cap="flat" cmpd="sng" algn="ctr">
+                      <a:solidFill>
+                        <a:schemeClr val="tx1"/>
+                      </a:solidFill>
+                      <a:prstDash val="solid"/>
+                      <a:round/>
+                      <a:headEnd type="none" w="med" len="med"/>
+                      <a:tailEnd type="none" w="med" len="med"/>
+                    </a:lnB>
+                  </a:tcPr>
+                </a:tc>
+                <a:tc>
+                  <a:txBody>
+                    <a:bodyPr/>
+                    <a:lstStyle/>
+                    <a:p>
+                      <a:pPr marL="0" marR="0" lvl="0" indent="0" algn="l" defTabSz="457200" rtl="0" eaLnBrk="1" fontAlgn="auto" latinLnBrk="0" hangingPunct="1">
+                        <a:lnSpc>
+                          <a:spcPct val="100000"/>
+                        </a:lnSpc>
+                        <a:spcBef>
+                          <a:spcPts val="0"/>
+                        </a:spcBef>
+                        <a:spcAft>
+                          <a:spcPts val="0"/>
+                        </a:spcAft>
+                        <a:buClrTx/>
+                        <a:buSzTx/>
+                        <a:buFontTx/>
+                        <a:buNone/>
+                        <a:tabLst/>
+                        <a:defRPr/>
+                      </a:pPr>
+                      <a:r>
+                        <a:rPr lang="en-US" dirty="0"/>
+                        <a:t>Low population density</a:t>
+                      </a:r>
+                      <a:endParaRPr lang="en-AU" dirty="0"/>
+                    </a:p>
+                  </a:txBody>
+                  <a:tcPr>
+                    <a:lnL w="12700" cap="flat" cmpd="sng" algn="ctr">
+                      <a:solidFill>
+                        <a:schemeClr val="tx1"/>
+                      </a:solidFill>
+                      <a:prstDash val="solid"/>
+                      <a:round/>
+                      <a:headEnd type="none" w="med" len="med"/>
+                      <a:tailEnd type="none" w="med" len="med"/>
+                    </a:lnL>
+                    <a:lnR w="12700" cap="flat" cmpd="sng" algn="ctr">
+                      <a:solidFill>
+                        <a:schemeClr val="tx1"/>
+                      </a:solidFill>
+                      <a:prstDash val="solid"/>
+                      <a:round/>
+                      <a:headEnd type="none" w="med" len="med"/>
+                      <a:tailEnd type="none" w="med" len="med"/>
+                    </a:lnR>
+                    <a:lnB w="12700" cap="flat" cmpd="sng" algn="ctr">
+                      <a:solidFill>
+                        <a:schemeClr val="tx1"/>
+                      </a:solidFill>
+                      <a:prstDash val="solid"/>
+                      <a:round/>
+                      <a:headEnd type="none" w="med" len="med"/>
+                      <a:tailEnd type="none" w="med" len="med"/>
+                    </a:lnB>
+                  </a:tcPr>
+                </a:tc>
+                <a:extLst>
+                  <a:ext uri="{0D108BD9-81ED-4DB2-BD59-A6C34878D82A}">
+                    <a16:rowId xmlns:a16="http://schemas.microsoft.com/office/drawing/2014/main" val="751102269"/>
+                  </a:ext>
+                </a:extLst>
+              </a:tr>
+              <a:tr h="457200">
+                <a:tc>
+                  <a:txBody>
+                    <a:bodyPr/>
+                    <a:lstStyle/>
+                    <a:p>
+                      <a:pPr marL="0" marR="0" lvl="0" indent="0" algn="l" defTabSz="457200" rtl="0" eaLnBrk="1" fontAlgn="auto" latinLnBrk="0" hangingPunct="1">
+                        <a:lnSpc>
+                          <a:spcPct val="100000"/>
+                        </a:lnSpc>
+                        <a:spcBef>
+                          <a:spcPts val="0"/>
+                        </a:spcBef>
+                        <a:spcAft>
+                          <a:spcPts val="0"/>
+                        </a:spcAft>
+                        <a:buClrTx/>
+                        <a:buSzTx/>
+                        <a:buFontTx/>
+                        <a:buNone/>
+                        <a:tabLst/>
+                        <a:defRPr/>
+                      </a:pPr>
+                      <a:r>
+                        <a:rPr lang="en-US" b="1" dirty="0"/>
+                        <a:t>School to Open Space Ratio:</a:t>
+                      </a:r>
+                    </a:p>
+                  </a:txBody>
+                  <a:tcPr>
+                    <a:lnL w="12700" cap="flat" cmpd="sng" algn="ctr">
+                      <a:solidFill>
+                        <a:schemeClr val="tx1"/>
+                      </a:solidFill>
+                      <a:prstDash val="solid"/>
+                      <a:round/>
+                      <a:headEnd type="none" w="med" len="med"/>
+                      <a:tailEnd type="none" w="med" len="med"/>
+                    </a:lnL>
+                    <a:lnR w="12700" cap="flat" cmpd="sng" algn="ctr">
+                      <a:solidFill>
+                        <a:schemeClr val="tx1"/>
+                      </a:solidFill>
+                      <a:prstDash val="solid"/>
+                      <a:round/>
+                      <a:headEnd type="none" w="med" len="med"/>
+                      <a:tailEnd type="none" w="med" len="med"/>
+                    </a:lnR>
+                    <a:lnT w="12700" cap="flat" cmpd="sng" algn="ctr">
+                      <a:solidFill>
+                        <a:schemeClr val="tx1"/>
+                      </a:solidFill>
+                      <a:prstDash val="solid"/>
+                      <a:round/>
+                      <a:headEnd type="none" w="med" len="med"/>
+                      <a:tailEnd type="none" w="med" len="med"/>
+                    </a:lnT>
+                  </a:tcPr>
+                </a:tc>
+                <a:tc>
+                  <a:txBody>
+                    <a:bodyPr/>
+                    <a:lstStyle/>
+                    <a:p>
+                      <a:pPr marL="0" marR="0" lvl="0" indent="0" algn="l" defTabSz="457200" rtl="0" eaLnBrk="1" fontAlgn="auto" latinLnBrk="0" hangingPunct="1">
+                        <a:lnSpc>
+                          <a:spcPct val="100000"/>
+                        </a:lnSpc>
+                        <a:spcBef>
+                          <a:spcPts val="0"/>
+                        </a:spcBef>
+                        <a:spcAft>
+                          <a:spcPts val="0"/>
+                        </a:spcAft>
+                        <a:buClrTx/>
+                        <a:buSzTx/>
+                        <a:buFontTx/>
+                        <a:buNone/>
+                        <a:tabLst/>
+                        <a:defRPr/>
+                      </a:pPr>
+                      <a:r>
+                        <a:rPr lang="en-US" b="1" dirty="0"/>
+                        <a:t>School to Open Space Ratio:</a:t>
+                      </a:r>
+                    </a:p>
+                  </a:txBody>
+                  <a:tcPr>
+                    <a:lnL w="12700" cap="flat" cmpd="sng" algn="ctr">
+                      <a:solidFill>
+                        <a:schemeClr val="tx1"/>
+                      </a:solidFill>
+                      <a:prstDash val="solid"/>
+                      <a:round/>
+                      <a:headEnd type="none" w="med" len="med"/>
+                      <a:tailEnd type="none" w="med" len="med"/>
+                    </a:lnL>
+                    <a:lnR w="12700" cap="flat" cmpd="sng" algn="ctr">
+                      <a:solidFill>
+                        <a:schemeClr val="tx1"/>
+                      </a:solidFill>
+                      <a:prstDash val="solid"/>
+                      <a:round/>
+                      <a:headEnd type="none" w="med" len="med"/>
+                      <a:tailEnd type="none" w="med" len="med"/>
+                    </a:lnR>
+                    <a:lnT w="12700" cap="flat" cmpd="sng" algn="ctr">
+                      <a:solidFill>
+                        <a:schemeClr val="tx1"/>
+                      </a:solidFill>
+                      <a:prstDash val="solid"/>
+                      <a:round/>
+                      <a:headEnd type="none" w="med" len="med"/>
+                      <a:tailEnd type="none" w="med" len="med"/>
+                    </a:lnT>
+                  </a:tcPr>
+                </a:tc>
+                <a:tc>
+                  <a:txBody>
+                    <a:bodyPr/>
+                    <a:lstStyle/>
+                    <a:p>
+                      <a:r>
+                        <a:rPr lang="en-US" b="1" dirty="0"/>
+                        <a:t>School to Open Space Ratio:</a:t>
+                      </a:r>
+                    </a:p>
+                  </a:txBody>
+                  <a:tcPr>
+                    <a:lnL w="12700" cap="flat" cmpd="sng" algn="ctr">
+                      <a:solidFill>
+                        <a:schemeClr val="tx1"/>
+                      </a:solidFill>
+                      <a:prstDash val="solid"/>
+                      <a:round/>
+                      <a:headEnd type="none" w="med" len="med"/>
+                      <a:tailEnd type="none" w="med" len="med"/>
+                    </a:lnL>
+                    <a:lnR w="12700" cap="flat" cmpd="sng" algn="ctr">
+                      <a:solidFill>
+                        <a:schemeClr val="tx1"/>
+                      </a:solidFill>
+                      <a:prstDash val="solid"/>
+                      <a:round/>
+                      <a:headEnd type="none" w="med" len="med"/>
+                      <a:tailEnd type="none" w="med" len="med"/>
+                    </a:lnR>
+                    <a:lnT w="12700" cap="flat" cmpd="sng" algn="ctr">
+                      <a:solidFill>
+                        <a:schemeClr val="tx1"/>
+                      </a:solidFill>
+                      <a:prstDash val="solid"/>
+                      <a:round/>
+                      <a:headEnd type="none" w="med" len="med"/>
+                      <a:tailEnd type="none" w="med" len="med"/>
+                    </a:lnT>
+                  </a:tcPr>
+                </a:tc>
+                <a:extLst>
+                  <a:ext uri="{0D108BD9-81ED-4DB2-BD59-A6C34878D82A}">
+                    <a16:rowId xmlns:a16="http://schemas.microsoft.com/office/drawing/2014/main" val="35407425"/>
+                  </a:ext>
+                </a:extLst>
+              </a:tr>
+              <a:tr h="192314">
+                <a:tc>
+                  <a:txBody>
+                    <a:bodyPr/>
+                    <a:lstStyle/>
+                    <a:p>
+                      <a:pPr marL="0" marR="0" lvl="0" indent="0" algn="l" defTabSz="457200" rtl="0" eaLnBrk="1" fontAlgn="auto" latinLnBrk="0" hangingPunct="1">
+                        <a:lnSpc>
+                          <a:spcPct val="100000"/>
+                        </a:lnSpc>
+                        <a:spcBef>
+                          <a:spcPts val="0"/>
+                        </a:spcBef>
+                        <a:spcAft>
+                          <a:spcPts val="0"/>
+                        </a:spcAft>
+                        <a:buClrTx/>
+                        <a:buSzTx/>
+                        <a:buFontTx/>
+                        <a:buNone/>
+                        <a:tabLst/>
+                        <a:defRPr/>
+                      </a:pPr>
+                      <a:r>
+                        <a:rPr lang="en-AU" dirty="0"/>
+                        <a:t>High</a:t>
+                      </a:r>
+                    </a:p>
+                  </a:txBody>
+                  <a:tcPr>
+                    <a:lnL w="12700" cap="flat" cmpd="sng" algn="ctr">
+                      <a:solidFill>
+                        <a:schemeClr val="tx1"/>
+                      </a:solidFill>
+                      <a:prstDash val="solid"/>
+                      <a:round/>
+                      <a:headEnd type="none" w="med" len="med"/>
+                      <a:tailEnd type="none" w="med" len="med"/>
+                    </a:lnL>
+                    <a:lnR w="12700" cap="flat" cmpd="sng" algn="ctr">
+                      <a:solidFill>
+                        <a:schemeClr val="tx1"/>
+                      </a:solidFill>
+                      <a:prstDash val="solid"/>
+                      <a:round/>
+                      <a:headEnd type="none" w="med" len="med"/>
+                      <a:tailEnd type="none" w="med" len="med"/>
+                    </a:lnR>
+                    <a:lnB w="12700" cap="flat" cmpd="sng" algn="ctr">
+                      <a:solidFill>
+                        <a:schemeClr val="tx1"/>
+                      </a:solidFill>
+                      <a:prstDash val="solid"/>
+                      <a:round/>
+                      <a:headEnd type="none" w="med" len="med"/>
+                      <a:tailEnd type="none" w="med" len="med"/>
+                    </a:lnB>
+                  </a:tcPr>
+                </a:tc>
+                <a:tc>
+                  <a:txBody>
+                    <a:bodyPr/>
+                    <a:lstStyle/>
+                    <a:p>
+                      <a:r>
+                        <a:rPr lang="en-AU" dirty="0"/>
+                        <a:t>High</a:t>
+                      </a:r>
+                    </a:p>
+                  </a:txBody>
+                  <a:tcPr>
+                    <a:lnL w="12700" cap="flat" cmpd="sng" algn="ctr">
+                      <a:solidFill>
+                        <a:schemeClr val="tx1"/>
+                      </a:solidFill>
+                      <a:prstDash val="solid"/>
+                      <a:round/>
+                      <a:headEnd type="none" w="med" len="med"/>
+                      <a:tailEnd type="none" w="med" len="med"/>
+                    </a:lnL>
+                    <a:lnR w="12700" cap="flat" cmpd="sng" algn="ctr">
+                      <a:solidFill>
+                        <a:schemeClr val="tx1"/>
+                      </a:solidFill>
+                      <a:prstDash val="solid"/>
+                      <a:round/>
+                      <a:headEnd type="none" w="med" len="med"/>
+                      <a:tailEnd type="none" w="med" len="med"/>
+                    </a:lnR>
+                    <a:lnB w="12700" cap="flat" cmpd="sng" algn="ctr">
+                      <a:solidFill>
+                        <a:schemeClr val="tx1"/>
+                      </a:solidFill>
+                      <a:prstDash val="solid"/>
+                      <a:round/>
+                      <a:headEnd type="none" w="med" len="med"/>
+                      <a:tailEnd type="none" w="med" len="med"/>
+                    </a:lnB>
+                  </a:tcPr>
+                </a:tc>
+                <a:tc>
+                  <a:txBody>
+                    <a:bodyPr/>
+                    <a:lstStyle/>
+                    <a:p>
+                      <a:pPr marL="0" marR="0" lvl="0" indent="0" algn="l" defTabSz="457200" rtl="0" eaLnBrk="1" fontAlgn="auto" latinLnBrk="0" hangingPunct="1">
+                        <a:lnSpc>
+                          <a:spcPct val="100000"/>
+                        </a:lnSpc>
+                        <a:spcBef>
+                          <a:spcPts val="0"/>
+                        </a:spcBef>
+                        <a:spcAft>
+                          <a:spcPts val="0"/>
+                        </a:spcAft>
+                        <a:buClrTx/>
+                        <a:buSzTx/>
+                        <a:buFontTx/>
+                        <a:buNone/>
+                        <a:tabLst/>
+                        <a:defRPr/>
+                      </a:pPr>
+                      <a:r>
+                        <a:rPr lang="en-US" dirty="0"/>
+                        <a:t>Very High</a:t>
+                      </a:r>
+                      <a:endParaRPr lang="en-AU" dirty="0"/>
+                    </a:p>
+                  </a:txBody>
+                  <a:tcPr>
+                    <a:lnL w="12700" cap="flat" cmpd="sng" algn="ctr">
+                      <a:solidFill>
+                        <a:schemeClr val="tx1"/>
+                      </a:solidFill>
+                      <a:prstDash val="solid"/>
+                      <a:round/>
+                      <a:headEnd type="none" w="med" len="med"/>
+                      <a:tailEnd type="none" w="med" len="med"/>
+                    </a:lnL>
+                    <a:lnR w="12700" cap="flat" cmpd="sng" algn="ctr">
+                      <a:solidFill>
+                        <a:schemeClr val="tx1"/>
+                      </a:solidFill>
+                      <a:prstDash val="solid"/>
+                      <a:round/>
+                      <a:headEnd type="none" w="med" len="med"/>
+                      <a:tailEnd type="none" w="med" len="med"/>
+                    </a:lnR>
+                    <a:lnB w="12700" cap="flat" cmpd="sng" algn="ctr">
+                      <a:solidFill>
+                        <a:schemeClr val="tx1"/>
+                      </a:solidFill>
+                      <a:prstDash val="solid"/>
+                      <a:round/>
+                      <a:headEnd type="none" w="med" len="med"/>
+                      <a:tailEnd type="none" w="med" len="med"/>
+                    </a:lnB>
+                  </a:tcPr>
+                </a:tc>
+                <a:extLst>
+                  <a:ext uri="{0D108BD9-81ED-4DB2-BD59-A6C34878D82A}">
+                    <a16:rowId xmlns:a16="http://schemas.microsoft.com/office/drawing/2014/main" val="760578136"/>
+                  </a:ext>
+                </a:extLst>
+              </a:tr>
+              <a:tr h="243840">
+                <a:tc>
+                  <a:txBody>
+                    <a:bodyPr/>
+                    <a:lstStyle/>
+                    <a:p>
+                      <a:r>
+                        <a:rPr lang="en-US" b="1" dirty="0"/>
+                        <a:t>Ideal for:</a:t>
+                      </a:r>
+                      <a:endParaRPr lang="en-AU" b="1" dirty="0"/>
+                    </a:p>
+                  </a:txBody>
+                  <a:tcPr>
+                    <a:lnL w="12700" cap="flat" cmpd="sng" algn="ctr">
+                      <a:solidFill>
+                        <a:schemeClr val="tx1"/>
+                      </a:solidFill>
+                      <a:prstDash val="solid"/>
+                      <a:round/>
+                      <a:headEnd type="none" w="med" len="med"/>
+                      <a:tailEnd type="none" w="med" len="med"/>
+                    </a:lnL>
+                    <a:lnR w="12700" cap="flat" cmpd="sng" algn="ctr">
+                      <a:solidFill>
+                        <a:schemeClr val="tx1"/>
+                      </a:solidFill>
+                      <a:prstDash val="solid"/>
+                      <a:round/>
+                      <a:headEnd type="none" w="med" len="med"/>
+                      <a:tailEnd type="none" w="med" len="med"/>
+                    </a:lnR>
+                    <a:lnT w="12700" cap="flat" cmpd="sng" algn="ctr">
+                      <a:solidFill>
+                        <a:schemeClr val="tx1"/>
+                      </a:solidFill>
+                      <a:prstDash val="solid"/>
+                      <a:round/>
+                      <a:headEnd type="none" w="med" len="med"/>
+                      <a:tailEnd type="none" w="med" len="med"/>
+                    </a:lnT>
+                  </a:tcPr>
+                </a:tc>
+                <a:tc>
+                  <a:txBody>
+                    <a:bodyPr/>
+                    <a:lstStyle/>
+                    <a:p>
+                      <a:r>
+                        <a:rPr lang="en-US" b="1" dirty="0"/>
+                        <a:t>Ideal for:</a:t>
+                      </a:r>
+                      <a:endParaRPr lang="en-AU" b="1" dirty="0"/>
+                    </a:p>
+                  </a:txBody>
+                  <a:tcPr>
+                    <a:lnL w="12700" cap="flat" cmpd="sng" algn="ctr">
+                      <a:solidFill>
+                        <a:schemeClr val="tx1"/>
+                      </a:solidFill>
+                      <a:prstDash val="solid"/>
+                      <a:round/>
+                      <a:headEnd type="none" w="med" len="med"/>
+                      <a:tailEnd type="none" w="med" len="med"/>
+                    </a:lnL>
+                    <a:lnR w="12700" cap="flat" cmpd="sng" algn="ctr">
+                      <a:solidFill>
+                        <a:schemeClr val="tx1"/>
+                      </a:solidFill>
+                      <a:prstDash val="solid"/>
+                      <a:round/>
+                      <a:headEnd type="none" w="med" len="med"/>
+                      <a:tailEnd type="none" w="med" len="med"/>
+                    </a:lnR>
+                    <a:lnT w="12700" cap="flat" cmpd="sng" algn="ctr">
+                      <a:solidFill>
+                        <a:schemeClr val="tx1"/>
+                      </a:solidFill>
+                      <a:prstDash val="solid"/>
+                      <a:round/>
+                      <a:headEnd type="none" w="med" len="med"/>
+                      <a:tailEnd type="none" w="med" len="med"/>
+                    </a:lnT>
+                  </a:tcPr>
+                </a:tc>
+                <a:tc>
+                  <a:txBody>
+                    <a:bodyPr/>
+                    <a:lstStyle/>
+                    <a:p>
+                      <a:r>
+                        <a:rPr lang="en-US" b="1" dirty="0"/>
+                        <a:t>Ideal for:</a:t>
+                      </a:r>
+                      <a:endParaRPr lang="en-AU" b="1" dirty="0"/>
+                    </a:p>
+                  </a:txBody>
+                  <a:tcPr>
+                    <a:lnL w="12700" cap="flat" cmpd="sng" algn="ctr">
+                      <a:solidFill>
+                        <a:schemeClr val="tx1"/>
+                      </a:solidFill>
+                      <a:prstDash val="solid"/>
+                      <a:round/>
+                      <a:headEnd type="none" w="med" len="med"/>
+                      <a:tailEnd type="none" w="med" len="med"/>
+                    </a:lnL>
+                    <a:lnR w="12700" cap="flat" cmpd="sng" algn="ctr">
+                      <a:solidFill>
+                        <a:schemeClr val="tx1"/>
+                      </a:solidFill>
+                      <a:prstDash val="solid"/>
+                      <a:round/>
+                      <a:headEnd type="none" w="med" len="med"/>
+                      <a:tailEnd type="none" w="med" len="med"/>
+                    </a:lnR>
+                    <a:lnT w="12700" cap="flat" cmpd="sng" algn="ctr">
+                      <a:solidFill>
+                        <a:schemeClr val="tx1"/>
+                      </a:solidFill>
+                      <a:prstDash val="solid"/>
+                      <a:round/>
+                      <a:headEnd type="none" w="med" len="med"/>
+                      <a:tailEnd type="none" w="med" len="med"/>
+                    </a:lnT>
+                  </a:tcPr>
+                </a:tc>
+                <a:extLst>
+                  <a:ext uri="{0D108BD9-81ED-4DB2-BD59-A6C34878D82A}">
+                    <a16:rowId xmlns:a16="http://schemas.microsoft.com/office/drawing/2014/main" val="2505381856"/>
+                  </a:ext>
+                </a:extLst>
+              </a:tr>
+              <a:tr h="121920">
+                <a:tc>
+                  <a:txBody>
+                    <a:bodyPr/>
+                    <a:lstStyle/>
+                    <a:p>
+                      <a:r>
+                        <a:rPr lang="en-US" dirty="0"/>
+                        <a:t>Small/moderate size families</a:t>
+                      </a:r>
+                      <a:endParaRPr lang="en-AU" dirty="0"/>
+                    </a:p>
+                  </a:txBody>
+                  <a:tcPr>
+                    <a:lnL w="12700" cap="flat" cmpd="sng" algn="ctr">
+                      <a:solidFill>
+                        <a:schemeClr val="tx1"/>
+                      </a:solidFill>
+                      <a:prstDash val="solid"/>
+                      <a:round/>
+                      <a:headEnd type="none" w="med" len="med"/>
+                      <a:tailEnd type="none" w="med" len="med"/>
+                    </a:lnL>
+                    <a:lnR w="12700" cap="flat" cmpd="sng" algn="ctr">
+                      <a:solidFill>
+                        <a:schemeClr val="tx1"/>
+                      </a:solidFill>
+                      <a:prstDash val="solid"/>
+                      <a:round/>
+                      <a:headEnd type="none" w="med" len="med"/>
+                      <a:tailEnd type="none" w="med" len="med"/>
+                    </a:lnR>
+                    <a:lnB w="12700" cap="flat" cmpd="sng" algn="ctr">
+                      <a:solidFill>
+                        <a:schemeClr val="tx1"/>
+                      </a:solidFill>
+                      <a:prstDash val="solid"/>
+                      <a:round/>
+                      <a:headEnd type="none" w="med" len="med"/>
+                      <a:tailEnd type="none" w="med" len="med"/>
+                    </a:lnB>
+                  </a:tcPr>
+                </a:tc>
+                <a:tc>
+                  <a:txBody>
+                    <a:bodyPr/>
+                    <a:lstStyle/>
+                    <a:p>
+                      <a:r>
+                        <a:rPr lang="en-US" dirty="0"/>
+                        <a:t>Moderate size families/Multi-generation houses</a:t>
+                      </a:r>
+                      <a:endParaRPr lang="en-AU" dirty="0"/>
+                    </a:p>
+                  </a:txBody>
+                  <a:tcPr>
+                    <a:lnL w="12700" cap="flat" cmpd="sng" algn="ctr">
+                      <a:solidFill>
+                        <a:schemeClr val="tx1"/>
+                      </a:solidFill>
+                      <a:prstDash val="solid"/>
+                      <a:round/>
+                      <a:headEnd type="none" w="med" len="med"/>
+                      <a:tailEnd type="none" w="med" len="med"/>
+                    </a:lnL>
+                    <a:lnR w="12700" cap="flat" cmpd="sng" algn="ctr">
+                      <a:solidFill>
+                        <a:schemeClr val="tx1"/>
+                      </a:solidFill>
+                      <a:prstDash val="solid"/>
+                      <a:round/>
+                      <a:headEnd type="none" w="med" len="med"/>
+                      <a:tailEnd type="none" w="med" len="med"/>
+                    </a:lnR>
+                    <a:lnB w="12700" cap="flat" cmpd="sng" algn="ctr">
+                      <a:solidFill>
+                        <a:schemeClr val="tx1"/>
+                      </a:solidFill>
+                      <a:prstDash val="solid"/>
+                      <a:round/>
+                      <a:headEnd type="none" w="med" len="med"/>
+                      <a:tailEnd type="none" w="med" len="med"/>
+                    </a:lnB>
+                  </a:tcPr>
+                </a:tc>
+                <a:tc>
+                  <a:txBody>
+                    <a:bodyPr/>
+                    <a:lstStyle/>
+                    <a:p>
+                      <a:r>
+                        <a:rPr lang="en-US" dirty="0"/>
+                        <a:t>Large families/Multi-generation houses</a:t>
+                      </a:r>
+                      <a:endParaRPr lang="en-AU" dirty="0"/>
+                    </a:p>
+                  </a:txBody>
+                  <a:tcPr>
+                    <a:lnL w="12700" cap="flat" cmpd="sng" algn="ctr">
+                      <a:solidFill>
+                        <a:schemeClr val="tx1"/>
+                      </a:solidFill>
+                      <a:prstDash val="solid"/>
+                      <a:round/>
+                      <a:headEnd type="none" w="med" len="med"/>
+                      <a:tailEnd type="none" w="med" len="med"/>
+                    </a:lnL>
+                    <a:lnR w="12700" cap="flat" cmpd="sng" algn="ctr">
+                      <a:solidFill>
+                        <a:schemeClr val="tx1"/>
+                      </a:solidFill>
+                      <a:prstDash val="solid"/>
+                      <a:round/>
+                      <a:headEnd type="none" w="med" len="med"/>
+                      <a:tailEnd type="none" w="med" len="med"/>
+                    </a:lnR>
+                    <a:lnB w="12700" cap="flat" cmpd="sng" algn="ctr">
+                      <a:solidFill>
+                        <a:schemeClr val="tx1"/>
+                      </a:solidFill>
+                      <a:prstDash val="solid"/>
+                      <a:round/>
+                      <a:headEnd type="none" w="med" len="med"/>
+                      <a:tailEnd type="none" w="med" len="med"/>
+                    </a:lnB>
+                  </a:tcPr>
+                </a:tc>
+                <a:extLst>
+                  <a:ext uri="{0D108BD9-81ED-4DB2-BD59-A6C34878D82A}">
+                    <a16:rowId xmlns:a16="http://schemas.microsoft.com/office/drawing/2014/main" val="709454287"/>
+                  </a:ext>
+                </a:extLst>
+              </a:tr>
+            </a:tbl>
+          </a:graphicData>
+        </a:graphic>
+      </p:graphicFrame>
     </p:spTree>
   </p:cSld>
   <p:clrMapOvr>
@@ -5264,7 +7693,12 @@
             <p:ph type="title"/>
           </p:nvPr>
         </p:nvSpPr>
-        <p:spPr/>
+        <p:spPr>
+          <a:xfrm>
+            <a:off x="457200" y="128044"/>
+            <a:ext cx="8229600" cy="842962"/>
+          </a:xfrm>
+        </p:spPr>
         <p:txBody>
           <a:bodyPr>
             <a:normAutofit/>
@@ -5288,49 +7722,451 @@
           </a:p>
         </p:txBody>
       </p:sp>
-      <p:sp>
-        <p:nvSpPr>
-          <p:cNvPr id="3" name="Content Placeholder 2"/>
-          <p:cNvSpPr>
-            <a:spLocks noGrp="1"/>
-          </p:cNvSpPr>
-          <p:nvPr>
-            <p:ph idx="1"/>
-          </p:nvPr>
-        </p:nvSpPr>
-        <p:spPr/>
-        <p:txBody>
-          <a:bodyPr/>
-          <a:lstStyle/>
-          <a:p>
-            <a:r>
-              <a:rPr lang="en-AU" sz="2000" dirty="0"/>
-              <a:t>Our quest to retrieve data</a:t>
-            </a:r>
-          </a:p>
-          <a:p>
-            <a:r>
-              <a:rPr lang="en-AU" sz="2000" dirty="0"/>
-              <a:t>Knowledge sharing </a:t>
-            </a:r>
-          </a:p>
-          <a:p>
-            <a:r>
-              <a:rPr lang="en-AU" sz="2000" dirty="0"/>
-              <a:t>Teamwork</a:t>
-            </a:r>
-          </a:p>
-          <a:p>
-            <a:r>
-              <a:rPr lang="en-AU" sz="2000" dirty="0"/>
-              <a:t>Collaboration</a:t>
-            </a:r>
-          </a:p>
-          <a:p>
-            <a:endParaRPr dirty="0"/>
-          </a:p>
-        </p:txBody>
-      </p:sp>
+      <p:graphicFrame>
+        <p:nvGraphicFramePr>
+          <p:cNvPr id="9" name="Table 8">
+            <a:extLst>
+              <a:ext uri="{FF2B5EF4-FFF2-40B4-BE49-F238E27FC236}">
+                <a16:creationId xmlns:a16="http://schemas.microsoft.com/office/drawing/2014/main" id="{0DE1F396-E4AE-2CCD-CCEB-A267C6193549}"/>
+              </a:ext>
+            </a:extLst>
+          </p:cNvPr>
+          <p:cNvGraphicFramePr>
+            <a:graphicFrameLocks noGrp="1"/>
+          </p:cNvGraphicFramePr>
+          <p:nvPr>
+            <p:extLst>
+              <p:ext uri="{D42A27DB-BD31-4B8C-83A1-F6EECF244321}">
+                <p14:modId xmlns:p14="http://schemas.microsoft.com/office/powerpoint/2010/main" val="2294519606"/>
+              </p:ext>
+            </p:extLst>
+          </p:nvPr>
+        </p:nvGraphicFramePr>
+        <p:xfrm>
+          <a:off x="333829" y="859971"/>
+          <a:ext cx="8505372" cy="2576207"/>
+        </p:xfrm>
+        <a:graphic>
+          <a:graphicData uri="http://schemas.openxmlformats.org/drawingml/2006/table">
+            <a:tbl>
+              <a:tblPr firstRow="1" bandRow="1">
+                <a:tableStyleId>{5C22544A-7EE6-4342-B048-85BDC9FD1C3A}</a:tableStyleId>
+              </a:tblPr>
+              <a:tblGrid>
+                <a:gridCol w="4252686">
+                  <a:extLst>
+                    <a:ext uri="{9D8B030D-6E8A-4147-A177-3AD203B41FA5}">
+                      <a16:colId xmlns:a16="http://schemas.microsoft.com/office/drawing/2014/main" val="1776723677"/>
+                    </a:ext>
+                  </a:extLst>
+                </a:gridCol>
+                <a:gridCol w="4252686">
+                  <a:extLst>
+                    <a:ext uri="{9D8B030D-6E8A-4147-A177-3AD203B41FA5}">
+                      <a16:colId xmlns:a16="http://schemas.microsoft.com/office/drawing/2014/main" val="1651060396"/>
+                    </a:ext>
+                  </a:extLst>
+                </a:gridCol>
+              </a:tblGrid>
+              <a:tr h="358583">
+                <a:tc>
+                  <a:txBody>
+                    <a:bodyPr/>
+                    <a:lstStyle/>
+                    <a:p>
+                      <a:r>
+                        <a:rPr lang="en-US" dirty="0"/>
+                        <a:t>Data Retrieval</a:t>
+                      </a:r>
+                      <a:endParaRPr lang="en-AU" dirty="0"/>
+                    </a:p>
+                  </a:txBody>
+                  <a:tcPr/>
+                </a:tc>
+                <a:tc>
+                  <a:txBody>
+                    <a:bodyPr/>
+                    <a:lstStyle/>
+                    <a:p>
+                      <a:r>
+                        <a:rPr lang="en-US" dirty="0"/>
+                        <a:t>Data Analysis</a:t>
+                      </a:r>
+                      <a:endParaRPr lang="en-AU" dirty="0"/>
+                    </a:p>
+                  </a:txBody>
+                  <a:tcPr/>
+                </a:tc>
+                <a:extLst>
+                  <a:ext uri="{0D108BD9-81ED-4DB2-BD59-A6C34878D82A}">
+                    <a16:rowId xmlns:a16="http://schemas.microsoft.com/office/drawing/2014/main" val="4283228724"/>
+                  </a:ext>
+                </a:extLst>
+              </a:tr>
+              <a:tr h="2210447">
+                <a:tc>
+                  <a:txBody>
+                    <a:bodyPr/>
+                    <a:lstStyle/>
+                    <a:p>
+                      <a:pPr marL="285750" indent="-285750">
+                        <a:lnSpc>
+                          <a:spcPct val="150000"/>
+                        </a:lnSpc>
+                        <a:buFont typeface="Wingdings" panose="05000000000000000000" pitchFamily="2" charset="2"/>
+                        <a:buChar char="§"/>
+                      </a:pPr>
+                      <a:r>
+                        <a:rPr lang="en-US" dirty="0"/>
+                        <a:t>Inspect the raw data:</a:t>
+                      </a:r>
+                    </a:p>
+                    <a:p>
+                      <a:pPr marL="742950" lvl="1" indent="-285750">
+                        <a:lnSpc>
+                          <a:spcPct val="100000"/>
+                        </a:lnSpc>
+                        <a:buFont typeface="Arial" panose="020B0604020202020204" pitchFamily="34" charset="0"/>
+                        <a:buChar char="•"/>
+                      </a:pPr>
+                      <a:r>
+                        <a:rPr lang="en-US" dirty="0"/>
+                        <a:t>Headers.</a:t>
+                      </a:r>
+                    </a:p>
+                    <a:p>
+                      <a:pPr marL="742950" lvl="1" indent="-285750">
+                        <a:lnSpc>
+                          <a:spcPct val="100000"/>
+                        </a:lnSpc>
+                        <a:buFont typeface="Arial" panose="020B0604020202020204" pitchFamily="34" charset="0"/>
+                        <a:buChar char="•"/>
+                      </a:pPr>
+                      <a:r>
+                        <a:rPr lang="en-US" dirty="0"/>
+                        <a:t>Data labels.</a:t>
+                      </a:r>
+                    </a:p>
+                    <a:p>
+                      <a:pPr marL="742950" lvl="1" indent="-285750">
+                        <a:lnSpc>
+                          <a:spcPct val="100000"/>
+                        </a:lnSpc>
+                        <a:buFont typeface="Arial" panose="020B0604020202020204" pitchFamily="34" charset="0"/>
+                        <a:buChar char="•"/>
+                      </a:pPr>
+                      <a:r>
+                        <a:rPr lang="en-US" dirty="0"/>
+                        <a:t>Zero or n/a values.</a:t>
+                      </a:r>
+                    </a:p>
+                    <a:p>
+                      <a:pPr marL="285750" lvl="0" indent="-285750">
+                        <a:lnSpc>
+                          <a:spcPct val="150000"/>
+                        </a:lnSpc>
+                        <a:buFont typeface="Wingdings" panose="05000000000000000000" pitchFamily="2" charset="2"/>
+                        <a:buChar char="§"/>
+                      </a:pPr>
+                      <a:r>
+                        <a:rPr lang="en-US" dirty="0"/>
+                        <a:t>Diverse Data</a:t>
+                      </a:r>
+                    </a:p>
+                    <a:p>
+                      <a:pPr marL="285750" indent="-285750">
+                        <a:lnSpc>
+                          <a:spcPct val="150000"/>
+                        </a:lnSpc>
+                        <a:buFont typeface="Arial" panose="020B0604020202020204" pitchFamily="34" charset="0"/>
+                        <a:buChar char="•"/>
+                      </a:pPr>
+                      <a:endParaRPr lang="en-AU" dirty="0"/>
+                    </a:p>
+                  </a:txBody>
+                  <a:tcPr/>
+                </a:tc>
+                <a:tc>
+                  <a:txBody>
+                    <a:bodyPr/>
+                    <a:lstStyle/>
+                    <a:p>
+                      <a:pPr marL="450000" indent="-285750">
+                        <a:lnSpc>
+                          <a:spcPct val="150000"/>
+                        </a:lnSpc>
+                        <a:buFont typeface="Wingdings" panose="05000000000000000000" pitchFamily="2" charset="2"/>
+                        <a:buChar char="§"/>
+                      </a:pPr>
+                      <a:r>
+                        <a:rPr lang="en-US" dirty="0"/>
+                        <a:t>Data lengths:</a:t>
+                      </a:r>
+                    </a:p>
+                    <a:p>
+                      <a:pPr marL="907200" lvl="2" indent="-285750">
+                        <a:lnSpc>
+                          <a:spcPct val="100000"/>
+                        </a:lnSpc>
+                        <a:buFont typeface="Arial" panose="020B0604020202020204" pitchFamily="34" charset="0"/>
+                        <a:buChar char="•"/>
+                      </a:pPr>
+                      <a:r>
+                        <a:rPr lang="en-US" dirty="0"/>
+                        <a:t>Complete information.</a:t>
+                      </a:r>
+                    </a:p>
+                    <a:p>
+                      <a:pPr marL="907200" lvl="2" indent="-285750">
+                        <a:lnSpc>
+                          <a:spcPct val="100000"/>
+                        </a:lnSpc>
+                        <a:buFont typeface="Arial" panose="020B0604020202020204" pitchFamily="34" charset="0"/>
+                        <a:buChar char="•"/>
+                      </a:pPr>
+                      <a:r>
+                        <a:rPr lang="en-US" dirty="0"/>
+                        <a:t>Correct labels.</a:t>
+                      </a:r>
+                    </a:p>
+                    <a:p>
+                      <a:pPr marL="450000" lvl="0" indent="-285750">
+                        <a:lnSpc>
+                          <a:spcPct val="150000"/>
+                        </a:lnSpc>
+                        <a:buFont typeface="Wingdings" panose="05000000000000000000" pitchFamily="2" charset="2"/>
+                        <a:buChar char="§"/>
+                      </a:pPr>
+                      <a:r>
+                        <a:rPr lang="en-AU" dirty="0"/>
+                        <a:t>Visualisations:</a:t>
+                      </a:r>
+                    </a:p>
+                    <a:p>
+                      <a:pPr marL="907200" lvl="2" indent="-285750">
+                        <a:lnSpc>
+                          <a:spcPct val="100000"/>
+                        </a:lnSpc>
+                        <a:buFont typeface="Arial" panose="020B0604020202020204" pitchFamily="34" charset="0"/>
+                        <a:buChar char="•"/>
+                      </a:pPr>
+                      <a:r>
+                        <a:rPr lang="en-AU" dirty="0"/>
+                        <a:t>Visualisation type &amp; format.</a:t>
+                      </a:r>
+                    </a:p>
+                    <a:p>
+                      <a:pPr marL="907200" lvl="2" indent="-285750">
+                        <a:lnSpc>
+                          <a:spcPct val="100000"/>
+                        </a:lnSpc>
+                        <a:buFont typeface="Arial" panose="020B0604020202020204" pitchFamily="34" charset="0"/>
+                        <a:buChar char="•"/>
+                      </a:pPr>
+                      <a:r>
+                        <a:rPr lang="en-AU" dirty="0"/>
+                        <a:t>Identify trends.</a:t>
+                      </a:r>
+                    </a:p>
+                  </a:txBody>
+                  <a:tcPr/>
+                </a:tc>
+                <a:extLst>
+                  <a:ext uri="{0D108BD9-81ED-4DB2-BD59-A6C34878D82A}">
+                    <a16:rowId xmlns:a16="http://schemas.microsoft.com/office/drawing/2014/main" val="1503972827"/>
+                  </a:ext>
+                </a:extLst>
+              </a:tr>
+            </a:tbl>
+          </a:graphicData>
+        </a:graphic>
+      </p:graphicFrame>
+      <p:graphicFrame>
+        <p:nvGraphicFramePr>
+          <p:cNvPr id="10" name="Table 9">
+            <a:extLst>
+              <a:ext uri="{FF2B5EF4-FFF2-40B4-BE49-F238E27FC236}">
+                <a16:creationId xmlns:a16="http://schemas.microsoft.com/office/drawing/2014/main" id="{D537C71E-B747-83ED-B05A-F287C2A03D6D}"/>
+              </a:ext>
+            </a:extLst>
+          </p:cNvPr>
+          <p:cNvGraphicFramePr>
+            <a:graphicFrameLocks noGrp="1"/>
+          </p:cNvGraphicFramePr>
+          <p:nvPr>
+            <p:extLst>
+              <p:ext uri="{D42A27DB-BD31-4B8C-83A1-F6EECF244321}">
+                <p14:modId xmlns:p14="http://schemas.microsoft.com/office/powerpoint/2010/main" val="3088745086"/>
+              </p:ext>
+            </p:extLst>
+          </p:nvPr>
+        </p:nvGraphicFramePr>
+        <p:xfrm>
+          <a:off x="333829" y="3660819"/>
+          <a:ext cx="8505372" cy="2705582"/>
+        </p:xfrm>
+        <a:graphic>
+          <a:graphicData uri="http://schemas.openxmlformats.org/drawingml/2006/table">
+            <a:tbl>
+              <a:tblPr firstRow="1" bandRow="1">
+                <a:tableStyleId>{5C22544A-7EE6-4342-B048-85BDC9FD1C3A}</a:tableStyleId>
+              </a:tblPr>
+              <a:tblGrid>
+                <a:gridCol w="4252686">
+                  <a:extLst>
+                    <a:ext uri="{9D8B030D-6E8A-4147-A177-3AD203B41FA5}">
+                      <a16:colId xmlns:a16="http://schemas.microsoft.com/office/drawing/2014/main" val="3081058095"/>
+                    </a:ext>
+                  </a:extLst>
+                </a:gridCol>
+                <a:gridCol w="4252686">
+                  <a:extLst>
+                    <a:ext uri="{9D8B030D-6E8A-4147-A177-3AD203B41FA5}">
+                      <a16:colId xmlns:a16="http://schemas.microsoft.com/office/drawing/2014/main" val="27390030"/>
+                    </a:ext>
+                  </a:extLst>
+                </a:gridCol>
+              </a:tblGrid>
+              <a:tr h="397059">
+                <a:tc>
+                  <a:txBody>
+                    <a:bodyPr/>
+                    <a:lstStyle/>
+                    <a:p>
+                      <a:r>
+                        <a:rPr lang="en-US" dirty="0"/>
+                        <a:t>Collaboration</a:t>
+                      </a:r>
+                      <a:endParaRPr lang="en-AU" dirty="0"/>
+                    </a:p>
+                  </a:txBody>
+                  <a:tcPr/>
+                </a:tc>
+                <a:tc>
+                  <a:txBody>
+                    <a:bodyPr/>
+                    <a:lstStyle/>
+                    <a:p>
+                      <a:r>
+                        <a:rPr lang="en-US" dirty="0"/>
+                        <a:t>Knowledge Sharing</a:t>
+                      </a:r>
+                      <a:endParaRPr lang="en-AU" dirty="0"/>
+                    </a:p>
+                  </a:txBody>
+                  <a:tcPr/>
+                </a:tc>
+                <a:extLst>
+                  <a:ext uri="{0D108BD9-81ED-4DB2-BD59-A6C34878D82A}">
+                    <a16:rowId xmlns:a16="http://schemas.microsoft.com/office/drawing/2014/main" val="1385962734"/>
+                  </a:ext>
+                </a:extLst>
+              </a:tr>
+              <a:tr h="2308523">
+                <a:tc>
+                  <a:txBody>
+                    <a:bodyPr/>
+                    <a:lstStyle/>
+                    <a:p>
+                      <a:pPr marL="285750" indent="-285750">
+                        <a:lnSpc>
+                          <a:spcPct val="150000"/>
+                        </a:lnSpc>
+                        <a:buFont typeface="Wingdings" panose="05000000000000000000" pitchFamily="2" charset="2"/>
+                        <a:buChar char="§"/>
+                      </a:pPr>
+                      <a:r>
+                        <a:rPr lang="en-US" dirty="0"/>
+                        <a:t>Direction.</a:t>
+                      </a:r>
+                    </a:p>
+                    <a:p>
+                      <a:pPr marL="285750" indent="-285750">
+                        <a:lnSpc>
+                          <a:spcPct val="150000"/>
+                        </a:lnSpc>
+                        <a:buFont typeface="Wingdings" panose="05000000000000000000" pitchFamily="2" charset="2"/>
+                        <a:buChar char="§"/>
+                      </a:pPr>
+                      <a:r>
+                        <a:rPr lang="en-US" dirty="0"/>
+                        <a:t>Strengths &amp; weaknesses.</a:t>
+                      </a:r>
+                    </a:p>
+                    <a:p>
+                      <a:pPr marL="285750" indent="-285750">
+                        <a:lnSpc>
+                          <a:spcPct val="150000"/>
+                        </a:lnSpc>
+                        <a:buFont typeface="Wingdings" panose="05000000000000000000" pitchFamily="2" charset="2"/>
+                        <a:buChar char="§"/>
+                      </a:pPr>
+                      <a:r>
+                        <a:rPr lang="en-US" dirty="0"/>
+                        <a:t>Code.</a:t>
+                      </a:r>
+                    </a:p>
+                    <a:p>
+                      <a:pPr marL="285750" indent="-285750">
+                        <a:lnSpc>
+                          <a:spcPct val="150000"/>
+                        </a:lnSpc>
+                        <a:buFont typeface="Wingdings" panose="05000000000000000000" pitchFamily="2" charset="2"/>
+                        <a:buChar char="§"/>
+                      </a:pPr>
+                      <a:r>
+                        <a:rPr lang="en-US" dirty="0"/>
+                        <a:t>Criticism.</a:t>
+                      </a:r>
+                      <a:endParaRPr lang="en-AU" dirty="0"/>
+                    </a:p>
+                  </a:txBody>
+                  <a:tcPr/>
+                </a:tc>
+                <a:tc>
+                  <a:txBody>
+                    <a:bodyPr/>
+                    <a:lstStyle/>
+                    <a:p>
+                      <a:pPr marL="285750" indent="-285750">
+                        <a:lnSpc>
+                          <a:spcPct val="150000"/>
+                        </a:lnSpc>
+                        <a:buFont typeface="Wingdings" panose="05000000000000000000" pitchFamily="2" charset="2"/>
+                        <a:buChar char="§"/>
+                      </a:pPr>
+                      <a:r>
+                        <a:rPr lang="en-US" dirty="0"/>
+                        <a:t>Share your information and data sources.</a:t>
+                      </a:r>
+                    </a:p>
+                    <a:p>
+                      <a:pPr marL="285750" indent="-285750">
+                        <a:lnSpc>
+                          <a:spcPct val="150000"/>
+                        </a:lnSpc>
+                        <a:buFont typeface="Wingdings" panose="05000000000000000000" pitchFamily="2" charset="2"/>
+                        <a:buChar char="§"/>
+                      </a:pPr>
+                      <a:r>
+                        <a:rPr lang="en-US" dirty="0"/>
+                        <a:t>Report difficulties early on.</a:t>
+                      </a:r>
+                      <a:endParaRPr lang="en-AU" dirty="0"/>
+                    </a:p>
+                  </a:txBody>
+                  <a:tcPr/>
+                </a:tc>
+                <a:extLst>
+                  <a:ext uri="{0D108BD9-81ED-4DB2-BD59-A6C34878D82A}">
+                    <a16:rowId xmlns:a16="http://schemas.microsoft.com/office/drawing/2014/main" val="4118187331"/>
+                  </a:ext>
+                </a:extLst>
+              </a:tr>
+            </a:tbl>
+          </a:graphicData>
+        </a:graphic>
+      </p:graphicFrame>
     </p:spTree>
   </p:cSld>
   <p:clrMapOvr>

</xml_diff>

<commit_message>
Added correlations to the figures and cleaned up the powerpoint
</commit_message>
<xml_diff>
--- a/Presentation/Open_Spaces_Presentation.pptx
+++ b/Presentation/Open_Spaces_Presentation.pptx
@@ -137,6 +137,9 @@
         </p15:guide>
       </p15:sldGuideLst>
     </p:ext>
+    <p:ext uri="{2D200454-40CA-4A62-9FC3-DE9A4176ACB9}">
+      <p15:notesGuideLst xmlns:p15="http://schemas.microsoft.com/office/powerpoint/2012/main"/>
+    </p:ext>
   </p:extLst>
 </p:presentation>
 </file>
@@ -619,52 +622,7 @@
           <a:bodyPr/>
           <a:lstStyle/>
           <a:p>
-            <a:r>
-              <a:rPr lang="en-AU" dirty="0"/>
-              <a:t>It is evident with the above graph that Casey has the greatest number of open spaces and schools.</a:t>
-            </a:r>
-          </a:p>
-          <a:p>
-            <a:endParaRPr lang="en-AU" dirty="0"/>
-          </a:p>
-          <a:p>
-            <a:pPr marL="0" marR="0" lvl="0" indent="0" algn="l" defTabSz="914400" rtl="0" eaLnBrk="1" fontAlgn="auto" latinLnBrk="0" hangingPunct="1">
-              <a:lnSpc>
-                <a:spcPct val="100000"/>
-              </a:lnSpc>
-              <a:spcBef>
-                <a:spcPts val="0"/>
-              </a:spcBef>
-              <a:spcAft>
-                <a:spcPts val="0"/>
-              </a:spcAft>
-              <a:buClrTx/>
-              <a:buSzTx/>
-              <a:buFontTx/>
-              <a:buNone/>
-              <a:tabLst/>
-              <a:defRPr/>
-            </a:pPr>
-            <a:r>
-              <a:rPr lang="en-US" dirty="0"/>
-              <a:t>Last slide </a:t>
-            </a:r>
-            <a:r>
-              <a:rPr lang="en-US"/>
-              <a:t>– Laura </a:t>
-            </a:r>
-            <a:r>
-              <a:rPr lang="en-US" dirty="0"/>
-              <a:t>– Over </a:t>
-            </a:r>
-            <a:r>
-              <a:rPr lang="en-US"/>
-              <a:t>to John</a:t>
-            </a:r>
-            <a:endParaRPr lang="en-AU" dirty="0"/>
-          </a:p>
-          <a:p>
-            <a:endParaRPr lang="en-AU" dirty="0"/>
+            <a:endParaRPr lang="en-AU"/>
           </a:p>
         </p:txBody>
       </p:sp>
@@ -685,7 +643,7 @@
           <a:p>
             <a:fld id="{D2EC087D-094B-4121-A536-202E43873E76}" type="slidenum">
               <a:rPr lang="en-AU" smtClean="0"/>
-              <a:t>12</a:t>
+              <a:t>11</a:t>
             </a:fld>
             <a:endParaRPr lang="en-AU"/>
           </a:p>
@@ -694,7 +652,7 @@
     </p:spTree>
     <p:extLst>
       <p:ext uri="{BB962C8B-B14F-4D97-AF65-F5344CB8AC3E}">
-        <p14:creationId xmlns:p14="http://schemas.microsoft.com/office/powerpoint/2010/main" val="1935141170"/>
+        <p14:creationId xmlns:p14="http://schemas.microsoft.com/office/powerpoint/2010/main" val="4208164843"/>
       </p:ext>
     </p:extLst>
   </p:cSld>
@@ -749,6 +707,135 @@
           <a:lstStyle/>
           <a:p>
             <a:r>
+              <a:rPr lang="en-AU" dirty="0"/>
+              <a:t>It is evident with the above graph that Casey has the greatest number of open spaces and schools.</a:t>
+            </a:r>
+          </a:p>
+          <a:p>
+            <a:endParaRPr lang="en-AU" dirty="0"/>
+          </a:p>
+          <a:p>
+            <a:pPr marL="0" marR="0" lvl="0" indent="0" algn="l" defTabSz="914400" rtl="0" eaLnBrk="1" fontAlgn="auto" latinLnBrk="0" hangingPunct="1">
+              <a:lnSpc>
+                <a:spcPct val="100000"/>
+              </a:lnSpc>
+              <a:spcBef>
+                <a:spcPts val="0"/>
+              </a:spcBef>
+              <a:spcAft>
+                <a:spcPts val="0"/>
+              </a:spcAft>
+              <a:buClrTx/>
+              <a:buSzTx/>
+              <a:buFontTx/>
+              <a:buNone/>
+              <a:tabLst/>
+              <a:defRPr/>
+            </a:pPr>
+            <a:r>
+              <a:rPr lang="en-US" dirty="0"/>
+              <a:t>Last slide </a:t>
+            </a:r>
+            <a:r>
+              <a:rPr lang="en-US"/>
+              <a:t>– Laura </a:t>
+            </a:r>
+            <a:r>
+              <a:rPr lang="en-US" dirty="0"/>
+              <a:t>– Over </a:t>
+            </a:r>
+            <a:r>
+              <a:rPr lang="en-US"/>
+              <a:t>to John</a:t>
+            </a:r>
+            <a:endParaRPr lang="en-AU" dirty="0"/>
+          </a:p>
+          <a:p>
+            <a:endParaRPr lang="en-AU" dirty="0"/>
+          </a:p>
+        </p:txBody>
+      </p:sp>
+      <p:sp>
+        <p:nvSpPr>
+          <p:cNvPr id="4" name="Slide Number Placeholder 3"/>
+          <p:cNvSpPr>
+            <a:spLocks noGrp="1"/>
+          </p:cNvSpPr>
+          <p:nvPr>
+            <p:ph type="sldNum" sz="quarter" idx="5"/>
+          </p:nvPr>
+        </p:nvSpPr>
+        <p:spPr/>
+        <p:txBody>
+          <a:bodyPr/>
+          <a:lstStyle/>
+          <a:p>
+            <a:fld id="{D2EC087D-094B-4121-A536-202E43873E76}" type="slidenum">
+              <a:rPr lang="en-AU" smtClean="0"/>
+              <a:t>12</a:t>
+            </a:fld>
+            <a:endParaRPr lang="en-AU"/>
+          </a:p>
+        </p:txBody>
+      </p:sp>
+    </p:spTree>
+    <p:extLst>
+      <p:ext uri="{BB962C8B-B14F-4D97-AF65-F5344CB8AC3E}">
+        <p14:creationId xmlns:p14="http://schemas.microsoft.com/office/powerpoint/2010/main" val="1935141170"/>
+      </p:ext>
+    </p:extLst>
+  </p:cSld>
+  <p:clrMapOvr>
+    <a:masterClrMapping/>
+  </p:clrMapOvr>
+</p:notes>
+</file>
+
+<file path=ppt/notesSlides/notesSlide12.xml><?xml version="1.0" encoding="utf-8"?>
+<p:notes xmlns:a="http://schemas.openxmlformats.org/drawingml/2006/main" xmlns:r="http://schemas.openxmlformats.org/officeDocument/2006/relationships" xmlns:p="http://schemas.openxmlformats.org/presentationml/2006/main">
+  <p:cSld>
+    <p:spTree>
+      <p:nvGrpSpPr>
+        <p:cNvPr id="1" name=""/>
+        <p:cNvGrpSpPr/>
+        <p:nvPr/>
+      </p:nvGrpSpPr>
+      <p:grpSpPr>
+        <a:xfrm>
+          <a:off x="0" y="0"/>
+          <a:ext cx="0" cy="0"/>
+          <a:chOff x="0" y="0"/>
+          <a:chExt cx="0" cy="0"/>
+        </a:xfrm>
+      </p:grpSpPr>
+      <p:sp>
+        <p:nvSpPr>
+          <p:cNvPr id="2" name="Slide Image Placeholder 1"/>
+          <p:cNvSpPr>
+            <a:spLocks noGrp="1" noRot="1" noChangeAspect="1"/>
+          </p:cNvSpPr>
+          <p:nvPr>
+            <p:ph type="sldImg"/>
+          </p:nvPr>
+        </p:nvSpPr>
+        <p:spPr/>
+      </p:sp>
+      <p:sp>
+        <p:nvSpPr>
+          <p:cNvPr id="3" name="Notes Placeholder 2"/>
+          <p:cNvSpPr>
+            <a:spLocks noGrp="1"/>
+          </p:cNvSpPr>
+          <p:nvPr>
+            <p:ph type="body" idx="1"/>
+          </p:nvPr>
+        </p:nvSpPr>
+        <p:spPr/>
+        <p:txBody>
+          <a:bodyPr/>
+          <a:lstStyle/>
+          <a:p>
+            <a:r>
               <a:rPr lang="en-US" dirty="0"/>
               <a:t>CASEY</a:t>
             </a:r>
@@ -1082,7 +1169,7 @@
 </p:notes>
 </file>
 
-<file path=ppt/notesSlides/notesSlide12.xml><?xml version="1.0" encoding="utf-8"?>
+<file path=ppt/notesSlides/notesSlide13.xml><?xml version="1.0" encoding="utf-8"?>
 <p:notes xmlns:a="http://schemas.openxmlformats.org/drawingml/2006/main" xmlns:r="http://schemas.openxmlformats.org/officeDocument/2006/relationships" xmlns:p="http://schemas.openxmlformats.org/presentationml/2006/main">
   <p:cSld>
     <p:spTree>
@@ -1386,7 +1473,7 @@
           <a:p>
             <a:r>
               <a:rPr lang="en-US" dirty="0"/>
-              <a:t>Mitchell, Kingston, Hume and </a:t>
+              <a:t>Mitchell, Kingston and </a:t>
             </a:r>
             <a:r>
               <a:rPr lang="en-US" dirty="0" err="1"/>
@@ -1489,24 +1576,6 @@
           <a:bodyPr/>
           <a:lstStyle/>
           <a:p>
-            <a:r>
-              <a:rPr lang="en-AU" dirty="0"/>
-              <a:t>The above bar graph shows there are 32 LGAs and the number of parks per LGA.</a:t>
-            </a:r>
-          </a:p>
-          <a:p>
-            <a:r>
-              <a:rPr lang="en-AU" dirty="0"/>
-              <a:t>Highest number of parks are in Yarra Ranges and Mitchell has the lowest number of parks.</a:t>
-            </a:r>
-          </a:p>
-          <a:p>
-            <a:r>
-              <a:rPr lang="en-AU" dirty="0"/>
-              <a:t>For new homeowners, factors of a good location like neighbourhood, proximity to amenities will increase the value of their property as per Investopedia.</a:t>
-            </a:r>
-          </a:p>
-          <a:p>
             <a:endParaRPr lang="en-AU" dirty="0"/>
           </a:p>
         </p:txBody>
@@ -1528,7 +1597,7 @@
           <a:p>
             <a:fld id="{D2EC087D-094B-4121-A536-202E43873E76}" type="slidenum">
               <a:rPr lang="en-AU" smtClean="0"/>
-              <a:t>7</a:t>
+              <a:t>5</a:t>
             </a:fld>
             <a:endParaRPr lang="en-AU"/>
           </a:p>
@@ -1537,7 +1606,7 @@
     </p:spTree>
     <p:extLst>
       <p:ext uri="{BB962C8B-B14F-4D97-AF65-F5344CB8AC3E}">
-        <p14:creationId xmlns:p14="http://schemas.microsoft.com/office/powerpoint/2010/main" val="95941557"/>
+        <p14:creationId xmlns:p14="http://schemas.microsoft.com/office/powerpoint/2010/main" val="3165804167"/>
       </p:ext>
     </p:extLst>
   </p:cSld>
@@ -1591,37 +1660,22 @@
           <a:bodyPr/>
           <a:lstStyle/>
           <a:p>
-            <a:endParaRPr lang="en-AU" dirty="0"/>
-          </a:p>
-          <a:p>
-            <a:endParaRPr lang="en-AU" dirty="0"/>
-          </a:p>
-          <a:p>
-            <a:endParaRPr lang="en-AU" dirty="0"/>
-          </a:p>
-          <a:p>
-            <a:pPr marL="0" marR="0" lvl="0" indent="0" algn="l" defTabSz="914400" rtl="0" eaLnBrk="1" fontAlgn="auto" latinLnBrk="0" hangingPunct="1">
-              <a:lnSpc>
-                <a:spcPct val="100000"/>
-              </a:lnSpc>
-              <a:spcBef>
-                <a:spcPts val="0"/>
-              </a:spcBef>
-              <a:spcAft>
-                <a:spcPts val="0"/>
-              </a:spcAft>
-              <a:buClrTx/>
-              <a:buSzTx/>
-              <a:buFontTx/>
-              <a:buNone/>
-              <a:tabLst/>
-              <a:defRPr/>
-            </a:pPr>
-            <a:r>
-              <a:rPr lang="en-US" dirty="0"/>
-              <a:t>Last slide – Sonal – Over to Laura</a:t>
-            </a:r>
-            <a:endParaRPr lang="en-AU" dirty="0"/>
+            <a:r>
+              <a:rPr lang="en-AU" dirty="0"/>
+              <a:t>The above bar graph shows there are 32 LGAs and the number of parks per LGA.</a:t>
+            </a:r>
+          </a:p>
+          <a:p>
+            <a:r>
+              <a:rPr lang="en-AU" dirty="0"/>
+              <a:t>Highest number of parks are in Yarra Ranges and Mitchell has the lowest number of parks.</a:t>
+            </a:r>
+          </a:p>
+          <a:p>
+            <a:r>
+              <a:rPr lang="en-AU" dirty="0"/>
+              <a:t>For new homeowners, factors of a good location like neighbourhood, proximity to amenities will increase the value of their property as per Investopedia.</a:t>
+            </a:r>
           </a:p>
           <a:p>
             <a:endParaRPr lang="en-AU" dirty="0"/>
@@ -1645,7 +1699,7 @@
           <a:p>
             <a:fld id="{D2EC087D-094B-4121-A536-202E43873E76}" type="slidenum">
               <a:rPr lang="en-AU" smtClean="0"/>
-              <a:t>8</a:t>
+              <a:t>7</a:t>
             </a:fld>
             <a:endParaRPr lang="en-AU"/>
           </a:p>
@@ -1654,7 +1708,7 @@
     </p:spTree>
     <p:extLst>
       <p:ext uri="{BB962C8B-B14F-4D97-AF65-F5344CB8AC3E}">
-        <p14:creationId xmlns:p14="http://schemas.microsoft.com/office/powerpoint/2010/main" val="1146690169"/>
+        <p14:creationId xmlns:p14="http://schemas.microsoft.com/office/powerpoint/2010/main" val="95941557"/>
       </p:ext>
     </p:extLst>
   </p:cSld>
@@ -1708,67 +1762,37 @@
           <a:bodyPr/>
           <a:lstStyle/>
           <a:p>
-            <a:r>
-              <a:rPr lang="en-AU" dirty="0"/>
-              <a:t>The above bar graph shows the different types of schools per LGA.</a:t>
-            </a:r>
-          </a:p>
-          <a:p>
-            <a:r>
-              <a:rPr lang="en-AU" dirty="0"/>
-              <a:t>Families with kids would prefer buying a property which is near schools due to</a:t>
-            </a:r>
-          </a:p>
-          <a:p>
-            <a:r>
-              <a:rPr lang="en-AU" dirty="0"/>
-              <a:t>-improved investment returns </a:t>
-            </a:r>
-          </a:p>
-          <a:p>
-            <a:r>
-              <a:rPr lang="en-AU" dirty="0"/>
-              <a:t>-easy accessibility to schools</a:t>
-            </a:r>
-          </a:p>
-          <a:p>
-            <a:r>
-              <a:rPr lang="en-AU" dirty="0"/>
-              <a:t>-Safer neighbourhood</a:t>
-            </a:r>
-          </a:p>
-          <a:p>
-            <a:r>
-              <a:rPr lang="en-AU" dirty="0"/>
-              <a:t>-Sense of community</a:t>
-            </a:r>
-          </a:p>
-          <a:p>
             <a:endParaRPr lang="en-AU" dirty="0"/>
           </a:p>
           <a:p>
-            <a:r>
-              <a:rPr lang="en-AU" dirty="0"/>
-              <a:t>Cons</a:t>
-            </a:r>
-          </a:p>
-          <a:p>
-            <a:r>
-              <a:rPr lang="en-AU" dirty="0"/>
-              <a:t>-Noisy</a:t>
-            </a:r>
-          </a:p>
-          <a:p>
-            <a:r>
-              <a:rPr lang="en-AU" dirty="0"/>
-              <a:t>-Traffic</a:t>
-            </a:r>
-          </a:p>
-          <a:p>
-            <a:r>
-              <a:rPr lang="en-AU" dirty="0"/>
-              <a:t>-Parking</a:t>
-            </a:r>
+            <a:endParaRPr lang="en-AU" dirty="0"/>
+          </a:p>
+          <a:p>
+            <a:endParaRPr lang="en-AU" dirty="0"/>
+          </a:p>
+          <a:p>
+            <a:pPr marL="0" marR="0" lvl="0" indent="0" algn="l" defTabSz="914400" rtl="0" eaLnBrk="1" fontAlgn="auto" latinLnBrk="0" hangingPunct="1">
+              <a:lnSpc>
+                <a:spcPct val="100000"/>
+              </a:lnSpc>
+              <a:spcBef>
+                <a:spcPts val="0"/>
+              </a:spcBef>
+              <a:spcAft>
+                <a:spcPts val="0"/>
+              </a:spcAft>
+              <a:buClrTx/>
+              <a:buSzTx/>
+              <a:buFontTx/>
+              <a:buNone/>
+              <a:tabLst/>
+              <a:defRPr/>
+            </a:pPr>
+            <a:r>
+              <a:rPr lang="en-US" dirty="0"/>
+              <a:t>Last slide – Sonal – Over to Laura</a:t>
+            </a:r>
+            <a:endParaRPr lang="en-AU" dirty="0"/>
           </a:p>
           <a:p>
             <a:endParaRPr lang="en-AU" dirty="0"/>
@@ -1792,7 +1816,7 @@
           <a:p>
             <a:fld id="{D2EC087D-094B-4121-A536-202E43873E76}" type="slidenum">
               <a:rPr lang="en-AU" smtClean="0"/>
-              <a:t>9</a:t>
+              <a:t>8</a:t>
             </a:fld>
             <a:endParaRPr lang="en-AU"/>
           </a:p>
@@ -1801,7 +1825,7 @@
     </p:spTree>
     <p:extLst>
       <p:ext uri="{BB962C8B-B14F-4D97-AF65-F5344CB8AC3E}">
-        <p14:creationId xmlns:p14="http://schemas.microsoft.com/office/powerpoint/2010/main" val="4089683548"/>
+        <p14:creationId xmlns:p14="http://schemas.microsoft.com/office/powerpoint/2010/main" val="1146690169"/>
       </p:ext>
     </p:extLst>
   </p:cSld>
@@ -1855,7 +1879,70 @@
           <a:bodyPr/>
           <a:lstStyle/>
           <a:p>
-            <a:endParaRPr lang="en-AU"/>
+            <a:r>
+              <a:rPr lang="en-AU" dirty="0"/>
+              <a:t>The above bar graph shows the different types of schools per LGA.</a:t>
+            </a:r>
+          </a:p>
+          <a:p>
+            <a:r>
+              <a:rPr lang="en-AU" dirty="0"/>
+              <a:t>Families with kids would prefer buying a property which is near schools due to</a:t>
+            </a:r>
+          </a:p>
+          <a:p>
+            <a:r>
+              <a:rPr lang="en-AU" dirty="0"/>
+              <a:t>-improved investment returns </a:t>
+            </a:r>
+          </a:p>
+          <a:p>
+            <a:r>
+              <a:rPr lang="en-AU" dirty="0"/>
+              <a:t>-easy accessibility to schools</a:t>
+            </a:r>
+          </a:p>
+          <a:p>
+            <a:r>
+              <a:rPr lang="en-AU" dirty="0"/>
+              <a:t>-Safer neighbourhood</a:t>
+            </a:r>
+          </a:p>
+          <a:p>
+            <a:r>
+              <a:rPr lang="en-AU" dirty="0"/>
+              <a:t>-Sense of community</a:t>
+            </a:r>
+          </a:p>
+          <a:p>
+            <a:endParaRPr lang="en-AU" dirty="0"/>
+          </a:p>
+          <a:p>
+            <a:r>
+              <a:rPr lang="en-AU" dirty="0"/>
+              <a:t>Cons</a:t>
+            </a:r>
+          </a:p>
+          <a:p>
+            <a:r>
+              <a:rPr lang="en-AU" dirty="0"/>
+              <a:t>-Noisy</a:t>
+            </a:r>
+          </a:p>
+          <a:p>
+            <a:r>
+              <a:rPr lang="en-AU" dirty="0"/>
+              <a:t>-Traffic</a:t>
+            </a:r>
+          </a:p>
+          <a:p>
+            <a:r>
+              <a:rPr lang="en-AU" dirty="0"/>
+              <a:t>-Parking</a:t>
+            </a:r>
+          </a:p>
+          <a:p>
+            <a:endParaRPr lang="en-AU" dirty="0"/>
           </a:p>
         </p:txBody>
       </p:sp>
@@ -1876,7 +1963,7 @@
           <a:p>
             <a:fld id="{D2EC087D-094B-4121-A536-202E43873E76}" type="slidenum">
               <a:rPr lang="en-AU" smtClean="0"/>
-              <a:t>10</a:t>
+              <a:t>9</a:t>
             </a:fld>
             <a:endParaRPr lang="en-AU"/>
           </a:p>
@@ -1885,7 +1972,7 @@
     </p:spTree>
     <p:extLst>
       <p:ext uri="{BB962C8B-B14F-4D97-AF65-F5344CB8AC3E}">
-        <p14:creationId xmlns:p14="http://schemas.microsoft.com/office/powerpoint/2010/main" val="2488075353"/>
+        <p14:creationId xmlns:p14="http://schemas.microsoft.com/office/powerpoint/2010/main" val="4089683548"/>
       </p:ext>
     </p:extLst>
   </p:cSld>
@@ -1960,7 +2047,7 @@
           <a:p>
             <a:fld id="{D2EC087D-094B-4121-A536-202E43873E76}" type="slidenum">
               <a:rPr lang="en-AU" smtClean="0"/>
-              <a:t>11</a:t>
+              <a:t>10</a:t>
             </a:fld>
             <a:endParaRPr lang="en-AU"/>
           </a:p>
@@ -1969,7 +2056,7 @@
     </p:spTree>
     <p:extLst>
       <p:ext uri="{BB962C8B-B14F-4D97-AF65-F5344CB8AC3E}">
-        <p14:creationId xmlns:p14="http://schemas.microsoft.com/office/powerpoint/2010/main" val="4208164843"/>
+        <p14:creationId xmlns:p14="http://schemas.microsoft.com/office/powerpoint/2010/main" val="2488075353"/>
       </p:ext>
     </p:extLst>
   </p:cSld>
@@ -4425,9 +4512,12 @@
 <p:sldMaster xmlns:a="http://schemas.openxmlformats.org/drawingml/2006/main" xmlns:r="http://schemas.openxmlformats.org/officeDocument/2006/relationships" xmlns:p="http://schemas.openxmlformats.org/presentationml/2006/main">
   <p:cSld>
     <p:bg>
-      <p:bgRef idx="1001">
-        <a:schemeClr val="bg1"/>
-      </p:bgRef>
+      <p:bgPr>
+        <a:solidFill>
+          <a:schemeClr val="bg1"/>
+        </a:solidFill>
+        <a:effectLst/>
+      </p:bgPr>
     </p:bg>
     <p:spTree>
       <p:nvGrpSpPr>
@@ -4932,14 +5022,6 @@
 <file path=ppt/slides/slide1.xml><?xml version="1.0" encoding="utf-8"?>
 <p:sld xmlns:a="http://schemas.openxmlformats.org/drawingml/2006/main" xmlns:r="http://schemas.openxmlformats.org/officeDocument/2006/relationships" xmlns:p="http://schemas.openxmlformats.org/presentationml/2006/main">
   <p:cSld>
-    <p:bg>
-      <p:bgPr>
-        <a:solidFill>
-          <a:schemeClr val="bg1"/>
-        </a:solidFill>
-        <a:effectLst/>
-      </p:bgPr>
-    </p:bg>
     <p:spTree>
       <p:nvGrpSpPr>
         <p:cNvPr id="1" name=""/>
@@ -5272,12 +5354,116 @@
           <a:chExt cx="0" cy="0"/>
         </a:xfrm>
       </p:grpSpPr>
+      <p:graphicFrame>
+        <p:nvGraphicFramePr>
+          <p:cNvPr id="2" name="Table 1">
+            <a:extLst>
+              <a:ext uri="{FF2B5EF4-FFF2-40B4-BE49-F238E27FC236}">
+                <a16:creationId xmlns:a16="http://schemas.microsoft.com/office/drawing/2014/main" id="{B366C081-F5F0-BBE7-E81A-55A6362526BF}"/>
+              </a:ext>
+            </a:extLst>
+          </p:cNvPr>
+          <p:cNvGraphicFramePr>
+            <a:graphicFrameLocks noGrp="1"/>
+          </p:cNvGraphicFramePr>
+          <p:nvPr>
+            <p:extLst>
+              <p:ext uri="{D42A27DB-BD31-4B8C-83A1-F6EECF244321}">
+                <p14:modId xmlns:p14="http://schemas.microsoft.com/office/powerpoint/2010/main" val="1006444240"/>
+              </p:ext>
+            </p:extLst>
+          </p:nvPr>
+        </p:nvGraphicFramePr>
+        <p:xfrm>
+          <a:off x="0" y="0"/>
+          <a:ext cx="9144000" cy="762000"/>
+        </p:xfrm>
+        <a:graphic>
+          <a:graphicData uri="http://schemas.openxmlformats.org/drawingml/2006/table">
+            <a:tbl>
+              <a:tblPr firstRow="1" bandRow="1">
+                <a:tableStyleId>{5C22544A-7EE6-4342-B048-85BDC9FD1C3A}</a:tableStyleId>
+              </a:tblPr>
+              <a:tblGrid>
+                <a:gridCol w="9144000">
+                  <a:extLst>
+                    <a:ext uri="{9D8B030D-6E8A-4147-A177-3AD203B41FA5}">
+                      <a16:colId xmlns:a16="http://schemas.microsoft.com/office/drawing/2014/main" val="781671961"/>
+                    </a:ext>
+                  </a:extLst>
+                </a:gridCol>
+              </a:tblGrid>
+              <a:tr h="745390">
+                <a:tc>
+                  <a:txBody>
+                    <a:bodyPr/>
+                    <a:lstStyle/>
+                    <a:p>
+                      <a:pPr algn="ctr"/>
+                      <a:r>
+                        <a:rPr lang="en-US" sz="4400" b="0" dirty="0">
+                          <a:solidFill>
+                            <a:schemeClr val="tx2">
+                              <a:lumMod val="75000"/>
+                            </a:schemeClr>
+                          </a:solidFill>
+                          <a:latin typeface="+mj-lt"/>
+                        </a:rPr>
+                        <a:t>Trend </a:t>
+                      </a:r>
+                      <a:r>
+                        <a:rPr lang="en-US" sz="4400" b="0" dirty="0">
+                          <a:solidFill>
+                            <a:schemeClr val="tx2">
+                              <a:lumMod val="75000"/>
+                            </a:schemeClr>
+                          </a:solidFill>
+                          <a:latin typeface="+mj-lt"/>
+                          <a:cs typeface="Calibri" panose="020F0502020204030204" pitchFamily="34" charset="0"/>
+                        </a:rPr>
+                        <a:t>Analysis</a:t>
+                      </a:r>
+                      <a:r>
+                        <a:rPr lang="en-US" sz="4400" b="0" dirty="0">
+                          <a:solidFill>
+                            <a:schemeClr val="tx2">
+                              <a:lumMod val="75000"/>
+                            </a:schemeClr>
+                          </a:solidFill>
+                          <a:latin typeface="+mj-lt"/>
+                        </a:rPr>
+                        <a:t>:</a:t>
+                      </a:r>
+                      <a:endParaRPr lang="en-AU" sz="4400" b="0" dirty="0">
+                        <a:solidFill>
+                          <a:schemeClr val="tx2">
+                            <a:lumMod val="75000"/>
+                          </a:schemeClr>
+                        </a:solidFill>
+                        <a:latin typeface="+mj-lt"/>
+                      </a:endParaRPr>
+                    </a:p>
+                  </a:txBody>
+                  <a:tcPr>
+                    <a:noFill/>
+                  </a:tcPr>
+                </a:tc>
+                <a:extLst>
+                  <a:ext uri="{0D108BD9-81ED-4DB2-BD59-A6C34878D82A}">
+                    <a16:rowId xmlns:a16="http://schemas.microsoft.com/office/drawing/2014/main" val="2628975100"/>
+                  </a:ext>
+                </a:extLst>
+              </a:tr>
+            </a:tbl>
+          </a:graphicData>
+        </a:graphic>
+      </p:graphicFrame>
       <p:pic>
         <p:nvPicPr>
-          <p:cNvPr id="5" name="Content Placeholder 4" descr="A diagram of a graph">
+          <p:cNvPr id="7" name="Content Placeholder 6" descr="A graph with blue dots and red line&#10;&#10;Description automatically generated">
             <a:extLst>
               <a:ext uri="{FF2B5EF4-FFF2-40B4-BE49-F238E27FC236}">
-                <a16:creationId xmlns:a16="http://schemas.microsoft.com/office/drawing/2014/main" id="{DF4CB1C0-8AF4-8847-EB61-D754B6ADB97B}"/>
+                <a16:creationId xmlns:a16="http://schemas.microsoft.com/office/drawing/2014/main" id="{26CAF490-A1D9-D68B-72BB-EA4435DA7BCB}"/>
               </a:ext>
             </a:extLst>
           </p:cNvPr>
@@ -5296,8 +5482,8 @@
         </p:blipFill>
         <p:spPr>
           <a:xfrm>
-            <a:off x="368135" y="380011"/>
-            <a:ext cx="8229600" cy="5677736"/>
+            <a:off x="530352" y="795527"/>
+            <a:ext cx="8083296" cy="6062473"/>
           </a:xfrm>
         </p:spPr>
       </p:pic>
@@ -5331,12 +5517,116 @@
           <a:chExt cx="0" cy="0"/>
         </a:xfrm>
       </p:grpSpPr>
+      <p:graphicFrame>
+        <p:nvGraphicFramePr>
+          <p:cNvPr id="2" name="Table 1">
+            <a:extLst>
+              <a:ext uri="{FF2B5EF4-FFF2-40B4-BE49-F238E27FC236}">
+                <a16:creationId xmlns:a16="http://schemas.microsoft.com/office/drawing/2014/main" id="{EB95FF62-D65D-BD61-8627-19884D6C850B}"/>
+              </a:ext>
+            </a:extLst>
+          </p:cNvPr>
+          <p:cNvGraphicFramePr>
+            <a:graphicFrameLocks noGrp="1"/>
+          </p:cNvGraphicFramePr>
+          <p:nvPr>
+            <p:extLst>
+              <p:ext uri="{D42A27DB-BD31-4B8C-83A1-F6EECF244321}">
+                <p14:modId xmlns:p14="http://schemas.microsoft.com/office/powerpoint/2010/main" val="714408450"/>
+              </p:ext>
+            </p:extLst>
+          </p:nvPr>
+        </p:nvGraphicFramePr>
+        <p:xfrm>
+          <a:off x="0" y="0"/>
+          <a:ext cx="9144000" cy="762000"/>
+        </p:xfrm>
+        <a:graphic>
+          <a:graphicData uri="http://schemas.openxmlformats.org/drawingml/2006/table">
+            <a:tbl>
+              <a:tblPr firstRow="1" bandRow="1">
+                <a:tableStyleId>{5C22544A-7EE6-4342-B048-85BDC9FD1C3A}</a:tableStyleId>
+              </a:tblPr>
+              <a:tblGrid>
+                <a:gridCol w="9144000">
+                  <a:extLst>
+                    <a:ext uri="{9D8B030D-6E8A-4147-A177-3AD203B41FA5}">
+                      <a16:colId xmlns:a16="http://schemas.microsoft.com/office/drawing/2014/main" val="781671961"/>
+                    </a:ext>
+                  </a:extLst>
+                </a:gridCol>
+              </a:tblGrid>
+              <a:tr h="745390">
+                <a:tc>
+                  <a:txBody>
+                    <a:bodyPr/>
+                    <a:lstStyle/>
+                    <a:p>
+                      <a:pPr algn="ctr"/>
+                      <a:r>
+                        <a:rPr lang="en-US" sz="4400" b="0" dirty="0">
+                          <a:solidFill>
+                            <a:schemeClr val="tx2">
+                              <a:lumMod val="75000"/>
+                            </a:schemeClr>
+                          </a:solidFill>
+                          <a:latin typeface="+mj-lt"/>
+                        </a:rPr>
+                        <a:t>Trend </a:t>
+                      </a:r>
+                      <a:r>
+                        <a:rPr lang="en-US" sz="4400" b="0" dirty="0">
+                          <a:solidFill>
+                            <a:schemeClr val="tx2">
+                              <a:lumMod val="75000"/>
+                            </a:schemeClr>
+                          </a:solidFill>
+                          <a:latin typeface="+mj-lt"/>
+                          <a:cs typeface="Calibri" panose="020F0502020204030204" pitchFamily="34" charset="0"/>
+                        </a:rPr>
+                        <a:t>Analysis</a:t>
+                      </a:r>
+                      <a:r>
+                        <a:rPr lang="en-US" sz="4400" b="0" dirty="0">
+                          <a:solidFill>
+                            <a:schemeClr val="tx2">
+                              <a:lumMod val="75000"/>
+                            </a:schemeClr>
+                          </a:solidFill>
+                          <a:latin typeface="+mj-lt"/>
+                        </a:rPr>
+                        <a:t>:</a:t>
+                      </a:r>
+                      <a:endParaRPr lang="en-AU" sz="4400" b="0" dirty="0">
+                        <a:solidFill>
+                          <a:schemeClr val="tx2">
+                            <a:lumMod val="75000"/>
+                          </a:schemeClr>
+                        </a:solidFill>
+                        <a:latin typeface="+mj-lt"/>
+                      </a:endParaRPr>
+                    </a:p>
+                  </a:txBody>
+                  <a:tcPr>
+                    <a:noFill/>
+                  </a:tcPr>
+                </a:tc>
+                <a:extLst>
+                  <a:ext uri="{0D108BD9-81ED-4DB2-BD59-A6C34878D82A}">
+                    <a16:rowId xmlns:a16="http://schemas.microsoft.com/office/drawing/2014/main" val="2628975100"/>
+                  </a:ext>
+                </a:extLst>
+              </a:tr>
+            </a:tbl>
+          </a:graphicData>
+        </a:graphic>
+      </p:graphicFrame>
       <p:pic>
         <p:nvPicPr>
-          <p:cNvPr id="5" name="Content Placeholder 4" descr="A graph with blue dots and red line&#10;&#10;Description automatically generated">
+          <p:cNvPr id="7" name="Content Placeholder 6" descr="A graph with blue dots and red line&#10;&#10;Description automatically generated">
             <a:extLst>
               <a:ext uri="{FF2B5EF4-FFF2-40B4-BE49-F238E27FC236}">
-                <a16:creationId xmlns:a16="http://schemas.microsoft.com/office/drawing/2014/main" id="{A83C4D45-D172-94E2-A6EC-29A9025D035C}"/>
+                <a16:creationId xmlns:a16="http://schemas.microsoft.com/office/drawing/2014/main" id="{E20E7FE8-5CBE-9FB6-32D9-244D3671C9A3}"/>
               </a:ext>
             </a:extLst>
           </p:cNvPr>
@@ -5355,8 +5645,8 @@
         </p:blipFill>
         <p:spPr>
           <a:xfrm>
-            <a:off x="457200" y="605643"/>
-            <a:ext cx="8229600" cy="5452104"/>
+            <a:off x="265176" y="762000"/>
+            <a:ext cx="8174736" cy="6131053"/>
           </a:xfrm>
         </p:spPr>
       </p:pic>
@@ -10422,8 +10712,14 @@
           <a:lstStyle/>
           <a:p>
             <a:r>
-              <a:rPr lang="en-AU" dirty="0"/>
-              <a:t>The API view</a:t>
+              <a:rPr lang="en-AU" dirty="0">
+                <a:solidFill>
+                  <a:schemeClr val="tx2">
+                    <a:lumMod val="75000"/>
+                  </a:schemeClr>
+                </a:solidFill>
+              </a:rPr>
+              <a:t>Area of Interest</a:t>
             </a:r>
           </a:p>
         </p:txBody>
@@ -10509,14 +10805,15 @@
           <a:lstStyle/>
           <a:p>
             <a:r>
-              <a:rPr lang="en-AU" dirty="0"/>
-              <a:t>Breakdown of </a:t>
-            </a:r>
-            <a:r>
-              <a:rPr lang="en-AU"/>
-              <a:t>public spaces</a:t>
-            </a:r>
-            <a:endParaRPr lang="en-AU" dirty="0"/>
+              <a:rPr lang="en-AU" dirty="0">
+                <a:solidFill>
+                  <a:schemeClr val="tx2">
+                    <a:lumMod val="75000"/>
+                  </a:schemeClr>
+                </a:solidFill>
+              </a:rPr>
+              <a:t>Breakdown of public spaces</a:t>
+            </a:r>
           </a:p>
         </p:txBody>
       </p:sp>
@@ -10537,7 +10834,7 @@
           </p:nvPr>
         </p:nvPicPr>
         <p:blipFill>
-          <a:blip r:embed="rId2"/>
+          <a:blip r:embed="rId3"/>
           <a:stretch>
             <a:fillRect/>
           </a:stretch>
@@ -10564,7 +10861,7 @@
           <p:nvPr/>
         </p:nvPicPr>
         <p:blipFill>
-          <a:blip r:embed="rId3"/>
+          <a:blip r:embed="rId4"/>
           <a:stretch>
             <a:fillRect/>
           </a:stretch>
@@ -10633,7 +10930,7 @@
         </p:blipFill>
         <p:spPr>
           <a:xfrm>
-            <a:off x="0" y="1"/>
+            <a:off x="0" y="0"/>
             <a:ext cx="9144000" cy="6858000"/>
           </a:xfrm>
         </p:spPr>
@@ -10749,7 +11046,7 @@
         <p:spPr>
           <a:xfrm>
             <a:off x="6816438" y="1650669"/>
-            <a:ext cx="1900050" cy="1477328"/>
+            <a:ext cx="1900050" cy="4031873"/>
           </a:xfrm>
           <a:prstGeom prst="rect">
             <a:avLst/>
@@ -10763,9 +11060,134 @@
           <a:lstStyle/>
           <a:p>
             <a:r>
+              <a:rPr lang="en-AU" sz="2000" b="1" dirty="0"/>
+              <a:t>Top 5:</a:t>
+            </a:r>
+            <a:endParaRPr lang="en-AU" sz="1600" b="1" dirty="0"/>
+          </a:p>
+          <a:p>
+            <a:pPr marL="285750" indent="-285750">
+              <a:buFont typeface="Wingdings" panose="05000000000000000000" pitchFamily="2" charset="2"/>
+              <a:buChar char="§"/>
+            </a:pPr>
+            <a:r>
               <a:rPr lang="en-AU" dirty="0"/>
-              <a:t>Top three LGA’s with larger open spaces are Yarra Ranges, Casey and Mornington</a:t>
-            </a:r>
+              <a:t>Yarra Ranges</a:t>
+            </a:r>
+          </a:p>
+          <a:p>
+            <a:pPr marL="285750" indent="-285750">
+              <a:buFont typeface="Wingdings" panose="05000000000000000000" pitchFamily="2" charset="2"/>
+              <a:buChar char="§"/>
+            </a:pPr>
+            <a:r>
+              <a:rPr lang="en-AU" dirty="0"/>
+              <a:t>Casey</a:t>
+            </a:r>
+          </a:p>
+          <a:p>
+            <a:pPr marL="285750" indent="-285750">
+              <a:buFont typeface="Wingdings" panose="05000000000000000000" pitchFamily="2" charset="2"/>
+              <a:buChar char="§"/>
+            </a:pPr>
+            <a:r>
+              <a:rPr lang="en-AU" dirty="0"/>
+              <a:t>Mornington</a:t>
+            </a:r>
+          </a:p>
+          <a:p>
+            <a:pPr marL="285750" indent="-285750">
+              <a:buFont typeface="Wingdings" panose="05000000000000000000" pitchFamily="2" charset="2"/>
+              <a:buChar char="§"/>
+            </a:pPr>
+            <a:r>
+              <a:rPr lang="en-AU" dirty="0"/>
+              <a:t>Hume</a:t>
+            </a:r>
+          </a:p>
+          <a:p>
+            <a:pPr marL="285750" indent="-285750">
+              <a:buFont typeface="Wingdings" panose="05000000000000000000" pitchFamily="2" charset="2"/>
+              <a:buChar char="§"/>
+            </a:pPr>
+            <a:r>
+              <a:rPr lang="en-AU" dirty="0"/>
+              <a:t>Whittlesea</a:t>
+            </a:r>
+          </a:p>
+          <a:p>
+            <a:pPr marL="285750" indent="-285750">
+              <a:buFont typeface="Wingdings" panose="05000000000000000000" pitchFamily="2" charset="2"/>
+              <a:buChar char="§"/>
+            </a:pPr>
+            <a:endParaRPr lang="en-AU" dirty="0"/>
+          </a:p>
+          <a:p>
+            <a:r>
+              <a:rPr lang="en-AU" sz="2000" b="1" dirty="0"/>
+              <a:t>Bottom 5:</a:t>
+            </a:r>
+          </a:p>
+          <a:p>
+            <a:pPr marL="285750" indent="-285750">
+              <a:buFont typeface="Wingdings" panose="05000000000000000000" pitchFamily="2" charset="2"/>
+              <a:buChar char="§"/>
+            </a:pPr>
+            <a:r>
+              <a:rPr lang="en-AU" dirty="0"/>
+              <a:t>Mitchell</a:t>
+            </a:r>
+          </a:p>
+          <a:p>
+            <a:pPr marL="285750" indent="-285750">
+              <a:buFont typeface="Wingdings" panose="05000000000000000000" pitchFamily="2" charset="2"/>
+              <a:buChar char="§"/>
+            </a:pPr>
+            <a:r>
+              <a:rPr lang="en-AU" dirty="0"/>
+              <a:t>Bayside</a:t>
+            </a:r>
+          </a:p>
+          <a:p>
+            <a:pPr marL="285750" indent="-285750">
+              <a:buFont typeface="Wingdings" panose="05000000000000000000" pitchFamily="2" charset="2"/>
+              <a:buChar char="§"/>
+            </a:pPr>
+            <a:r>
+              <a:rPr lang="en-AU" dirty="0" err="1"/>
+              <a:t>Gnel</a:t>
+            </a:r>
+            <a:r>
+              <a:rPr lang="en-AU" dirty="0"/>
+              <a:t> Eira</a:t>
+            </a:r>
+          </a:p>
+          <a:p>
+            <a:pPr marL="285750" indent="-285750">
+              <a:buFont typeface="Wingdings" panose="05000000000000000000" pitchFamily="2" charset="2"/>
+              <a:buChar char="§"/>
+            </a:pPr>
+            <a:r>
+              <a:rPr lang="en-AU" dirty="0"/>
+              <a:t>Stonnington</a:t>
+            </a:r>
+          </a:p>
+          <a:p>
+            <a:pPr marL="285750" indent="-285750">
+              <a:buFont typeface="Wingdings" panose="05000000000000000000" pitchFamily="2" charset="2"/>
+              <a:buChar char="§"/>
+            </a:pPr>
+            <a:r>
+              <a:rPr lang="en-AU" dirty="0"/>
+              <a:t>Yarra</a:t>
+            </a:r>
+          </a:p>
+          <a:p>
+            <a:pPr marL="285750" indent="-285750">
+              <a:buFont typeface="Wingdings" panose="05000000000000000000" pitchFamily="2" charset="2"/>
+              <a:buChar char="§"/>
+            </a:pPr>
+            <a:endParaRPr lang="en-AU" dirty="0"/>
           </a:p>
         </p:txBody>
       </p:sp>
@@ -10825,7 +11247,7 @@
             </a:pPr>
             <a:r>
               <a:rPr lang="en-AU" dirty="0"/>
-              <a:t>LGAs and their population</a:t>
+              <a:t>LGAs and their Population Density</a:t>
             </a:r>
             <a:endParaRPr dirty="0"/>
           </a:p>
@@ -10855,11 +11277,274 @@
         </p:blipFill>
         <p:spPr>
           <a:xfrm>
-            <a:off x="629392" y="926274"/>
-            <a:ext cx="7849590" cy="5861913"/>
+            <a:off x="0" y="1097280"/>
+            <a:ext cx="7155305" cy="5690907"/>
           </a:xfrm>
         </p:spPr>
       </p:pic>
+      <p:graphicFrame>
+        <p:nvGraphicFramePr>
+          <p:cNvPr id="3" name="Table 2">
+            <a:extLst>
+              <a:ext uri="{FF2B5EF4-FFF2-40B4-BE49-F238E27FC236}">
+                <a16:creationId xmlns:a16="http://schemas.microsoft.com/office/drawing/2014/main" id="{D8898F4A-4867-B0D3-A73F-E1644602E7C0}"/>
+              </a:ext>
+            </a:extLst>
+          </p:cNvPr>
+          <p:cNvGraphicFramePr>
+            <a:graphicFrameLocks noGrp="1"/>
+          </p:cNvGraphicFramePr>
+          <p:nvPr>
+            <p:extLst>
+              <p:ext uri="{D42A27DB-BD31-4B8C-83A1-F6EECF244321}">
+                <p14:modId xmlns:p14="http://schemas.microsoft.com/office/powerpoint/2010/main" val="908688443"/>
+              </p:ext>
+            </p:extLst>
+          </p:nvPr>
+        </p:nvGraphicFramePr>
+        <p:xfrm>
+          <a:off x="7155304" y="1767840"/>
+          <a:ext cx="1988695" cy="3992880"/>
+        </p:xfrm>
+        <a:graphic>
+          <a:graphicData uri="http://schemas.openxmlformats.org/drawingml/2006/table">
+            <a:tbl>
+              <a:tblPr firstRow="1" bandRow="1">
+                <a:tableStyleId>{5C22544A-7EE6-4342-B048-85BDC9FD1C3A}</a:tableStyleId>
+              </a:tblPr>
+              <a:tblGrid>
+                <a:gridCol w="1988695">
+                  <a:extLst>
+                    <a:ext uri="{9D8B030D-6E8A-4147-A177-3AD203B41FA5}">
+                      <a16:colId xmlns:a16="http://schemas.microsoft.com/office/drawing/2014/main" val="3546930891"/>
+                    </a:ext>
+                  </a:extLst>
+                </a:gridCol>
+              </a:tblGrid>
+              <a:tr h="370840">
+                <a:tc>
+                  <a:txBody>
+                    <a:bodyPr/>
+                    <a:lstStyle/>
+                    <a:p>
+                      <a:r>
+                        <a:rPr lang="en-US" sz="2000" dirty="0">
+                          <a:solidFill>
+                            <a:schemeClr val="tx1"/>
+                          </a:solidFill>
+                        </a:rPr>
+                        <a:t>Top 5:</a:t>
+                      </a:r>
+                    </a:p>
+                    <a:p>
+                      <a:pPr marL="285750" indent="-285750">
+                        <a:buFont typeface="Wingdings" panose="05000000000000000000" pitchFamily="2" charset="2"/>
+                        <a:buChar char="§"/>
+                      </a:pPr>
+                      <a:r>
+                        <a:rPr lang="en-US" b="0" dirty="0">
+                          <a:solidFill>
+                            <a:schemeClr val="tx1"/>
+                          </a:solidFill>
+                        </a:rPr>
+                        <a:t>Port Phillip</a:t>
+                      </a:r>
+                    </a:p>
+                    <a:p>
+                      <a:pPr marL="285750" indent="-285750">
+                        <a:buFont typeface="Wingdings" panose="05000000000000000000" pitchFamily="2" charset="2"/>
+                        <a:buChar char="§"/>
+                      </a:pPr>
+                      <a:r>
+                        <a:rPr lang="en-US" b="0" dirty="0" err="1">
+                          <a:solidFill>
+                            <a:schemeClr val="tx1"/>
+                          </a:solidFill>
+                        </a:rPr>
+                        <a:t>Yarra</a:t>
+                      </a:r>
+                      <a:endParaRPr lang="en-US" b="0" dirty="0">
+                        <a:solidFill>
+                          <a:schemeClr val="tx1"/>
+                        </a:solidFill>
+                      </a:endParaRPr>
+                    </a:p>
+                    <a:p>
+                      <a:pPr marL="285750" indent="-285750">
+                        <a:buFont typeface="Wingdings" panose="05000000000000000000" pitchFamily="2" charset="2"/>
+                        <a:buChar char="§"/>
+                      </a:pPr>
+                      <a:r>
+                        <a:rPr lang="en-US" b="0" dirty="0">
+                          <a:solidFill>
+                            <a:schemeClr val="tx1"/>
+                          </a:solidFill>
+                        </a:rPr>
+                        <a:t>Melbourne</a:t>
+                      </a:r>
+                    </a:p>
+                    <a:p>
+                      <a:pPr marL="285750" indent="-285750">
+                        <a:buFont typeface="Wingdings" panose="05000000000000000000" pitchFamily="2" charset="2"/>
+                        <a:buChar char="§"/>
+                      </a:pPr>
+                      <a:r>
+                        <a:rPr lang="en-US" b="0" dirty="0" err="1">
+                          <a:solidFill>
+                            <a:schemeClr val="tx1"/>
+                          </a:solidFill>
+                        </a:rPr>
+                        <a:t>Stonnington</a:t>
+                      </a:r>
+                      <a:endParaRPr lang="en-US" b="0" dirty="0">
+                        <a:solidFill>
+                          <a:schemeClr val="tx1"/>
+                        </a:solidFill>
+                      </a:endParaRPr>
+                    </a:p>
+                    <a:p>
+                      <a:pPr marL="285750" indent="-285750">
+                        <a:buFont typeface="Wingdings" panose="05000000000000000000" pitchFamily="2" charset="2"/>
+                        <a:buChar char="§"/>
+                      </a:pPr>
+                      <a:r>
+                        <a:rPr lang="en-US" b="0" dirty="0">
+                          <a:solidFill>
+                            <a:schemeClr val="tx1"/>
+                          </a:solidFill>
+                        </a:rPr>
+                        <a:t>Glen Eira</a:t>
+                      </a:r>
+                    </a:p>
+                    <a:p>
+                      <a:pPr marL="285750" indent="-285750">
+                        <a:buFont typeface="Wingdings" panose="05000000000000000000" pitchFamily="2" charset="2"/>
+                        <a:buChar char="§"/>
+                      </a:pPr>
+                      <a:endParaRPr lang="en-US" dirty="0">
+                        <a:solidFill>
+                          <a:schemeClr val="tx1"/>
+                        </a:solidFill>
+                      </a:endParaRPr>
+                    </a:p>
+                    <a:p>
+                      <a:pPr marL="0" indent="0">
+                        <a:buFont typeface="Wingdings" panose="05000000000000000000" pitchFamily="2" charset="2"/>
+                        <a:buNone/>
+                      </a:pPr>
+                      <a:r>
+                        <a:rPr lang="en-US" sz="2000" dirty="0">
+                          <a:solidFill>
+                            <a:schemeClr val="tx1"/>
+                          </a:solidFill>
+                        </a:rPr>
+                        <a:t>Bottom 5:</a:t>
+                      </a:r>
+                    </a:p>
+                    <a:p>
+                      <a:pPr marL="285750" indent="-285750">
+                        <a:buFont typeface="Wingdings" panose="05000000000000000000" pitchFamily="2" charset="2"/>
+                        <a:buChar char="§"/>
+                      </a:pPr>
+                      <a:r>
+                        <a:rPr lang="en-US" b="0" dirty="0">
+                          <a:solidFill>
+                            <a:schemeClr val="tx1"/>
+                          </a:solidFill>
+                        </a:rPr>
+                        <a:t>Mitchell</a:t>
+                      </a:r>
+                    </a:p>
+                    <a:p>
+                      <a:pPr marL="285750" indent="-285750">
+                        <a:buFont typeface="Wingdings" panose="05000000000000000000" pitchFamily="2" charset="2"/>
+                        <a:buChar char="§"/>
+                      </a:pPr>
+                      <a:r>
+                        <a:rPr lang="en-US" b="0" dirty="0" err="1">
+                          <a:solidFill>
+                            <a:schemeClr val="tx1"/>
+                          </a:solidFill>
+                        </a:rPr>
+                        <a:t>Yarra</a:t>
+                      </a:r>
+                      <a:r>
+                        <a:rPr lang="en-US" b="0" dirty="0">
+                          <a:solidFill>
+                            <a:schemeClr val="tx1"/>
+                          </a:solidFill>
+                        </a:rPr>
+                        <a:t> Ranges</a:t>
+                      </a:r>
+                    </a:p>
+                    <a:p>
+                      <a:pPr marL="285750" indent="-285750">
+                        <a:buFont typeface="Wingdings" panose="05000000000000000000" pitchFamily="2" charset="2"/>
+                        <a:buChar char="§"/>
+                      </a:pPr>
+                      <a:r>
+                        <a:rPr lang="en-US" b="0" dirty="0">
+                          <a:solidFill>
+                            <a:schemeClr val="tx1"/>
+                          </a:solidFill>
+                        </a:rPr>
+                        <a:t>Cardinia</a:t>
+                      </a:r>
+                    </a:p>
+                    <a:p>
+                      <a:pPr marL="285750" indent="-285750">
+                        <a:buFont typeface="Wingdings" panose="05000000000000000000" pitchFamily="2" charset="2"/>
+                        <a:buChar char="§"/>
+                      </a:pPr>
+                      <a:r>
+                        <a:rPr lang="en-US" b="0" dirty="0">
+                          <a:solidFill>
+                            <a:schemeClr val="tx1"/>
+                          </a:solidFill>
+                        </a:rPr>
+                        <a:t>Nillumbik</a:t>
+                      </a:r>
+                    </a:p>
+                    <a:p>
+                      <a:pPr marL="285750" indent="-285750">
+                        <a:buFont typeface="Wingdings" panose="05000000000000000000" pitchFamily="2" charset="2"/>
+                        <a:buChar char="§"/>
+                      </a:pPr>
+                      <a:r>
+                        <a:rPr lang="en-US" b="0" dirty="0">
+                          <a:solidFill>
+                            <a:schemeClr val="tx1"/>
+                          </a:solidFill>
+                        </a:rPr>
+                        <a:t>Mornington</a:t>
+                      </a:r>
+                    </a:p>
+                    <a:p>
+                      <a:pPr marL="285750" indent="-285750">
+                        <a:buFont typeface="Wingdings" panose="05000000000000000000" pitchFamily="2" charset="2"/>
+                        <a:buChar char="§"/>
+                      </a:pPr>
+                      <a:endParaRPr lang="en-AU" dirty="0">
+                        <a:solidFill>
+                          <a:schemeClr val="tx1"/>
+                        </a:solidFill>
+                      </a:endParaRPr>
+                    </a:p>
+                  </a:txBody>
+                  <a:tcPr>
+                    <a:noFill/>
+                  </a:tcPr>
+                </a:tc>
+                <a:extLst>
+                  <a:ext uri="{0D108BD9-81ED-4DB2-BD59-A6C34878D82A}">
+                    <a16:rowId xmlns:a16="http://schemas.microsoft.com/office/drawing/2014/main" val="1657874702"/>
+                  </a:ext>
+                </a:extLst>
+              </a:tr>
+            </a:tbl>
+          </a:graphicData>
+        </a:graphic>
+      </p:graphicFrame>
     </p:spTree>
     <p:extLst>
       <p:ext uri="{BB962C8B-B14F-4D97-AF65-F5344CB8AC3E}">
@@ -10951,8 +11636,8 @@
         </p:blipFill>
         <p:spPr>
           <a:xfrm>
-            <a:off x="457200" y="1668621"/>
-            <a:ext cx="8229600" cy="4389120"/>
+            <a:off x="0" y="1212812"/>
+            <a:ext cx="9144000" cy="4876800"/>
           </a:xfrm>
         </p:spPr>
       </p:pic>

</xml_diff>